<commit_message>
backing up lots of work
</commit_message>
<xml_diff>
--- a/Modeling/Simple/state-space/2DOF_state-space_derivation.pptx
+++ b/Modeling/Simple/state-space/2DOF_state-space_derivation.pptx
@@ -6,6 +6,7 @@
   </p:sldMasterIdLst>
   <p:sldIdLst>
     <p:sldId id="256" r:id="rId2"/>
+    <p:sldId id="257" r:id="rId3"/>
   </p:sldIdLst>
   <p:sldSz cx="9144000" cy="6858000" type="screen4x3"/>
   <p:notesSz cx="6858000" cy="9144000"/>
@@ -288,7 +289,7 @@
           <a:p>
             <a:fld id="{82E01EC4-0BC2-4C83-8522-2DBC2DC9B78F}" type="datetimeFigureOut">
               <a:rPr lang="en-US" smtClean="0"/>
-              <a:t>6/21/2018</a:t>
+              <a:t>7/27/2018</a:t>
             </a:fld>
             <a:endParaRPr lang="en-US"/>
           </a:p>
@@ -458,7 +459,7 @@
           <a:p>
             <a:fld id="{82E01EC4-0BC2-4C83-8522-2DBC2DC9B78F}" type="datetimeFigureOut">
               <a:rPr lang="en-US" smtClean="0"/>
-              <a:t>6/21/2018</a:t>
+              <a:t>7/27/2018</a:t>
             </a:fld>
             <a:endParaRPr lang="en-US"/>
           </a:p>
@@ -638,7 +639,7 @@
           <a:p>
             <a:fld id="{82E01EC4-0BC2-4C83-8522-2DBC2DC9B78F}" type="datetimeFigureOut">
               <a:rPr lang="en-US" smtClean="0"/>
-              <a:t>6/21/2018</a:t>
+              <a:t>7/27/2018</a:t>
             </a:fld>
             <a:endParaRPr lang="en-US"/>
           </a:p>
@@ -808,7 +809,7 @@
           <a:p>
             <a:fld id="{82E01EC4-0BC2-4C83-8522-2DBC2DC9B78F}" type="datetimeFigureOut">
               <a:rPr lang="en-US" smtClean="0"/>
-              <a:t>6/21/2018</a:t>
+              <a:t>7/27/2018</a:t>
             </a:fld>
             <a:endParaRPr lang="en-US"/>
           </a:p>
@@ -1054,7 +1055,7 @@
           <a:p>
             <a:fld id="{82E01EC4-0BC2-4C83-8522-2DBC2DC9B78F}" type="datetimeFigureOut">
               <a:rPr lang="en-US" smtClean="0"/>
-              <a:t>6/21/2018</a:t>
+              <a:t>7/27/2018</a:t>
             </a:fld>
             <a:endParaRPr lang="en-US"/>
           </a:p>
@@ -1342,7 +1343,7 @@
           <a:p>
             <a:fld id="{82E01EC4-0BC2-4C83-8522-2DBC2DC9B78F}" type="datetimeFigureOut">
               <a:rPr lang="en-US" smtClean="0"/>
-              <a:t>6/21/2018</a:t>
+              <a:t>7/27/2018</a:t>
             </a:fld>
             <a:endParaRPr lang="en-US"/>
           </a:p>
@@ -1764,7 +1765,7 @@
           <a:p>
             <a:fld id="{82E01EC4-0BC2-4C83-8522-2DBC2DC9B78F}" type="datetimeFigureOut">
               <a:rPr lang="en-US" smtClean="0"/>
-              <a:t>6/21/2018</a:t>
+              <a:t>7/27/2018</a:t>
             </a:fld>
             <a:endParaRPr lang="en-US"/>
           </a:p>
@@ -1882,7 +1883,7 @@
           <a:p>
             <a:fld id="{82E01EC4-0BC2-4C83-8522-2DBC2DC9B78F}" type="datetimeFigureOut">
               <a:rPr lang="en-US" smtClean="0"/>
-              <a:t>6/21/2018</a:t>
+              <a:t>7/27/2018</a:t>
             </a:fld>
             <a:endParaRPr lang="en-US"/>
           </a:p>
@@ -1977,7 +1978,7 @@
           <a:p>
             <a:fld id="{82E01EC4-0BC2-4C83-8522-2DBC2DC9B78F}" type="datetimeFigureOut">
               <a:rPr lang="en-US" smtClean="0"/>
-              <a:t>6/21/2018</a:t>
+              <a:t>7/27/2018</a:t>
             </a:fld>
             <a:endParaRPr lang="en-US"/>
           </a:p>
@@ -2254,7 +2255,7 @@
           <a:p>
             <a:fld id="{82E01EC4-0BC2-4C83-8522-2DBC2DC9B78F}" type="datetimeFigureOut">
               <a:rPr lang="en-US" smtClean="0"/>
-              <a:t>6/21/2018</a:t>
+              <a:t>7/27/2018</a:t>
             </a:fld>
             <a:endParaRPr lang="en-US"/>
           </a:p>
@@ -2507,7 +2508,7 @@
           <a:p>
             <a:fld id="{82E01EC4-0BC2-4C83-8522-2DBC2DC9B78F}" type="datetimeFigureOut">
               <a:rPr lang="en-US" smtClean="0"/>
-              <a:t>6/21/2018</a:t>
+              <a:t>7/27/2018</a:t>
             </a:fld>
             <a:endParaRPr lang="en-US"/>
           </a:p>
@@ -2720,7 +2721,7 @@
           <a:p>
             <a:fld id="{82E01EC4-0BC2-4C83-8522-2DBC2DC9B78F}" type="datetimeFigureOut">
               <a:rPr lang="en-US" smtClean="0"/>
-              <a:t>6/21/2018</a:t>
+              <a:t>7/27/2018</a:t>
             </a:fld>
             <a:endParaRPr lang="en-US"/>
           </a:p>
@@ -4192,8 +4193,8 @@
           </p:txBody>
         </p:sp>
       </p:grpSp>
-      <mc:AlternateContent xmlns:mc="http://schemas.openxmlformats.org/markup-compatibility/2006">
-        <mc:Choice xmlns:a14="http://schemas.microsoft.com/office/drawing/2010/main" Requires="a14">
+      <mc:AlternateContent xmlns:mc="http://schemas.openxmlformats.org/markup-compatibility/2006" xmlns:a14="http://schemas.microsoft.com/office/drawing/2010/main">
+        <mc:Choice Requires="a14">
           <p:sp>
             <p:nvSpPr>
               <p:cNvPr id="73" name="TextBox 72"/>
@@ -4226,12 +4227,16 @@
                       <m:sSub>
                         <m:sSubPr>
                           <m:ctrlPr>
-                            <a:rPr lang="en-US" sz="1400" i="1" smtClean="0"/>
+                            <a:rPr lang="en-US" sz="1400" i="1" smtClean="0">
+                              <a:latin typeface="Cambria Math"/>
+                            </a:rPr>
                           </m:ctrlPr>
                         </m:sSubPr>
                         <m:e>
                           <m:r>
-                            <a:rPr lang="en-US" sz="1400" i="1"/>
+                            <a:rPr lang="en-US" sz="1400" i="1">
+                              <a:latin typeface="Cambria Math"/>
+                            </a:rPr>
                             <m:t>𝑚</m:t>
                           </m:r>
                         </m:e>
@@ -4247,7 +4252,9 @@
                       <m:sSub>
                         <m:sSubPr>
                           <m:ctrlPr>
-                            <a:rPr lang="en-US" sz="1400" i="1"/>
+                            <a:rPr lang="en-US" sz="1400" i="1">
+                              <a:latin typeface="Cambria Math"/>
+                            </a:rPr>
                           </m:ctrlPr>
                         </m:sSubPr>
                         <m:e>
@@ -4255,12 +4262,16 @@
                             <m:accPr>
                               <m:chr m:val="̈"/>
                               <m:ctrlPr>
-                                <a:rPr lang="en-US" sz="1400" i="1"/>
+                                <a:rPr lang="en-US" sz="1400" i="1">
+                                  <a:latin typeface="Cambria Math"/>
+                                </a:rPr>
                               </m:ctrlPr>
                             </m:accPr>
                             <m:e>
                               <m:r>
-                                <a:rPr lang="en-US" sz="1400" i="1"/>
+                                <a:rPr lang="en-US" sz="1400" i="1">
+                                  <a:latin typeface="Cambria Math"/>
+                                </a:rPr>
                                 <m:t>𝑥</m:t>
                               </m:r>
                             </m:e>
@@ -4276,18 +4287,24 @@
                         </m:sub>
                       </m:sSub>
                       <m:r>
-                        <a:rPr lang="en-US" sz="1400" i="1"/>
+                        <a:rPr lang="en-US" sz="1400" i="1">
+                          <a:latin typeface="Cambria Math"/>
+                        </a:rPr>
                         <m:t>+</m:t>
                       </m:r>
                       <m:sSub>
                         <m:sSubPr>
                           <m:ctrlPr>
-                            <a:rPr lang="en-US" sz="1400" i="1"/>
+                            <a:rPr lang="en-US" sz="1400" i="1">
+                              <a:latin typeface="Cambria Math"/>
+                            </a:rPr>
                           </m:ctrlPr>
                         </m:sSubPr>
                         <m:e>
                           <m:r>
-                            <a:rPr lang="en-US" sz="1400" i="1"/>
+                            <a:rPr lang="en-US" sz="1400" i="1">
+                              <a:latin typeface="Cambria Math"/>
+                            </a:rPr>
                             <m:t>𝑘</m:t>
                           </m:r>
                         </m:e>
@@ -4303,19 +4320,25 @@
                       <m:d>
                         <m:dPr>
                           <m:ctrlPr>
-                            <a:rPr lang="en-US" sz="1400" i="1"/>
+                            <a:rPr lang="en-US" sz="1400" i="1">
+                              <a:latin typeface="Cambria Math"/>
+                            </a:rPr>
                           </m:ctrlPr>
                         </m:dPr>
                         <m:e>
                           <m:sSub>
                             <m:sSubPr>
                               <m:ctrlPr>
-                                <a:rPr lang="en-US" sz="1400" i="1"/>
+                                <a:rPr lang="en-US" sz="1400" i="1">
+                                  <a:latin typeface="Cambria Math"/>
+                                </a:rPr>
                               </m:ctrlPr>
                             </m:sSubPr>
                             <m:e>
                               <m:r>
-                                <a:rPr lang="en-US" sz="1400" i="1"/>
+                                <a:rPr lang="en-US" sz="1400" i="1">
+                                  <a:latin typeface="Cambria Math"/>
+                                </a:rPr>
                                 <m:t>𝑥</m:t>
                               </m:r>
                             </m:e>
@@ -4329,18 +4352,24 @@
                             </m:sub>
                           </m:sSub>
                           <m:r>
-                            <a:rPr lang="en-US" sz="1400" i="1"/>
+                            <a:rPr lang="en-US" sz="1400" i="1">
+                              <a:latin typeface="Cambria Math"/>
+                            </a:rPr>
                             <m:t>−</m:t>
                           </m:r>
                           <m:sSub>
                             <m:sSubPr>
                               <m:ctrlPr>
-                                <a:rPr lang="en-US" sz="1400" i="1"/>
+                                <a:rPr lang="en-US" sz="1400" i="1">
+                                  <a:latin typeface="Cambria Math"/>
+                                </a:rPr>
                               </m:ctrlPr>
                             </m:sSubPr>
                             <m:e>
                               <m:r>
-                                <a:rPr lang="en-US" sz="1400" i="1"/>
+                                <a:rPr lang="en-US" sz="1400" i="1">
+                                  <a:latin typeface="Cambria Math"/>
+                                </a:rPr>
                                 <m:t>𝑥</m:t>
                               </m:r>
                             </m:e>
@@ -4354,24 +4383,32 @@
                             </m:sub>
                           </m:sSub>
                           <m:r>
-                            <a:rPr lang="en-US" sz="1400" i="1"/>
+                            <a:rPr lang="en-US" sz="1400" i="1">
+                              <a:latin typeface="Cambria Math"/>
+                            </a:rPr>
                             <m:t>−∆</m:t>
                           </m:r>
                         </m:e>
                       </m:d>
                       <m:r>
-                        <a:rPr lang="en-US" sz="1400" i="1"/>
+                        <a:rPr lang="en-US" sz="1400" i="1">
+                          <a:latin typeface="Cambria Math"/>
+                        </a:rPr>
                         <m:t>+</m:t>
                       </m:r>
                       <m:sSub>
                         <m:sSubPr>
                           <m:ctrlPr>
-                            <a:rPr lang="en-US" sz="1400" i="1"/>
+                            <a:rPr lang="en-US" sz="1400" i="1">
+                              <a:latin typeface="Cambria Math"/>
+                            </a:rPr>
                           </m:ctrlPr>
                         </m:sSubPr>
                         <m:e>
                           <m:r>
-                            <a:rPr lang="en-US" sz="1400" i="1"/>
+                            <a:rPr lang="en-US" sz="1400" i="1">
+                              <a:latin typeface="Cambria Math"/>
+                            </a:rPr>
                             <m:t>𝑐</m:t>
                           </m:r>
                         </m:e>
@@ -4387,14 +4424,18 @@
                       <m:d>
                         <m:dPr>
                           <m:ctrlPr>
-                            <a:rPr lang="en-US" sz="1400" i="1"/>
+                            <a:rPr lang="en-US" sz="1400" i="1">
+                              <a:latin typeface="Cambria Math"/>
+                            </a:rPr>
                           </m:ctrlPr>
                         </m:dPr>
                         <m:e>
                           <m:sSub>
                             <m:sSubPr>
                               <m:ctrlPr>
-                                <a:rPr lang="en-US" sz="1400" i="1" smtClean="0"/>
+                                <a:rPr lang="en-US" sz="1400" i="1" smtClean="0">
+                                  <a:latin typeface="Cambria Math"/>
+                                </a:rPr>
                               </m:ctrlPr>
                             </m:sSubPr>
                             <m:e>
@@ -4402,12 +4443,16 @@
                                 <m:accPr>
                                   <m:chr m:val="̇"/>
                                   <m:ctrlPr>
-                                    <a:rPr lang="en-US" sz="1400" i="1"/>
+                                    <a:rPr lang="en-US" sz="1400" i="1">
+                                      <a:latin typeface="Cambria Math"/>
+                                    </a:rPr>
                                   </m:ctrlPr>
                                 </m:accPr>
                                 <m:e>
                                   <m:r>
-                                    <a:rPr lang="en-US" sz="1400" i="1"/>
+                                    <a:rPr lang="en-US" sz="1400" i="1">
+                                      <a:latin typeface="Cambria Math"/>
+                                    </a:rPr>
                                     <m:t>𝑥</m:t>
                                   </m:r>
                                 </m:e>
@@ -4423,13 +4468,17 @@
                             </m:sub>
                           </m:sSub>
                           <m:r>
-                            <a:rPr lang="en-US" sz="1400" i="1"/>
+                            <a:rPr lang="en-US" sz="1400" i="1">
+                              <a:latin typeface="Cambria Math"/>
+                            </a:rPr>
                             <m:t>−</m:t>
                           </m:r>
                           <m:sSub>
                             <m:sSubPr>
                               <m:ctrlPr>
-                                <a:rPr lang="en-US" sz="1400" i="1"/>
+                                <a:rPr lang="en-US" sz="1400" i="1">
+                                  <a:latin typeface="Cambria Math"/>
+                                </a:rPr>
                               </m:ctrlPr>
                             </m:sSubPr>
                             <m:e>
@@ -4437,12 +4486,16 @@
                                 <m:accPr>
                                   <m:chr m:val="̇"/>
                                   <m:ctrlPr>
-                                    <a:rPr lang="en-US" sz="1400" i="1"/>
+                                    <a:rPr lang="en-US" sz="1400" i="1">
+                                      <a:latin typeface="Cambria Math"/>
+                                    </a:rPr>
                                   </m:ctrlPr>
                                 </m:accPr>
                                 <m:e>
                                   <m:r>
-                                    <a:rPr lang="en-US" sz="1400" i="1"/>
+                                    <a:rPr lang="en-US" sz="1400" i="1">
+                                      <a:latin typeface="Cambria Math"/>
+                                    </a:rPr>
                                     <m:t>𝑥</m:t>
                                   </m:r>
                                 </m:e>
@@ -4458,19 +4511,25 @@
                             </m:sub>
                           </m:sSub>
                           <m:r>
-                            <a:rPr lang="en-US" sz="1400" i="1"/>
+                            <a:rPr lang="en-US" sz="1400" i="1">
+                              <a:latin typeface="Cambria Math"/>
+                            </a:rPr>
                             <m:t>−</m:t>
                           </m:r>
                           <m:acc>
                             <m:accPr>
                               <m:chr m:val="̇"/>
                               <m:ctrlPr>
-                                <a:rPr lang="en-US" sz="1400" i="1"/>
+                                <a:rPr lang="en-US" sz="1400" i="1">
+                                  <a:latin typeface="Cambria Math"/>
+                                </a:rPr>
                               </m:ctrlPr>
                             </m:accPr>
                             <m:e>
                               <m:r>
-                                <a:rPr lang="en-US" sz="1400" i="1"/>
+                                <a:rPr lang="en-US" sz="1400" i="1">
+                                  <a:latin typeface="Cambria Math"/>
+                                </a:rPr>
                                 <m:t>∆</m:t>
                               </m:r>
                             </m:e>
@@ -4478,7 +4537,9 @@
                         </m:e>
                       </m:d>
                       <m:r>
-                        <a:rPr lang="en-US" sz="1400" i="1"/>
+                        <a:rPr lang="en-US" sz="1400" i="1">
+                          <a:latin typeface="Cambria Math"/>
+                        </a:rPr>
                         <m:t>=0</m:t>
                       </m:r>
                     </m:oMath>
@@ -4497,12 +4558,16 @@
                       <m:sSub>
                         <m:sSubPr>
                           <m:ctrlPr>
-                            <a:rPr lang="en-US" sz="1400" i="1"/>
+                            <a:rPr lang="en-US" sz="1400" i="1">
+                              <a:latin typeface="Cambria Math"/>
+                            </a:rPr>
                           </m:ctrlPr>
                         </m:sSubPr>
                         <m:e>
                           <m:r>
-                            <a:rPr lang="en-US" sz="1400" i="1"/>
+                            <a:rPr lang="en-US" sz="1400" i="1">
+                              <a:latin typeface="Cambria Math"/>
+                            </a:rPr>
                             <m:t>𝑚</m:t>
                           </m:r>
                         </m:e>
@@ -4518,7 +4583,9 @@
                       <m:sSub>
                         <m:sSubPr>
                           <m:ctrlPr>
-                            <a:rPr lang="en-US" sz="1400" i="1"/>
+                            <a:rPr lang="en-US" sz="1400" i="1">
+                              <a:latin typeface="Cambria Math"/>
+                            </a:rPr>
                           </m:ctrlPr>
                         </m:sSubPr>
                         <m:e>
@@ -4526,12 +4593,16 @@
                             <m:accPr>
                               <m:chr m:val="̈"/>
                               <m:ctrlPr>
-                                <a:rPr lang="en-US" sz="1400" i="1"/>
+                                <a:rPr lang="en-US" sz="1400" i="1">
+                                  <a:latin typeface="Cambria Math"/>
+                                </a:rPr>
                               </m:ctrlPr>
                             </m:accPr>
                             <m:e>
                               <m:r>
-                                <a:rPr lang="en-US" sz="1400" i="1"/>
+                                <a:rPr lang="en-US" sz="1400" i="1">
+                                  <a:latin typeface="Cambria Math"/>
+                                </a:rPr>
                                 <m:t>𝑥</m:t>
                               </m:r>
                             </m:e>
@@ -4547,18 +4618,24 @@
                         </m:sub>
                       </m:sSub>
                       <m:r>
-                        <a:rPr lang="en-US" sz="1400" i="1"/>
+                        <a:rPr lang="en-US" sz="1400" i="1">
+                          <a:latin typeface="Cambria Math"/>
+                        </a:rPr>
                         <m:t>+</m:t>
                       </m:r>
                       <m:sSub>
                         <m:sSubPr>
                           <m:ctrlPr>
-                            <a:rPr lang="en-US" sz="1400" i="1"/>
+                            <a:rPr lang="en-US" sz="1400" i="1">
+                              <a:latin typeface="Cambria Math"/>
+                            </a:rPr>
                           </m:ctrlPr>
                         </m:sSubPr>
                         <m:e>
                           <m:r>
-                            <a:rPr lang="en-US" sz="1400" i="1"/>
+                            <a:rPr lang="en-US" sz="1400" i="1">
+                              <a:latin typeface="Cambria Math"/>
+                            </a:rPr>
                             <m:t>𝑘</m:t>
                           </m:r>
                         </m:e>
@@ -4574,19 +4651,25 @@
                       <m:d>
                         <m:dPr>
                           <m:ctrlPr>
-                            <a:rPr lang="en-US" sz="1400" i="1"/>
+                            <a:rPr lang="en-US" sz="1400" i="1">
+                              <a:latin typeface="Cambria Math"/>
+                            </a:rPr>
                           </m:ctrlPr>
                         </m:dPr>
                         <m:e>
                           <m:sSub>
                             <m:sSubPr>
                               <m:ctrlPr>
-                                <a:rPr lang="en-US" sz="1400" i="1"/>
+                                <a:rPr lang="en-US" sz="1400" i="1">
+                                  <a:latin typeface="Cambria Math"/>
+                                </a:rPr>
                               </m:ctrlPr>
                             </m:sSubPr>
                             <m:e>
                               <m:r>
-                                <a:rPr lang="en-US" sz="1400" i="1"/>
+                                <a:rPr lang="en-US" sz="1400" i="1">
+                                  <a:latin typeface="Cambria Math"/>
+                                </a:rPr>
                                 <m:t>𝑥</m:t>
                               </m:r>
                             </m:e>
@@ -4600,18 +4683,24 @@
                             </m:sub>
                           </m:sSub>
                           <m:r>
-                            <a:rPr lang="en-US" sz="1400" i="1"/>
+                            <a:rPr lang="en-US" sz="1400" i="1">
+                              <a:latin typeface="Cambria Math"/>
+                            </a:rPr>
                             <m:t>+∆−</m:t>
                           </m:r>
                           <m:sSub>
                             <m:sSubPr>
                               <m:ctrlPr>
-                                <a:rPr lang="en-US" sz="1400" i="1"/>
+                                <a:rPr lang="en-US" sz="1400" i="1">
+                                  <a:latin typeface="Cambria Math"/>
+                                </a:rPr>
                               </m:ctrlPr>
                             </m:sSubPr>
                             <m:e>
                               <m:r>
-                                <a:rPr lang="en-US" sz="1400" i="1"/>
+                                <a:rPr lang="en-US" sz="1400" i="1">
+                                  <a:latin typeface="Cambria Math"/>
+                                </a:rPr>
                                 <m:t>𝑥</m:t>
                               </m:r>
                             </m:e>
@@ -4627,18 +4716,24 @@
                         </m:e>
                       </m:d>
                       <m:r>
-                        <a:rPr lang="en-US" sz="1400" i="1"/>
+                        <a:rPr lang="en-US" sz="1400" i="1">
+                          <a:latin typeface="Cambria Math"/>
+                        </a:rPr>
                         <m:t>+</m:t>
                       </m:r>
                       <m:sSub>
                         <m:sSubPr>
                           <m:ctrlPr>
-                            <a:rPr lang="en-US" sz="1400" i="1"/>
+                            <a:rPr lang="en-US" sz="1400" i="1">
+                              <a:latin typeface="Cambria Math"/>
+                            </a:rPr>
                           </m:ctrlPr>
                         </m:sSubPr>
                         <m:e>
                           <m:r>
-                            <a:rPr lang="en-US" sz="1400" i="1"/>
+                            <a:rPr lang="en-US" sz="1400" i="1">
+                              <a:latin typeface="Cambria Math"/>
+                            </a:rPr>
                             <m:t>𝑐</m:t>
                           </m:r>
                         </m:e>
@@ -4654,14 +4749,18 @@
                       <m:d>
                         <m:dPr>
                           <m:ctrlPr>
-                            <a:rPr lang="en-US" sz="1400" i="1"/>
+                            <a:rPr lang="en-US" sz="1400" i="1">
+                              <a:latin typeface="Cambria Math"/>
+                            </a:rPr>
                           </m:ctrlPr>
                         </m:dPr>
                         <m:e>
                           <m:sSub>
                             <m:sSubPr>
                               <m:ctrlPr>
-                                <a:rPr lang="en-US" sz="1400" i="1"/>
+                                <a:rPr lang="en-US" sz="1400" i="1">
+                                  <a:latin typeface="Cambria Math"/>
+                                </a:rPr>
                               </m:ctrlPr>
                             </m:sSubPr>
                             <m:e>
@@ -4669,12 +4768,16 @@
                                 <m:accPr>
                                   <m:chr m:val="̇"/>
                                   <m:ctrlPr>
-                                    <a:rPr lang="en-US" sz="1400" i="1"/>
+                                    <a:rPr lang="en-US" sz="1400" i="1">
+                                      <a:latin typeface="Cambria Math"/>
+                                    </a:rPr>
                                   </m:ctrlPr>
                                 </m:accPr>
                                 <m:e>
                                   <m:r>
-                                    <a:rPr lang="en-US" sz="1400" i="1"/>
+                                    <a:rPr lang="en-US" sz="1400" i="1">
+                                      <a:latin typeface="Cambria Math"/>
+                                    </a:rPr>
                                     <m:t>𝑥</m:t>
                                   </m:r>
                                 </m:e>
@@ -4690,31 +4793,41 @@
                             </m:sub>
                           </m:sSub>
                           <m:r>
-                            <a:rPr lang="en-US" sz="1400" i="1"/>
+                            <a:rPr lang="en-US" sz="1400" i="1">
+                              <a:latin typeface="Cambria Math"/>
+                            </a:rPr>
                             <m:t>+</m:t>
                           </m:r>
                           <m:acc>
                             <m:accPr>
                               <m:chr m:val="̇"/>
                               <m:ctrlPr>
-                                <a:rPr lang="en-US" sz="1400" i="1"/>
+                                <a:rPr lang="en-US" sz="1400" i="1">
+                                  <a:latin typeface="Cambria Math"/>
+                                </a:rPr>
                               </m:ctrlPr>
                             </m:accPr>
                             <m:e>
                               <m:r>
-                                <a:rPr lang="en-US" sz="1400" i="1"/>
+                                <a:rPr lang="en-US" sz="1400" i="1">
+                                  <a:latin typeface="Cambria Math"/>
+                                </a:rPr>
                                 <m:t>∆</m:t>
                               </m:r>
                             </m:e>
                           </m:acc>
                           <m:r>
-                            <a:rPr lang="en-US" sz="1400" i="1"/>
+                            <a:rPr lang="en-US" sz="1400" i="1">
+                              <a:latin typeface="Cambria Math"/>
+                            </a:rPr>
                             <m:t>−</m:t>
                           </m:r>
                           <m:sSub>
                             <m:sSubPr>
                               <m:ctrlPr>
-                                <a:rPr lang="en-US" sz="1400" i="1"/>
+                                <a:rPr lang="en-US" sz="1400" i="1">
+                                  <a:latin typeface="Cambria Math"/>
+                                </a:rPr>
                               </m:ctrlPr>
                             </m:sSubPr>
                             <m:e>
@@ -4722,12 +4835,16 @@
                                 <m:accPr>
                                   <m:chr m:val="̇"/>
                                   <m:ctrlPr>
-                                    <a:rPr lang="en-US" sz="1400" i="1"/>
+                                    <a:rPr lang="en-US" sz="1400" i="1">
+                                      <a:latin typeface="Cambria Math"/>
+                                    </a:rPr>
                                   </m:ctrlPr>
                                 </m:accPr>
                                 <m:e>
                                   <m:r>
-                                    <a:rPr lang="en-US" sz="1400" i="1"/>
+                                    <a:rPr lang="en-US" sz="1400" i="1">
+                                      <a:latin typeface="Cambria Math"/>
+                                    </a:rPr>
                                     <m:t>𝑥</m:t>
                                   </m:r>
                                 </m:e>
@@ -4745,74 +4862,25 @@
                         </m:e>
                       </m:d>
                       <m:r>
-                        <a:rPr lang="en-US" sz="1400" i="1"/>
+                        <a:rPr lang="en-US" sz="1400" i="1">
+                          <a:latin typeface="Cambria Math"/>
+                        </a:rPr>
                         <m:t>+</m:t>
                       </m:r>
                       <m:sSub>
                         <m:sSubPr>
                           <m:ctrlPr>
-                            <a:rPr lang="en-US" sz="1400" i="1"/>
+                            <a:rPr lang="en-US" sz="1400" i="1">
+                              <a:latin typeface="Cambria Math"/>
+                            </a:rPr>
                           </m:ctrlPr>
                         </m:sSubPr>
                         <m:e>
                           <m:r>
-                            <a:rPr lang="en-US" sz="1400" i="1"/>
+                            <a:rPr lang="en-US" sz="1400" i="1">
+                              <a:latin typeface="Cambria Math"/>
+                            </a:rPr>
                             <m:t>𝑘</m:t>
-                          </m:r>
-                        </m:e>
-                        <m:sub>
-                          <m:r>
-                            <a:rPr lang="en-US" sz="1400" b="0" i="1" smtClean="0">
-                              <a:latin typeface="Cambria Math"/>
-                            </a:rPr>
-                            <m:t>𝐵</m:t>
-                          </m:r>
-                        </m:sub>
-                      </m:sSub>
-                      <m:d>
-                        <m:dPr>
-                          <m:ctrlPr>
-                            <a:rPr lang="en-US" sz="1400" i="1"/>
-                          </m:ctrlPr>
-                        </m:dPr>
-                        <m:e>
-                          <m:sSub>
-                            <m:sSubPr>
-                              <m:ctrlPr>
-                                <a:rPr lang="en-US" sz="1400" i="1"/>
-                              </m:ctrlPr>
-                            </m:sSubPr>
-                            <m:e>
-                              <m:r>
-                                <a:rPr lang="en-US" sz="1400" i="1"/>
-                                <m:t>𝑥</m:t>
-                              </m:r>
-                            </m:e>
-                            <m:sub>
-                              <m:r>
-                                <a:rPr lang="en-US" sz="1400" b="0" i="1" smtClean="0">
-                                  <a:latin typeface="Cambria Math"/>
-                                </a:rPr>
-                                <m:t>𝐵</m:t>
-                              </m:r>
-                            </m:sub>
-                          </m:sSub>
-                        </m:e>
-                      </m:d>
-                      <m:r>
-                        <a:rPr lang="en-US" sz="1400" i="1"/>
-                        <m:t>+</m:t>
-                      </m:r>
-                      <m:sSub>
-                        <m:sSubPr>
-                          <m:ctrlPr>
-                            <a:rPr lang="en-US" sz="1400" i="1"/>
-                          </m:ctrlPr>
-                        </m:sSubPr>
-                        <m:e>
-                          <m:r>
-                            <a:rPr lang="en-US" sz="1400" i="1"/>
-                            <m:t>𝑐</m:t>
                           </m:r>
                         </m:e>
                         <m:sub>
@@ -4836,7 +4904,76 @@
                           <m:sSub>
                             <m:sSubPr>
                               <m:ctrlPr>
-                                <a:rPr lang="en-US" sz="1400" i="1"/>
+                                <a:rPr lang="en-US" sz="1400" i="1">
+                                  <a:latin typeface="Cambria Math"/>
+                                </a:rPr>
+                              </m:ctrlPr>
+                            </m:sSubPr>
+                            <m:e>
+                              <m:r>
+                                <a:rPr lang="en-US" sz="1400" i="1">
+                                  <a:latin typeface="Cambria Math"/>
+                                </a:rPr>
+                                <m:t>𝑥</m:t>
+                              </m:r>
+                            </m:e>
+                            <m:sub>
+                              <m:r>
+                                <a:rPr lang="en-US" sz="1400" b="0" i="1" smtClean="0">
+                                  <a:latin typeface="Cambria Math"/>
+                                </a:rPr>
+                                <m:t>𝐵</m:t>
+                              </m:r>
+                            </m:sub>
+                          </m:sSub>
+                        </m:e>
+                      </m:d>
+                      <m:r>
+                        <a:rPr lang="en-US" sz="1400" i="1">
+                          <a:latin typeface="Cambria Math"/>
+                        </a:rPr>
+                        <m:t>+</m:t>
+                      </m:r>
+                      <m:sSub>
+                        <m:sSubPr>
+                          <m:ctrlPr>
+                            <a:rPr lang="en-US" sz="1400" i="1">
+                              <a:latin typeface="Cambria Math"/>
+                            </a:rPr>
+                          </m:ctrlPr>
+                        </m:sSubPr>
+                        <m:e>
+                          <m:r>
+                            <a:rPr lang="en-US" sz="1400" i="1">
+                              <a:latin typeface="Cambria Math"/>
+                            </a:rPr>
+                            <m:t>𝑐</m:t>
+                          </m:r>
+                        </m:e>
+                        <m:sub>
+                          <m:r>
+                            <a:rPr lang="en-US" sz="1400" b="0" i="1" smtClean="0">
+                              <a:latin typeface="Cambria Math"/>
+                            </a:rPr>
+                            <m:t>𝐵</m:t>
+                          </m:r>
+                        </m:sub>
+                      </m:sSub>
+                      <m:d>
+                        <m:dPr>
+                          <m:ctrlPr>
+                            <a:rPr lang="en-US" sz="1400" i="1">
+                              <a:latin typeface="Cambria Math"/>
+                            </a:rPr>
+                          </m:ctrlPr>
+                        </m:dPr>
+                        <m:e>
+                          <m:sSub>
+                            <m:sSubPr>
+                              <m:ctrlPr>
+                                <a:rPr lang="en-US" sz="1400" i="1">
+                                  <a:latin typeface="Cambria Math"/>
+                                </a:rPr>
                               </m:ctrlPr>
                             </m:sSubPr>
                             <m:e>
@@ -4844,12 +4981,16 @@
                                 <m:accPr>
                                   <m:chr m:val="̇"/>
                                   <m:ctrlPr>
-                                    <a:rPr lang="en-US" sz="1400" i="1"/>
+                                    <a:rPr lang="en-US" sz="1400" i="1">
+                                      <a:latin typeface="Cambria Math"/>
+                                    </a:rPr>
                                   </m:ctrlPr>
                                 </m:accPr>
                                 <m:e>
                                   <m:r>
-                                    <a:rPr lang="en-US" sz="1400" i="1"/>
+                                    <a:rPr lang="en-US" sz="1400" i="1">
+                                      <a:latin typeface="Cambria Math"/>
+                                    </a:rPr>
                                     <m:t>𝑥</m:t>
                                   </m:r>
                                 </m:e>
@@ -4867,7 +5008,9 @@
                         </m:e>
                       </m:d>
                       <m:r>
-                        <a:rPr lang="en-US" sz="1400" i="1"/>
+                        <a:rPr lang="en-US" sz="1400" i="1">
+                          <a:latin typeface="Cambria Math"/>
+                        </a:rPr>
                         <m:t>=0</m:t>
                       </m:r>
                     </m:oMath>
@@ -7164,7 +7307,6 @@
                 </a:endParaRPr>
               </a:p>
               <a:p>
-                <a:pPr/>
                 <a:endParaRPr lang="en-US" sz="1400" dirty="0">
                   <a:ea typeface="Cambria Math"/>
                 </a:endParaRPr>
@@ -8639,7 +8781,6 @@
                 </a:endParaRPr>
               </a:p>
               <a:p>
-                <a:pPr/>
                 <a:endParaRPr lang="en-US" sz="1400" b="0" dirty="0" smtClean="0">
                   <a:ea typeface="Cambria Math"/>
                 </a:endParaRPr>
@@ -8654,7 +8795,7 @@
             </p:txBody>
           </p:sp>
         </mc:Choice>
-        <mc:Fallback>
+        <mc:Fallback xmlns="">
           <p:sp>
             <p:nvSpPr>
               <p:cNvPr id="73" name="TextBox 72"/>
@@ -8703,6 +8844,842 @@
   <p:clrMapOvr>
     <a:masterClrMapping/>
   </p:clrMapOvr>
+  <p:timing>
+    <p:tnLst>
+      <p:par>
+        <p:cTn id="1" dur="indefinite" restart="never" nodeType="tmRoot"/>
+      </p:par>
+    </p:tnLst>
+  </p:timing>
+</p:sld>
+</file>
+
+<file path=ppt/slides/slide2.xml><?xml version="1.0" encoding="utf-8"?>
+<p:sld xmlns:a="http://schemas.openxmlformats.org/drawingml/2006/main" xmlns:r="http://schemas.openxmlformats.org/officeDocument/2006/relationships" xmlns:p="http://schemas.openxmlformats.org/presentationml/2006/main">
+  <p:cSld>
+    <p:spTree>
+      <p:nvGrpSpPr>
+        <p:cNvPr id="1" name=""/>
+        <p:cNvGrpSpPr/>
+        <p:nvPr/>
+      </p:nvGrpSpPr>
+      <p:grpSpPr>
+        <a:xfrm>
+          <a:off x="0" y="0"/>
+          <a:ext cx="0" cy="0"/>
+          <a:chOff x="0" y="0"/>
+          <a:chExt cx="0" cy="0"/>
+        </a:xfrm>
+      </p:grpSpPr>
+      <p:sp>
+        <p:nvSpPr>
+          <p:cNvPr id="5" name="Rectangle 4"/>
+          <p:cNvSpPr/>
+          <p:nvPr/>
+        </p:nvSpPr>
+        <p:spPr>
+          <a:xfrm>
+            <a:off x="3973475" y="1196720"/>
+            <a:ext cx="1197050" cy="685800"/>
+          </a:xfrm>
+          <a:prstGeom prst="rect">
+            <a:avLst/>
+          </a:prstGeom>
+          <a:pattFill prst="wdUpDiag">
+            <a:fgClr>
+              <a:schemeClr val="tx1"/>
+            </a:fgClr>
+            <a:bgClr>
+              <a:schemeClr val="bg1"/>
+            </a:bgClr>
+          </a:pattFill>
+          <a:ln>
+            <a:solidFill>
+              <a:schemeClr val="tx1"/>
+            </a:solidFill>
+          </a:ln>
+        </p:spPr>
+        <p:style>
+          <a:lnRef idx="2">
+            <a:schemeClr val="accent1">
+              <a:shade val="50000"/>
+            </a:schemeClr>
+          </a:lnRef>
+          <a:fillRef idx="1">
+            <a:schemeClr val="accent1"/>
+          </a:fillRef>
+          <a:effectRef idx="0">
+            <a:schemeClr val="accent1"/>
+          </a:effectRef>
+          <a:fontRef idx="minor">
+            <a:schemeClr val="lt1"/>
+          </a:fontRef>
+        </p:style>
+        <p:txBody>
+          <a:bodyPr rtlCol="0" anchor="ctr"/>
+          <a:lstStyle/>
+          <a:p>
+            <a:pPr algn="ctr"/>
+            <a:r>
+              <a:rPr lang="en-US" sz="2400" b="1" dirty="0" smtClean="0">
+                <a:ln w="19050">
+                  <a:solidFill>
+                    <a:schemeClr val="tx1"/>
+                  </a:solidFill>
+                </a:ln>
+                <a:solidFill>
+                  <a:schemeClr val="bg1"/>
+                </a:solidFill>
+              </a:rPr>
+              <a:t>Vehicle</a:t>
+            </a:r>
+            <a:endParaRPr lang="en-US" sz="2400" b="1" dirty="0">
+              <a:ln w="19050">
+                <a:solidFill>
+                  <a:schemeClr val="tx1"/>
+                </a:solidFill>
+              </a:ln>
+              <a:solidFill>
+                <a:schemeClr val="bg1"/>
+              </a:solidFill>
+            </a:endParaRPr>
+          </a:p>
+        </p:txBody>
+      </p:sp>
+      <p:sp>
+        <p:nvSpPr>
+          <p:cNvPr id="6" name="Rectangle 5"/>
+          <p:cNvSpPr/>
+          <p:nvPr/>
+        </p:nvSpPr>
+        <p:spPr>
+          <a:xfrm>
+            <a:off x="1828800" y="2796920"/>
+            <a:ext cx="5486400" cy="251080"/>
+          </a:xfrm>
+          <a:prstGeom prst="rect">
+            <a:avLst/>
+          </a:prstGeom>
+          <a:pattFill prst="wdUpDiag">
+            <a:fgClr>
+              <a:schemeClr val="tx1"/>
+            </a:fgClr>
+            <a:bgClr>
+              <a:schemeClr val="bg1"/>
+            </a:bgClr>
+          </a:pattFill>
+          <a:ln>
+            <a:solidFill>
+              <a:schemeClr val="tx1"/>
+            </a:solidFill>
+          </a:ln>
+        </p:spPr>
+        <p:style>
+          <a:lnRef idx="2">
+            <a:schemeClr val="accent1">
+              <a:shade val="50000"/>
+            </a:schemeClr>
+          </a:lnRef>
+          <a:fillRef idx="1">
+            <a:schemeClr val="accent1"/>
+          </a:fillRef>
+          <a:effectRef idx="0">
+            <a:schemeClr val="accent1"/>
+          </a:effectRef>
+          <a:fontRef idx="minor">
+            <a:schemeClr val="lt1"/>
+          </a:fontRef>
+        </p:style>
+        <p:txBody>
+          <a:bodyPr rtlCol="0" anchor="ctr"/>
+          <a:lstStyle/>
+          <a:p>
+            <a:pPr algn="ctr"/>
+            <a:endParaRPr lang="en-US" sz="2800" b="1" dirty="0">
+              <a:ln w="19050">
+                <a:solidFill>
+                  <a:schemeClr val="tx1"/>
+                </a:solidFill>
+              </a:ln>
+              <a:solidFill>
+                <a:schemeClr val="bg1"/>
+              </a:solidFill>
+            </a:endParaRPr>
+          </a:p>
+        </p:txBody>
+      </p:sp>
+      <p:cxnSp>
+        <p:nvCxnSpPr>
+          <p:cNvPr id="7" name="Straight Connector 6"/>
+          <p:cNvCxnSpPr/>
+          <p:nvPr/>
+        </p:nvCxnSpPr>
+        <p:spPr>
+          <a:xfrm>
+            <a:off x="3890440" y="2487040"/>
+            <a:ext cx="1371600" cy="0"/>
+          </a:xfrm>
+          <a:prstGeom prst="line">
+            <a:avLst/>
+          </a:prstGeom>
+          <a:ln w="28575">
+            <a:solidFill>
+              <a:schemeClr val="tx1"/>
+            </a:solidFill>
+          </a:ln>
+        </p:spPr>
+        <p:style>
+          <a:lnRef idx="1">
+            <a:schemeClr val="accent1"/>
+          </a:lnRef>
+          <a:fillRef idx="0">
+            <a:schemeClr val="accent1"/>
+          </a:fillRef>
+          <a:effectRef idx="0">
+            <a:schemeClr val="accent1"/>
+          </a:effectRef>
+          <a:fontRef idx="minor">
+            <a:schemeClr val="tx1"/>
+          </a:fontRef>
+        </p:style>
+      </p:cxnSp>
+      <p:cxnSp>
+        <p:nvCxnSpPr>
+          <p:cNvPr id="8" name="Straight Connector 7"/>
+          <p:cNvCxnSpPr/>
+          <p:nvPr/>
+        </p:nvCxnSpPr>
+        <p:spPr>
+          <a:xfrm>
+            <a:off x="4504280" y="2482595"/>
+            <a:ext cx="0" cy="310896"/>
+          </a:xfrm>
+          <a:prstGeom prst="line">
+            <a:avLst/>
+          </a:prstGeom>
+          <a:ln w="15875">
+            <a:solidFill>
+              <a:schemeClr val="tx1"/>
+            </a:solidFill>
+            <a:headEnd type="stealth" w="med" len="lg"/>
+            <a:tailEnd type="stealth" w="med" len="lg"/>
+          </a:ln>
+        </p:spPr>
+        <p:style>
+          <a:lnRef idx="1">
+            <a:schemeClr val="accent1"/>
+          </a:lnRef>
+          <a:fillRef idx="0">
+            <a:schemeClr val="accent1"/>
+          </a:fillRef>
+          <a:effectRef idx="0">
+            <a:schemeClr val="accent1"/>
+          </a:effectRef>
+          <a:fontRef idx="minor">
+            <a:schemeClr val="tx1"/>
+          </a:fontRef>
+        </p:style>
+      </p:cxnSp>
+      <p:sp>
+        <p:nvSpPr>
+          <p:cNvPr id="9" name="TextBox 8"/>
+          <p:cNvSpPr txBox="1"/>
+          <p:nvPr/>
+        </p:nvSpPr>
+        <p:spPr>
+          <a:xfrm>
+            <a:off x="4466180" y="2485714"/>
+            <a:ext cx="495300" cy="307777"/>
+          </a:xfrm>
+          <a:prstGeom prst="rect">
+            <a:avLst/>
+          </a:prstGeom>
+          <a:noFill/>
+        </p:spPr>
+        <p:txBody>
+          <a:bodyPr wrap="square" rtlCol="0">
+            <a:spAutoFit/>
+          </a:bodyPr>
+          <a:lstStyle/>
+          <a:p>
+            <a:r>
+              <a:rPr lang="en-US" sz="1400" dirty="0" smtClean="0">
+                <a:sym typeface="Symbol"/>
+              </a:rPr>
+              <a:t>(t)</a:t>
+            </a:r>
+            <a:endParaRPr lang="en-US" sz="1400" dirty="0"/>
+          </a:p>
+        </p:txBody>
+      </p:sp>
+      <p:grpSp>
+        <p:nvGrpSpPr>
+          <p:cNvPr id="10" name="Group 9"/>
+          <p:cNvGrpSpPr/>
+          <p:nvPr/>
+        </p:nvGrpSpPr>
+        <p:grpSpPr>
+          <a:xfrm>
+            <a:off x="4164149" y="1882519"/>
+            <a:ext cx="824182" cy="610111"/>
+            <a:chOff x="7146973" y="1142999"/>
+            <a:chExt cx="824182" cy="610111"/>
+          </a:xfrm>
+        </p:grpSpPr>
+        <p:grpSp>
+          <p:nvGrpSpPr>
+            <p:cNvPr id="28" name="Group 27"/>
+            <p:cNvGrpSpPr/>
+            <p:nvPr/>
+          </p:nvGrpSpPr>
+          <p:grpSpPr>
+            <a:xfrm>
+              <a:off x="7649845" y="1143000"/>
+              <a:ext cx="321310" cy="596900"/>
+              <a:chOff x="7031990" y="914400"/>
+              <a:chExt cx="533400" cy="876300"/>
+            </a:xfrm>
+          </p:grpSpPr>
+          <p:cxnSp>
+            <p:nvCxnSpPr>
+              <p:cNvPr id="30" name="Straight Connector 29"/>
+              <p:cNvCxnSpPr/>
+              <p:nvPr/>
+            </p:nvCxnSpPr>
+            <p:spPr>
+              <a:xfrm>
+                <a:off x="7298690" y="914400"/>
+                <a:ext cx="0" cy="381000"/>
+              </a:xfrm>
+              <a:prstGeom prst="line">
+                <a:avLst/>
+              </a:prstGeom>
+              <a:ln w="12700">
+                <a:solidFill>
+                  <a:schemeClr val="tx1"/>
+                </a:solidFill>
+              </a:ln>
+            </p:spPr>
+            <p:style>
+              <a:lnRef idx="1">
+                <a:schemeClr val="accent1"/>
+              </a:lnRef>
+              <a:fillRef idx="0">
+                <a:schemeClr val="accent1"/>
+              </a:fillRef>
+              <a:effectRef idx="0">
+                <a:schemeClr val="accent1"/>
+              </a:effectRef>
+              <a:fontRef idx="minor">
+                <a:schemeClr val="tx1"/>
+              </a:fontRef>
+            </p:style>
+          </p:cxnSp>
+          <p:grpSp>
+            <p:nvGrpSpPr>
+              <p:cNvPr id="31" name="Group 30"/>
+              <p:cNvGrpSpPr/>
+              <p:nvPr/>
+            </p:nvGrpSpPr>
+            <p:grpSpPr>
+              <a:xfrm>
+                <a:off x="7031990" y="1295400"/>
+                <a:ext cx="533400" cy="228600"/>
+                <a:chOff x="2819400" y="762000"/>
+                <a:chExt cx="533400" cy="228600"/>
+              </a:xfrm>
+            </p:grpSpPr>
+            <p:cxnSp>
+              <p:nvCxnSpPr>
+                <p:cNvPr id="34" name="Straight Connector 33"/>
+                <p:cNvCxnSpPr/>
+                <p:nvPr/>
+              </p:nvCxnSpPr>
+              <p:spPr>
+                <a:xfrm>
+                  <a:off x="2819400" y="762000"/>
+                  <a:ext cx="533400" cy="0"/>
+                </a:xfrm>
+                <a:prstGeom prst="line">
+                  <a:avLst/>
+                </a:prstGeom>
+                <a:ln w="12700">
+                  <a:solidFill>
+                    <a:schemeClr val="tx1"/>
+                  </a:solidFill>
+                </a:ln>
+              </p:spPr>
+              <p:style>
+                <a:lnRef idx="1">
+                  <a:schemeClr val="accent1"/>
+                </a:lnRef>
+                <a:fillRef idx="0">
+                  <a:schemeClr val="accent1"/>
+                </a:fillRef>
+                <a:effectRef idx="0">
+                  <a:schemeClr val="accent1"/>
+                </a:effectRef>
+                <a:fontRef idx="minor">
+                  <a:schemeClr val="tx1"/>
+                </a:fontRef>
+              </p:style>
+            </p:cxnSp>
+            <p:cxnSp>
+              <p:nvCxnSpPr>
+                <p:cNvPr id="35" name="Straight Connector 34"/>
+                <p:cNvCxnSpPr/>
+                <p:nvPr/>
+              </p:nvCxnSpPr>
+              <p:spPr>
+                <a:xfrm>
+                  <a:off x="2819400" y="762000"/>
+                  <a:ext cx="0" cy="228600"/>
+                </a:xfrm>
+                <a:prstGeom prst="line">
+                  <a:avLst/>
+                </a:prstGeom>
+                <a:ln w="12700">
+                  <a:solidFill>
+                    <a:schemeClr val="tx1"/>
+                  </a:solidFill>
+                </a:ln>
+              </p:spPr>
+              <p:style>
+                <a:lnRef idx="1">
+                  <a:schemeClr val="accent1"/>
+                </a:lnRef>
+                <a:fillRef idx="0">
+                  <a:schemeClr val="accent1"/>
+                </a:fillRef>
+                <a:effectRef idx="0">
+                  <a:schemeClr val="accent1"/>
+                </a:effectRef>
+                <a:fontRef idx="minor">
+                  <a:schemeClr val="tx1"/>
+                </a:fontRef>
+              </p:style>
+            </p:cxnSp>
+            <p:cxnSp>
+              <p:nvCxnSpPr>
+                <p:cNvPr id="36" name="Straight Connector 35"/>
+                <p:cNvCxnSpPr/>
+                <p:nvPr/>
+              </p:nvCxnSpPr>
+              <p:spPr>
+                <a:xfrm>
+                  <a:off x="3352800" y="762000"/>
+                  <a:ext cx="0" cy="228600"/>
+                </a:xfrm>
+                <a:prstGeom prst="line">
+                  <a:avLst/>
+                </a:prstGeom>
+                <a:ln w="12700">
+                  <a:solidFill>
+                    <a:schemeClr val="tx1"/>
+                  </a:solidFill>
+                </a:ln>
+              </p:spPr>
+              <p:style>
+                <a:lnRef idx="1">
+                  <a:schemeClr val="accent1"/>
+                </a:lnRef>
+                <a:fillRef idx="0">
+                  <a:schemeClr val="accent1"/>
+                </a:fillRef>
+                <a:effectRef idx="0">
+                  <a:schemeClr val="accent1"/>
+                </a:effectRef>
+                <a:fontRef idx="minor">
+                  <a:schemeClr val="tx1"/>
+                </a:fontRef>
+              </p:style>
+            </p:cxnSp>
+          </p:grpSp>
+          <p:cxnSp>
+            <p:nvCxnSpPr>
+              <p:cNvPr id="32" name="Straight Connector 31"/>
+              <p:cNvCxnSpPr/>
+              <p:nvPr/>
+            </p:nvCxnSpPr>
+            <p:spPr>
+              <a:xfrm>
+                <a:off x="7146290" y="1409700"/>
+                <a:ext cx="304800" cy="0"/>
+              </a:xfrm>
+              <a:prstGeom prst="line">
+                <a:avLst/>
+              </a:prstGeom>
+              <a:ln w="12700">
+                <a:solidFill>
+                  <a:schemeClr val="tx1"/>
+                </a:solidFill>
+              </a:ln>
+            </p:spPr>
+            <p:style>
+              <a:lnRef idx="1">
+                <a:schemeClr val="accent1"/>
+              </a:lnRef>
+              <a:fillRef idx="0">
+                <a:schemeClr val="accent1"/>
+              </a:fillRef>
+              <a:effectRef idx="0">
+                <a:schemeClr val="accent1"/>
+              </a:effectRef>
+              <a:fontRef idx="minor">
+                <a:schemeClr val="tx1"/>
+              </a:fontRef>
+            </p:style>
+          </p:cxnSp>
+          <p:cxnSp>
+            <p:nvCxnSpPr>
+              <p:cNvPr id="33" name="Straight Connector 32"/>
+              <p:cNvCxnSpPr/>
+              <p:nvPr/>
+            </p:nvCxnSpPr>
+            <p:spPr>
+              <a:xfrm>
+                <a:off x="7298690" y="1409700"/>
+                <a:ext cx="0" cy="381000"/>
+              </a:xfrm>
+              <a:prstGeom prst="line">
+                <a:avLst/>
+              </a:prstGeom>
+              <a:ln w="12700">
+                <a:solidFill>
+                  <a:schemeClr val="tx1"/>
+                </a:solidFill>
+              </a:ln>
+            </p:spPr>
+            <p:style>
+              <a:lnRef idx="1">
+                <a:schemeClr val="accent1"/>
+              </a:lnRef>
+              <a:fillRef idx="0">
+                <a:schemeClr val="accent1"/>
+              </a:fillRef>
+              <a:effectRef idx="0">
+                <a:schemeClr val="accent1"/>
+              </a:effectRef>
+              <a:fontRef idx="minor">
+                <a:schemeClr val="tx1"/>
+              </a:fontRef>
+            </p:style>
+          </p:cxnSp>
+        </p:grpSp>
+        <p:pic>
+          <p:nvPicPr>
+            <p:cNvPr id="29" name="Picture 2" descr="Image result for spring diagram"/>
+            <p:cNvPicPr>
+              <a:picLocks noChangeAspect="1" noChangeArrowheads="1"/>
+            </p:cNvPicPr>
+            <p:nvPr/>
+          </p:nvPicPr>
+          <p:blipFill rotWithShape="1">
+            <a:blip r:embed="rId2" cstate="print">
+              <a:extLst>
+                <a:ext uri="{28A0092B-C50C-407E-A947-70E740481C1C}">
+                  <a14:useLocalDpi xmlns:a14="http://schemas.microsoft.com/office/drawing/2010/main" val="0"/>
+                </a:ext>
+              </a:extLst>
+            </a:blip>
+            <a:srcRect l="22285" r="25487" b="64250"/>
+            <a:stretch/>
+          </p:blipFill>
+          <p:spPr bwMode="auto">
+            <a:xfrm rot="16200000">
+              <a:off x="7024797" y="1265175"/>
+              <a:ext cx="610111" cy="365760"/>
+            </a:xfrm>
+            <a:prstGeom prst="rect">
+              <a:avLst/>
+            </a:prstGeom>
+            <a:noFill/>
+            <a:extLst>
+              <a:ext uri="{909E8E84-426E-40DD-AFC4-6F175D3DCCD1}">
+                <a14:hiddenFill xmlns:a14="http://schemas.microsoft.com/office/drawing/2010/main">
+                  <a:solidFill>
+                    <a:srgbClr val="FFFFFF"/>
+                  </a:solidFill>
+                </a14:hiddenFill>
+              </a:ext>
+            </a:extLst>
+          </p:spPr>
+        </p:pic>
+      </p:grpSp>
+      <p:sp>
+        <p:nvSpPr>
+          <p:cNvPr id="13" name="TextBox 12"/>
+          <p:cNvSpPr txBox="1"/>
+          <p:nvPr/>
+        </p:nvSpPr>
+        <p:spPr>
+          <a:xfrm>
+            <a:off x="7323680" y="2737794"/>
+            <a:ext cx="677320" cy="369332"/>
+          </a:xfrm>
+          <a:prstGeom prst="rect">
+            <a:avLst/>
+          </a:prstGeom>
+          <a:noFill/>
+        </p:spPr>
+        <p:txBody>
+          <a:bodyPr wrap="square" rtlCol="0">
+            <a:spAutoFit/>
+          </a:bodyPr>
+          <a:lstStyle/>
+          <a:p>
+            <a:r>
+              <a:rPr lang="en-US" dirty="0" err="1" smtClean="0"/>
+              <a:t>u</a:t>
+            </a:r>
+            <a:r>
+              <a:rPr lang="en-US" baseline="-25000" dirty="0" err="1" smtClean="0"/>
+              <a:t>B</a:t>
+            </a:r>
+            <a:endParaRPr lang="en-US" baseline="-25000" dirty="0"/>
+          </a:p>
+        </p:txBody>
+      </p:sp>
+      <p:sp>
+        <p:nvSpPr>
+          <p:cNvPr id="14" name="TextBox 13"/>
+          <p:cNvSpPr txBox="1"/>
+          <p:nvPr/>
+        </p:nvSpPr>
+        <p:spPr>
+          <a:xfrm>
+            <a:off x="5190080" y="1354954"/>
+            <a:ext cx="571500" cy="369332"/>
+          </a:xfrm>
+          <a:prstGeom prst="rect">
+            <a:avLst/>
+          </a:prstGeom>
+          <a:noFill/>
+        </p:spPr>
+        <p:txBody>
+          <a:bodyPr wrap="square" rtlCol="0">
+            <a:spAutoFit/>
+          </a:bodyPr>
+          <a:lstStyle/>
+          <a:p>
+            <a:r>
+              <a:rPr lang="en-US" dirty="0" smtClean="0"/>
+              <a:t>u</a:t>
+            </a:r>
+            <a:r>
+              <a:rPr lang="en-US" baseline="-25000" dirty="0" smtClean="0"/>
+              <a:t>m</a:t>
+            </a:r>
+            <a:endParaRPr lang="en-US" baseline="-25000" dirty="0"/>
+          </a:p>
+        </p:txBody>
+      </p:sp>
+      <p:sp>
+        <p:nvSpPr>
+          <p:cNvPr id="15" name="TextBox 14"/>
+          <p:cNvSpPr txBox="1"/>
+          <p:nvPr/>
+        </p:nvSpPr>
+        <p:spPr>
+          <a:xfrm>
+            <a:off x="3913912" y="1985185"/>
+            <a:ext cx="441348" cy="369332"/>
+          </a:xfrm>
+          <a:prstGeom prst="rect">
+            <a:avLst/>
+          </a:prstGeom>
+          <a:noFill/>
+        </p:spPr>
+        <p:txBody>
+          <a:bodyPr wrap="square" rtlCol="0">
+            <a:spAutoFit/>
+          </a:bodyPr>
+          <a:lstStyle/>
+          <a:p>
+            <a:pPr algn="r"/>
+            <a:r>
+              <a:rPr lang="en-US" dirty="0" err="1" smtClean="0"/>
+              <a:t>k</a:t>
+            </a:r>
+            <a:r>
+              <a:rPr lang="en-US" baseline="-25000" dirty="0" err="1" smtClean="0"/>
+              <a:t>T</a:t>
+            </a:r>
+            <a:endParaRPr lang="en-US" baseline="-25000" dirty="0"/>
+          </a:p>
+        </p:txBody>
+      </p:sp>
+      <p:sp>
+        <p:nvSpPr>
+          <p:cNvPr id="18" name="TextBox 17"/>
+          <p:cNvSpPr txBox="1"/>
+          <p:nvPr/>
+        </p:nvSpPr>
+        <p:spPr>
+          <a:xfrm>
+            <a:off x="4996200" y="1985185"/>
+            <a:ext cx="536780" cy="369332"/>
+          </a:xfrm>
+          <a:prstGeom prst="rect">
+            <a:avLst/>
+          </a:prstGeom>
+          <a:noFill/>
+        </p:spPr>
+        <p:txBody>
+          <a:bodyPr wrap="square" rtlCol="0">
+            <a:spAutoFit/>
+          </a:bodyPr>
+          <a:lstStyle/>
+          <a:p>
+            <a:r>
+              <a:rPr lang="en-US" dirty="0" err="1" smtClean="0"/>
+              <a:t>c</a:t>
+            </a:r>
+            <a:r>
+              <a:rPr lang="en-US" baseline="-25000" dirty="0" err="1" smtClean="0"/>
+              <a:t>T</a:t>
+            </a:r>
+            <a:endParaRPr lang="en-US" baseline="-25000" dirty="0"/>
+          </a:p>
+        </p:txBody>
+      </p:sp>
+      <p:sp>
+        <p:nvSpPr>
+          <p:cNvPr id="37" name="Isosceles Triangle 36"/>
+          <p:cNvSpPr/>
+          <p:nvPr/>
+        </p:nvSpPr>
+        <p:spPr>
+          <a:xfrm>
+            <a:off x="1781175" y="3048000"/>
+            <a:ext cx="228600" cy="228600"/>
+          </a:xfrm>
+          <a:prstGeom prst="triangle">
+            <a:avLst/>
+          </a:prstGeom>
+          <a:solidFill>
+            <a:schemeClr val="tx1">
+              <a:lumMod val="50000"/>
+              <a:lumOff val="50000"/>
+            </a:schemeClr>
+          </a:solidFill>
+          <a:ln>
+            <a:solidFill>
+              <a:schemeClr val="tx1"/>
+            </a:solidFill>
+          </a:ln>
+        </p:spPr>
+        <p:style>
+          <a:lnRef idx="2">
+            <a:schemeClr val="accent1">
+              <a:shade val="50000"/>
+            </a:schemeClr>
+          </a:lnRef>
+          <a:fillRef idx="1">
+            <a:schemeClr val="accent1"/>
+          </a:fillRef>
+          <a:effectRef idx="0">
+            <a:schemeClr val="accent1"/>
+          </a:effectRef>
+          <a:fontRef idx="minor">
+            <a:schemeClr val="lt1"/>
+          </a:fontRef>
+        </p:style>
+        <p:txBody>
+          <a:bodyPr rtlCol="0" anchor="ctr"/>
+          <a:lstStyle/>
+          <a:p>
+            <a:pPr algn="ctr"/>
+            <a:endParaRPr lang="en-US" sz="3200" b="1">
+              <a:ln w="19050">
+                <a:solidFill>
+                  <a:schemeClr val="tx1"/>
+                </a:solidFill>
+              </a:ln>
+              <a:solidFill>
+                <a:schemeClr val="bg1"/>
+              </a:solidFill>
+            </a:endParaRPr>
+          </a:p>
+        </p:txBody>
+      </p:sp>
+      <p:sp>
+        <p:nvSpPr>
+          <p:cNvPr id="38" name="Oval 37"/>
+          <p:cNvSpPr/>
+          <p:nvPr/>
+        </p:nvSpPr>
+        <p:spPr>
+          <a:xfrm>
+            <a:off x="7086600" y="3048000"/>
+            <a:ext cx="228600" cy="228600"/>
+          </a:xfrm>
+          <a:prstGeom prst="ellipse">
+            <a:avLst/>
+          </a:prstGeom>
+          <a:solidFill>
+            <a:schemeClr val="tx1">
+              <a:lumMod val="50000"/>
+              <a:lumOff val="50000"/>
+            </a:schemeClr>
+          </a:solidFill>
+          <a:ln>
+            <a:solidFill>
+              <a:schemeClr val="tx1"/>
+            </a:solidFill>
+          </a:ln>
+        </p:spPr>
+        <p:style>
+          <a:lnRef idx="2">
+            <a:schemeClr val="accent1">
+              <a:shade val="50000"/>
+            </a:schemeClr>
+          </a:lnRef>
+          <a:fillRef idx="1">
+            <a:schemeClr val="accent1"/>
+          </a:fillRef>
+          <a:effectRef idx="0">
+            <a:schemeClr val="accent1"/>
+          </a:effectRef>
+          <a:fontRef idx="minor">
+            <a:schemeClr val="lt1"/>
+          </a:fontRef>
+        </p:style>
+        <p:txBody>
+          <a:bodyPr rtlCol="0" anchor="ctr"/>
+          <a:lstStyle/>
+          <a:p>
+            <a:pPr algn="ctr"/>
+            <a:endParaRPr lang="en-US" sz="3200" b="1">
+              <a:ln w="19050">
+                <a:solidFill>
+                  <a:schemeClr val="tx1"/>
+                </a:solidFill>
+              </a:ln>
+              <a:solidFill>
+                <a:schemeClr val="bg1"/>
+              </a:solidFill>
+            </a:endParaRPr>
+          </a:p>
+        </p:txBody>
+      </p:sp>
+    </p:spTree>
+    <p:extLst>
+      <p:ext uri="{BB962C8B-B14F-4D97-AF65-F5344CB8AC3E}">
+        <p14:creationId xmlns:p14="http://schemas.microsoft.com/office/powerpoint/2010/main" val="3179170076"/>
+      </p:ext>
+    </p:extLst>
+  </p:cSld>
+  <p:clrMapOvr>
+    <a:masterClrMapping/>
+  </p:clrMapOvr>
+  <p:timing>
+    <p:tnLst>
+      <p:par>
+        <p:cTn id="1" dur="indefinite" restart="never" nodeType="tmRoot"/>
+      </p:par>
+    </p:tnLst>
+  </p:timing>
 </p:sld>
 </file>
 

</xml_diff>

<commit_message>
profile frequency content studies for thesis
</commit_message>
<xml_diff>
--- a/Modeling/Simple/state-space/2DOF_state-space_derivation.pptx
+++ b/Modeling/Simple/state-space/2DOF_state-space_derivation.pptx
@@ -7,6 +7,7 @@
   <p:sldIdLst>
     <p:sldId id="256" r:id="rId2"/>
     <p:sldId id="257" r:id="rId3"/>
+    <p:sldId id="258" r:id="rId4"/>
   </p:sldIdLst>
   <p:sldSz cx="9144000" cy="6858000" type="screen4x3"/>
   <p:notesSz cx="6858000" cy="9144000"/>
@@ -105,6 +106,22 @@
       </a:defRPr>
     </a:lvl9pPr>
   </p:defaultTextStyle>
+  <p:extLst>
+    <p:ext uri="{EFAFB233-063F-42B5-8137-9DF3F51BA10A}">
+      <p15:sldGuideLst xmlns:p15="http://schemas.microsoft.com/office/powerpoint/2012/main">
+        <p15:guide id="1" orient="horz" pos="2160">
+          <p15:clr>
+            <a:srgbClr val="A4A3A4"/>
+          </p15:clr>
+        </p15:guide>
+        <p15:guide id="2" pos="2880">
+          <p15:clr>
+            <a:srgbClr val="A4A3A4"/>
+          </p15:clr>
+        </p15:guide>
+      </p15:sldGuideLst>
+    </p:ext>
+  </p:extLst>
 </p:presentation>
 </file>
 
@@ -146,10 +163,9 @@
           <a:lstStyle/>
           <a:p>
             <a:r>
-              <a:rPr lang="en-US" smtClean="0"/>
+              <a:rPr lang="en-US"/>
               <a:t>Click to edit Master title style</a:t>
             </a:r>
-            <a:endParaRPr lang="en-US"/>
           </a:p>
         </p:txBody>
       </p:sp>
@@ -265,10 +281,9 @@
           </a:lstStyle>
           <a:p>
             <a:r>
-              <a:rPr lang="en-US" smtClean="0"/>
+              <a:rPr lang="en-US"/>
               <a:t>Click to edit Master subtitle style</a:t>
             </a:r>
-            <a:endParaRPr lang="en-US"/>
           </a:p>
         </p:txBody>
       </p:sp>
@@ -289,7 +304,7 @@
           <a:p>
             <a:fld id="{82E01EC4-0BC2-4C83-8522-2DBC2DC9B78F}" type="datetimeFigureOut">
               <a:rPr lang="en-US" smtClean="0"/>
-              <a:t>12/19/2018</a:t>
+              <a:t>2/14/2019</a:t>
             </a:fld>
             <a:endParaRPr lang="en-US"/>
           </a:p>
@@ -383,10 +398,9 @@
           <a:lstStyle/>
           <a:p>
             <a:r>
-              <a:rPr lang="en-US" smtClean="0"/>
+              <a:rPr lang="en-US"/>
               <a:t>Click to edit Master title style</a:t>
             </a:r>
-            <a:endParaRPr lang="en-US"/>
           </a:p>
         </p:txBody>
       </p:sp>
@@ -407,38 +421,37 @@
           <a:p>
             <a:pPr lvl="0"/>
             <a:r>
-              <a:rPr lang="en-US" smtClean="0"/>
+              <a:rPr lang="en-US"/>
               <a:t>Click to edit Master text styles</a:t>
             </a:r>
           </a:p>
           <a:p>
             <a:pPr lvl="1"/>
             <a:r>
-              <a:rPr lang="en-US" smtClean="0"/>
+              <a:rPr lang="en-US"/>
               <a:t>Second level</a:t>
             </a:r>
           </a:p>
           <a:p>
             <a:pPr lvl="2"/>
             <a:r>
-              <a:rPr lang="en-US" smtClean="0"/>
+              <a:rPr lang="en-US"/>
               <a:t>Third level</a:t>
             </a:r>
           </a:p>
           <a:p>
             <a:pPr lvl="3"/>
             <a:r>
-              <a:rPr lang="en-US" smtClean="0"/>
+              <a:rPr lang="en-US"/>
               <a:t>Fourth level</a:t>
             </a:r>
           </a:p>
           <a:p>
             <a:pPr lvl="4"/>
             <a:r>
-              <a:rPr lang="en-US" smtClean="0"/>
+              <a:rPr lang="en-US"/>
               <a:t>Fifth level</a:t>
             </a:r>
-            <a:endParaRPr lang="en-US"/>
           </a:p>
         </p:txBody>
       </p:sp>
@@ -459,7 +472,7 @@
           <a:p>
             <a:fld id="{82E01EC4-0BC2-4C83-8522-2DBC2DC9B78F}" type="datetimeFigureOut">
               <a:rPr lang="en-US" smtClean="0"/>
-              <a:t>12/19/2018</a:t>
+              <a:t>2/14/2019</a:t>
             </a:fld>
             <a:endParaRPr lang="en-US"/>
           </a:p>
@@ -558,10 +571,9 @@
           <a:lstStyle/>
           <a:p>
             <a:r>
-              <a:rPr lang="en-US" smtClean="0"/>
+              <a:rPr lang="en-US"/>
               <a:t>Click to edit Master title style</a:t>
             </a:r>
-            <a:endParaRPr lang="en-US"/>
           </a:p>
         </p:txBody>
       </p:sp>
@@ -587,38 +599,37 @@
           <a:p>
             <a:pPr lvl="0"/>
             <a:r>
-              <a:rPr lang="en-US" smtClean="0"/>
+              <a:rPr lang="en-US"/>
               <a:t>Click to edit Master text styles</a:t>
             </a:r>
           </a:p>
           <a:p>
             <a:pPr lvl="1"/>
             <a:r>
-              <a:rPr lang="en-US" smtClean="0"/>
+              <a:rPr lang="en-US"/>
               <a:t>Second level</a:t>
             </a:r>
           </a:p>
           <a:p>
             <a:pPr lvl="2"/>
             <a:r>
-              <a:rPr lang="en-US" smtClean="0"/>
+              <a:rPr lang="en-US"/>
               <a:t>Third level</a:t>
             </a:r>
           </a:p>
           <a:p>
             <a:pPr lvl="3"/>
             <a:r>
-              <a:rPr lang="en-US" smtClean="0"/>
+              <a:rPr lang="en-US"/>
               <a:t>Fourth level</a:t>
             </a:r>
           </a:p>
           <a:p>
             <a:pPr lvl="4"/>
             <a:r>
-              <a:rPr lang="en-US" smtClean="0"/>
+              <a:rPr lang="en-US"/>
               <a:t>Fifth level</a:t>
             </a:r>
-            <a:endParaRPr lang="en-US"/>
           </a:p>
         </p:txBody>
       </p:sp>
@@ -639,7 +650,7 @@
           <a:p>
             <a:fld id="{82E01EC4-0BC2-4C83-8522-2DBC2DC9B78F}" type="datetimeFigureOut">
               <a:rPr lang="en-US" smtClean="0"/>
-              <a:t>12/19/2018</a:t>
+              <a:t>2/14/2019</a:t>
             </a:fld>
             <a:endParaRPr lang="en-US"/>
           </a:p>
@@ -733,10 +744,9 @@
           <a:lstStyle/>
           <a:p>
             <a:r>
-              <a:rPr lang="en-US" smtClean="0"/>
+              <a:rPr lang="en-US"/>
               <a:t>Click to edit Master title style</a:t>
             </a:r>
-            <a:endParaRPr lang="en-US"/>
           </a:p>
         </p:txBody>
       </p:sp>
@@ -757,38 +767,37 @@
           <a:p>
             <a:pPr lvl="0"/>
             <a:r>
-              <a:rPr lang="en-US" smtClean="0"/>
+              <a:rPr lang="en-US"/>
               <a:t>Click to edit Master text styles</a:t>
             </a:r>
           </a:p>
           <a:p>
             <a:pPr lvl="1"/>
             <a:r>
-              <a:rPr lang="en-US" smtClean="0"/>
+              <a:rPr lang="en-US"/>
               <a:t>Second level</a:t>
             </a:r>
           </a:p>
           <a:p>
             <a:pPr lvl="2"/>
             <a:r>
-              <a:rPr lang="en-US" smtClean="0"/>
+              <a:rPr lang="en-US"/>
               <a:t>Third level</a:t>
             </a:r>
           </a:p>
           <a:p>
             <a:pPr lvl="3"/>
             <a:r>
-              <a:rPr lang="en-US" smtClean="0"/>
+              <a:rPr lang="en-US"/>
               <a:t>Fourth level</a:t>
             </a:r>
           </a:p>
           <a:p>
             <a:pPr lvl="4"/>
             <a:r>
-              <a:rPr lang="en-US" smtClean="0"/>
+              <a:rPr lang="en-US"/>
               <a:t>Fifth level</a:t>
             </a:r>
-            <a:endParaRPr lang="en-US"/>
           </a:p>
         </p:txBody>
       </p:sp>
@@ -809,7 +818,7 @@
           <a:p>
             <a:fld id="{82E01EC4-0BC2-4C83-8522-2DBC2DC9B78F}" type="datetimeFigureOut">
               <a:rPr lang="en-US" smtClean="0"/>
-              <a:t>12/19/2018</a:t>
+              <a:t>2/14/2019</a:t>
             </a:fld>
             <a:endParaRPr lang="en-US"/>
           </a:p>
@@ -912,10 +921,9 @@
           </a:lstStyle>
           <a:p>
             <a:r>
-              <a:rPr lang="en-US" smtClean="0"/>
+              <a:rPr lang="en-US"/>
               <a:t>Click to edit Master title style</a:t>
             </a:r>
-            <a:endParaRPr lang="en-US"/>
           </a:p>
         </p:txBody>
       </p:sp>
@@ -1032,7 +1040,7 @@
           <a:p>
             <a:pPr lvl="0"/>
             <a:r>
-              <a:rPr lang="en-US" smtClean="0"/>
+              <a:rPr lang="en-US"/>
               <a:t>Click to edit Master text styles</a:t>
             </a:r>
           </a:p>
@@ -1055,7 +1063,7 @@
           <a:p>
             <a:fld id="{82E01EC4-0BC2-4C83-8522-2DBC2DC9B78F}" type="datetimeFigureOut">
               <a:rPr lang="en-US" smtClean="0"/>
-              <a:t>12/19/2018</a:t>
+              <a:t>2/14/2019</a:t>
             </a:fld>
             <a:endParaRPr lang="en-US"/>
           </a:p>
@@ -1149,10 +1157,9 @@
           <a:lstStyle/>
           <a:p>
             <a:r>
-              <a:rPr lang="en-US" smtClean="0"/>
+              <a:rPr lang="en-US"/>
               <a:t>Click to edit Master title style</a:t>
             </a:r>
-            <a:endParaRPr lang="en-US"/>
           </a:p>
         </p:txBody>
       </p:sp>
@@ -1206,38 +1213,37 @@
           <a:p>
             <a:pPr lvl="0"/>
             <a:r>
-              <a:rPr lang="en-US" smtClean="0"/>
+              <a:rPr lang="en-US"/>
               <a:t>Click to edit Master text styles</a:t>
             </a:r>
           </a:p>
           <a:p>
             <a:pPr lvl="1"/>
             <a:r>
-              <a:rPr lang="en-US" smtClean="0"/>
+              <a:rPr lang="en-US"/>
               <a:t>Second level</a:t>
             </a:r>
           </a:p>
           <a:p>
             <a:pPr lvl="2"/>
             <a:r>
-              <a:rPr lang="en-US" smtClean="0"/>
+              <a:rPr lang="en-US"/>
               <a:t>Third level</a:t>
             </a:r>
           </a:p>
           <a:p>
             <a:pPr lvl="3"/>
             <a:r>
-              <a:rPr lang="en-US" smtClean="0"/>
+              <a:rPr lang="en-US"/>
               <a:t>Fourth level</a:t>
             </a:r>
           </a:p>
           <a:p>
             <a:pPr lvl="4"/>
             <a:r>
-              <a:rPr lang="en-US" smtClean="0"/>
+              <a:rPr lang="en-US"/>
               <a:t>Fifth level</a:t>
             </a:r>
-            <a:endParaRPr lang="en-US"/>
           </a:p>
         </p:txBody>
       </p:sp>
@@ -1291,38 +1297,37 @@
           <a:p>
             <a:pPr lvl="0"/>
             <a:r>
-              <a:rPr lang="en-US" smtClean="0"/>
+              <a:rPr lang="en-US"/>
               <a:t>Click to edit Master text styles</a:t>
             </a:r>
           </a:p>
           <a:p>
             <a:pPr lvl="1"/>
             <a:r>
-              <a:rPr lang="en-US" smtClean="0"/>
+              <a:rPr lang="en-US"/>
               <a:t>Second level</a:t>
             </a:r>
           </a:p>
           <a:p>
             <a:pPr lvl="2"/>
             <a:r>
-              <a:rPr lang="en-US" smtClean="0"/>
+              <a:rPr lang="en-US"/>
               <a:t>Third level</a:t>
             </a:r>
           </a:p>
           <a:p>
             <a:pPr lvl="3"/>
             <a:r>
-              <a:rPr lang="en-US" smtClean="0"/>
+              <a:rPr lang="en-US"/>
               <a:t>Fourth level</a:t>
             </a:r>
           </a:p>
           <a:p>
             <a:pPr lvl="4"/>
             <a:r>
-              <a:rPr lang="en-US" smtClean="0"/>
+              <a:rPr lang="en-US"/>
               <a:t>Fifth level</a:t>
             </a:r>
-            <a:endParaRPr lang="en-US"/>
           </a:p>
         </p:txBody>
       </p:sp>
@@ -1343,7 +1348,7 @@
           <a:p>
             <a:fld id="{82E01EC4-0BC2-4C83-8522-2DBC2DC9B78F}" type="datetimeFigureOut">
               <a:rPr lang="en-US" smtClean="0"/>
-              <a:t>12/19/2018</a:t>
+              <a:t>2/14/2019</a:t>
             </a:fld>
             <a:endParaRPr lang="en-US"/>
           </a:p>
@@ -1441,10 +1446,9 @@
           </a:lstStyle>
           <a:p>
             <a:r>
-              <a:rPr lang="en-US" smtClean="0"/>
+              <a:rPr lang="en-US"/>
               <a:t>Click to edit Master title style</a:t>
             </a:r>
-            <a:endParaRPr lang="en-US"/>
           </a:p>
         </p:txBody>
       </p:sp>
@@ -1507,7 +1511,7 @@
           <a:p>
             <a:pPr lvl="0"/>
             <a:r>
-              <a:rPr lang="en-US" smtClean="0"/>
+              <a:rPr lang="en-US"/>
               <a:t>Click to edit Master text styles</a:t>
             </a:r>
           </a:p>
@@ -1563,38 +1567,37 @@
           <a:p>
             <a:pPr lvl="0"/>
             <a:r>
-              <a:rPr lang="en-US" smtClean="0"/>
+              <a:rPr lang="en-US"/>
               <a:t>Click to edit Master text styles</a:t>
             </a:r>
           </a:p>
           <a:p>
             <a:pPr lvl="1"/>
             <a:r>
-              <a:rPr lang="en-US" smtClean="0"/>
+              <a:rPr lang="en-US"/>
               <a:t>Second level</a:t>
             </a:r>
           </a:p>
           <a:p>
             <a:pPr lvl="2"/>
             <a:r>
-              <a:rPr lang="en-US" smtClean="0"/>
+              <a:rPr lang="en-US"/>
               <a:t>Third level</a:t>
             </a:r>
           </a:p>
           <a:p>
             <a:pPr lvl="3"/>
             <a:r>
-              <a:rPr lang="en-US" smtClean="0"/>
+              <a:rPr lang="en-US"/>
               <a:t>Fourth level</a:t>
             </a:r>
           </a:p>
           <a:p>
             <a:pPr lvl="4"/>
             <a:r>
-              <a:rPr lang="en-US" smtClean="0"/>
+              <a:rPr lang="en-US"/>
               <a:t>Fifth level</a:t>
             </a:r>
-            <a:endParaRPr lang="en-US"/>
           </a:p>
         </p:txBody>
       </p:sp>
@@ -1657,7 +1660,7 @@
           <a:p>
             <a:pPr lvl="0"/>
             <a:r>
-              <a:rPr lang="en-US" smtClean="0"/>
+              <a:rPr lang="en-US"/>
               <a:t>Click to edit Master text styles</a:t>
             </a:r>
           </a:p>
@@ -1713,38 +1716,37 @@
           <a:p>
             <a:pPr lvl="0"/>
             <a:r>
-              <a:rPr lang="en-US" smtClean="0"/>
+              <a:rPr lang="en-US"/>
               <a:t>Click to edit Master text styles</a:t>
             </a:r>
           </a:p>
           <a:p>
             <a:pPr lvl="1"/>
             <a:r>
-              <a:rPr lang="en-US" smtClean="0"/>
+              <a:rPr lang="en-US"/>
               <a:t>Second level</a:t>
             </a:r>
           </a:p>
           <a:p>
             <a:pPr lvl="2"/>
             <a:r>
-              <a:rPr lang="en-US" smtClean="0"/>
+              <a:rPr lang="en-US"/>
               <a:t>Third level</a:t>
             </a:r>
           </a:p>
           <a:p>
             <a:pPr lvl="3"/>
             <a:r>
-              <a:rPr lang="en-US" smtClean="0"/>
+              <a:rPr lang="en-US"/>
               <a:t>Fourth level</a:t>
             </a:r>
           </a:p>
           <a:p>
             <a:pPr lvl="4"/>
             <a:r>
-              <a:rPr lang="en-US" smtClean="0"/>
+              <a:rPr lang="en-US"/>
               <a:t>Fifth level</a:t>
             </a:r>
-            <a:endParaRPr lang="en-US"/>
           </a:p>
         </p:txBody>
       </p:sp>
@@ -1765,7 +1767,7 @@
           <a:p>
             <a:fld id="{82E01EC4-0BC2-4C83-8522-2DBC2DC9B78F}" type="datetimeFigureOut">
               <a:rPr lang="en-US" smtClean="0"/>
-              <a:t>12/19/2018</a:t>
+              <a:t>2/14/2019</a:t>
             </a:fld>
             <a:endParaRPr lang="en-US"/>
           </a:p>
@@ -1859,10 +1861,9 @@
           <a:lstStyle/>
           <a:p>
             <a:r>
-              <a:rPr lang="en-US" smtClean="0"/>
+              <a:rPr lang="en-US"/>
               <a:t>Click to edit Master title style</a:t>
             </a:r>
-            <a:endParaRPr lang="en-US"/>
           </a:p>
         </p:txBody>
       </p:sp>
@@ -1883,7 +1884,7 @@
           <a:p>
             <a:fld id="{82E01EC4-0BC2-4C83-8522-2DBC2DC9B78F}" type="datetimeFigureOut">
               <a:rPr lang="en-US" smtClean="0"/>
-              <a:t>12/19/2018</a:t>
+              <a:t>2/14/2019</a:t>
             </a:fld>
             <a:endParaRPr lang="en-US"/>
           </a:p>
@@ -1978,7 +1979,7 @@
           <a:p>
             <a:fld id="{82E01EC4-0BC2-4C83-8522-2DBC2DC9B78F}" type="datetimeFigureOut">
               <a:rPr lang="en-US" smtClean="0"/>
-              <a:t>12/19/2018</a:t>
+              <a:t>2/14/2019</a:t>
             </a:fld>
             <a:endParaRPr lang="en-US"/>
           </a:p>
@@ -2081,10 +2082,9 @@
           </a:lstStyle>
           <a:p>
             <a:r>
-              <a:rPr lang="en-US" smtClean="0"/>
+              <a:rPr lang="en-US"/>
               <a:t>Click to edit Master title style</a:t>
             </a:r>
-            <a:endParaRPr lang="en-US"/>
           </a:p>
         </p:txBody>
       </p:sp>
@@ -2138,38 +2138,37 @@
           <a:p>
             <a:pPr lvl="0"/>
             <a:r>
-              <a:rPr lang="en-US" smtClean="0"/>
+              <a:rPr lang="en-US"/>
               <a:t>Click to edit Master text styles</a:t>
             </a:r>
           </a:p>
           <a:p>
             <a:pPr lvl="1"/>
             <a:r>
-              <a:rPr lang="en-US" smtClean="0"/>
+              <a:rPr lang="en-US"/>
               <a:t>Second level</a:t>
             </a:r>
           </a:p>
           <a:p>
             <a:pPr lvl="2"/>
             <a:r>
-              <a:rPr lang="en-US" smtClean="0"/>
+              <a:rPr lang="en-US"/>
               <a:t>Third level</a:t>
             </a:r>
           </a:p>
           <a:p>
             <a:pPr lvl="3"/>
             <a:r>
-              <a:rPr lang="en-US" smtClean="0"/>
+              <a:rPr lang="en-US"/>
               <a:t>Fourth level</a:t>
             </a:r>
           </a:p>
           <a:p>
             <a:pPr lvl="4"/>
             <a:r>
-              <a:rPr lang="en-US" smtClean="0"/>
+              <a:rPr lang="en-US"/>
               <a:t>Fifth level</a:t>
             </a:r>
-            <a:endParaRPr lang="en-US"/>
           </a:p>
         </p:txBody>
       </p:sp>
@@ -2232,7 +2231,7 @@
           <a:p>
             <a:pPr lvl="0"/>
             <a:r>
-              <a:rPr lang="en-US" smtClean="0"/>
+              <a:rPr lang="en-US"/>
               <a:t>Click to edit Master text styles</a:t>
             </a:r>
           </a:p>
@@ -2255,7 +2254,7 @@
           <a:p>
             <a:fld id="{82E01EC4-0BC2-4C83-8522-2DBC2DC9B78F}" type="datetimeFigureOut">
               <a:rPr lang="en-US" smtClean="0"/>
-              <a:t>12/19/2018</a:t>
+              <a:t>2/14/2019</a:t>
             </a:fld>
             <a:endParaRPr lang="en-US"/>
           </a:p>
@@ -2358,10 +2357,9 @@
           </a:lstStyle>
           <a:p>
             <a:r>
-              <a:rPr lang="en-US" smtClean="0"/>
+              <a:rPr lang="en-US"/>
               <a:t>Click to edit Master title style</a:t>
             </a:r>
-            <a:endParaRPr lang="en-US"/>
           </a:p>
         </p:txBody>
       </p:sp>
@@ -2485,7 +2483,7 @@
           <a:p>
             <a:pPr lvl="0"/>
             <a:r>
-              <a:rPr lang="en-US" smtClean="0"/>
+              <a:rPr lang="en-US"/>
               <a:t>Click to edit Master text styles</a:t>
             </a:r>
           </a:p>
@@ -2508,7 +2506,7 @@
           <a:p>
             <a:fld id="{82E01EC4-0BC2-4C83-8522-2DBC2DC9B78F}" type="datetimeFigureOut">
               <a:rPr lang="en-US" smtClean="0"/>
-              <a:t>12/19/2018</a:t>
+              <a:t>2/14/2019</a:t>
             </a:fld>
             <a:endParaRPr lang="en-US"/>
           </a:p>
@@ -2617,10 +2615,9 @@
           <a:lstStyle/>
           <a:p>
             <a:r>
-              <a:rPr lang="en-US" smtClean="0"/>
+              <a:rPr lang="en-US"/>
               <a:t>Click to edit Master title style</a:t>
             </a:r>
-            <a:endParaRPr lang="en-US"/>
           </a:p>
         </p:txBody>
       </p:sp>
@@ -2651,38 +2648,37 @@
           <a:p>
             <a:pPr lvl="0"/>
             <a:r>
-              <a:rPr lang="en-US" smtClean="0"/>
+              <a:rPr lang="en-US"/>
               <a:t>Click to edit Master text styles</a:t>
             </a:r>
           </a:p>
           <a:p>
             <a:pPr lvl="1"/>
             <a:r>
-              <a:rPr lang="en-US" smtClean="0"/>
+              <a:rPr lang="en-US"/>
               <a:t>Second level</a:t>
             </a:r>
           </a:p>
           <a:p>
             <a:pPr lvl="2"/>
             <a:r>
-              <a:rPr lang="en-US" smtClean="0"/>
+              <a:rPr lang="en-US"/>
               <a:t>Third level</a:t>
             </a:r>
           </a:p>
           <a:p>
             <a:pPr lvl="3"/>
             <a:r>
-              <a:rPr lang="en-US" smtClean="0"/>
+              <a:rPr lang="en-US"/>
               <a:t>Fourth level</a:t>
             </a:r>
           </a:p>
           <a:p>
             <a:pPr lvl="4"/>
             <a:r>
-              <a:rPr lang="en-US" smtClean="0"/>
+              <a:rPr lang="en-US"/>
               <a:t>Fifth level</a:t>
             </a:r>
-            <a:endParaRPr lang="en-US"/>
           </a:p>
         </p:txBody>
       </p:sp>
@@ -2721,7 +2717,7 @@
           <a:p>
             <a:fld id="{82E01EC4-0BC2-4C83-8522-2DBC2DC9B78F}" type="datetimeFigureOut">
               <a:rPr lang="en-US" smtClean="0"/>
-              <a:t>12/19/2018</a:t>
+              <a:t>2/14/2019</a:t>
             </a:fld>
             <a:endParaRPr lang="en-US"/>
           </a:p>
@@ -3160,7 +3156,7 @@
             <a:p>
               <a:pPr algn="ctr"/>
               <a:r>
-                <a:rPr lang="en-US" sz="3200" b="1" dirty="0" smtClean="0">
+                <a:rPr lang="en-US" sz="3200" b="1" dirty="0">
                   <a:ln w="19050">
                     <a:solidFill>
                       <a:schemeClr val="tx1"/>
@@ -3172,16 +3168,6 @@
                 </a:rPr>
                 <a:t>Truck</a:t>
               </a:r>
-              <a:endParaRPr lang="en-US" sz="3200" b="1" dirty="0">
-                <a:ln w="19050">
-                  <a:solidFill>
-                    <a:schemeClr val="tx1"/>
-                  </a:solidFill>
-                </a:ln>
-                <a:solidFill>
-                  <a:schemeClr val="bg1"/>
-                </a:solidFill>
-              </a:endParaRPr>
             </a:p>
           </p:txBody>
         </p:sp>
@@ -3235,7 +3221,7 @@
             <a:p>
               <a:pPr algn="ctr"/>
               <a:r>
-                <a:rPr lang="en-US" sz="3200" b="1" dirty="0" smtClean="0">
+                <a:rPr lang="en-US" sz="3200" b="1" dirty="0">
                   <a:ln w="19050">
                     <a:solidFill>
                       <a:schemeClr val="tx1"/>
@@ -3247,16 +3233,6 @@
                 </a:rPr>
                 <a:t>Bridge</a:t>
               </a:r>
-              <a:endParaRPr lang="en-US" sz="3200" b="1" dirty="0">
-                <a:ln w="19050">
-                  <a:solidFill>
-                    <a:schemeClr val="tx1"/>
-                  </a:solidFill>
-                </a:ln>
-                <a:solidFill>
-                  <a:schemeClr val="bg1"/>
-                </a:solidFill>
-              </a:endParaRPr>
             </a:p>
           </p:txBody>
         </p:sp>
@@ -3355,7 +3331,7 @@
             <a:lstStyle/>
             <a:p>
               <a:r>
-                <a:rPr lang="en-US" sz="1400" dirty="0" smtClean="0">
+                <a:rPr lang="en-US" sz="1400" dirty="0">
                   <a:sym typeface="Symbol"/>
                 </a:rPr>
                 <a:t>(t)</a:t>
@@ -4014,7 +3990,7 @@
                 <a:t>x</a:t>
               </a:r>
               <a:r>
-                <a:rPr lang="en-US" baseline="-25000" dirty="0" err="1" smtClean="0"/>
+                <a:rPr lang="en-US" baseline="-25000" dirty="0" err="1"/>
                 <a:t>B</a:t>
               </a:r>
               <a:endParaRPr lang="en-US" baseline="-25000" dirty="0"/>
@@ -4044,11 +4020,11 @@
             <a:lstStyle/>
             <a:p>
               <a:r>
-                <a:rPr lang="en-US" dirty="0" err="1" smtClean="0"/>
+                <a:rPr lang="en-US" dirty="0" err="1"/>
                 <a:t>x</a:t>
               </a:r>
               <a:r>
-                <a:rPr lang="en-US" baseline="-25000" dirty="0" err="1" smtClean="0"/>
+                <a:rPr lang="en-US" baseline="-25000" dirty="0" err="1"/>
                 <a:t>T</a:t>
               </a:r>
               <a:endParaRPr lang="en-US" baseline="-25000" dirty="0"/>
@@ -4079,11 +4055,11 @@
             <a:p>
               <a:pPr algn="r"/>
               <a:r>
-                <a:rPr lang="en-US" dirty="0" err="1" smtClean="0"/>
+                <a:rPr lang="en-US" dirty="0" err="1"/>
                 <a:t>k</a:t>
               </a:r>
               <a:r>
-                <a:rPr lang="en-US" baseline="-25000" dirty="0" err="1" smtClean="0"/>
+                <a:rPr lang="en-US" baseline="-25000" dirty="0" err="1"/>
                 <a:t>T</a:t>
               </a:r>
               <a:endParaRPr lang="en-US" baseline="-25000" dirty="0"/>
@@ -4114,7 +4090,7 @@
             <a:p>
               <a:pPr algn="r"/>
               <a:r>
-                <a:rPr lang="en-US" dirty="0" smtClean="0"/>
+                <a:rPr lang="en-US" dirty="0"/>
                 <a:t>k</a:t>
               </a:r>
               <a:r>
@@ -4147,11 +4123,11 @@
             <a:lstStyle/>
             <a:p>
               <a:r>
-                <a:rPr lang="en-US" dirty="0" err="1" smtClean="0"/>
+                <a:rPr lang="en-US" dirty="0" err="1"/>
                 <a:t>c</a:t>
               </a:r>
               <a:r>
-                <a:rPr lang="en-US" baseline="-25000" dirty="0" err="1" smtClean="0"/>
+                <a:rPr lang="en-US" baseline="-25000" dirty="0" err="1"/>
                 <a:t>B</a:t>
               </a:r>
               <a:endParaRPr lang="en-US" baseline="-25000" dirty="0"/>
@@ -4181,11 +4157,11 @@
             <a:lstStyle/>
             <a:p>
               <a:r>
-                <a:rPr lang="en-US" dirty="0" err="1" smtClean="0"/>
+                <a:rPr lang="en-US" dirty="0" err="1"/>
                 <a:t>c</a:t>
               </a:r>
               <a:r>
-                <a:rPr lang="en-US" baseline="-25000" dirty="0" err="1" smtClean="0"/>
+                <a:rPr lang="en-US" baseline="-25000" dirty="0" err="1"/>
                 <a:t>T</a:t>
               </a:r>
               <a:endParaRPr lang="en-US" baseline="-25000" dirty="0"/>
@@ -4228,7 +4204,7 @@
                         <m:sSubPr>
                           <m:ctrlPr>
                             <a:rPr lang="en-US" sz="1400" i="1" smtClean="0">
-                              <a:latin typeface="Cambria Math"/>
+                              <a:latin typeface="Cambria Math" panose="02040503050406030204" pitchFamily="18" charset="0"/>
                             </a:rPr>
                           </m:ctrlPr>
                         </m:sSubPr>
@@ -4253,7 +4229,7 @@
                         <m:sSubPr>
                           <m:ctrlPr>
                             <a:rPr lang="en-US" sz="1400" i="1">
-                              <a:latin typeface="Cambria Math"/>
+                              <a:latin typeface="Cambria Math" panose="02040503050406030204" pitchFamily="18" charset="0"/>
                             </a:rPr>
                           </m:ctrlPr>
                         </m:sSubPr>
@@ -4263,7 +4239,7 @@
                               <m:chr m:val="̈"/>
                               <m:ctrlPr>
                                 <a:rPr lang="en-US" sz="1400" i="1">
-                                  <a:latin typeface="Cambria Math"/>
+                                  <a:latin typeface="Cambria Math" panose="02040503050406030204" pitchFamily="18" charset="0"/>
                                 </a:rPr>
                               </m:ctrlPr>
                             </m:accPr>
@@ -4296,7 +4272,7 @@
                         <m:sSubPr>
                           <m:ctrlPr>
                             <a:rPr lang="en-US" sz="1400" i="1">
-                              <a:latin typeface="Cambria Math"/>
+                              <a:latin typeface="Cambria Math" panose="02040503050406030204" pitchFamily="18" charset="0"/>
                             </a:rPr>
                           </m:ctrlPr>
                         </m:sSubPr>
@@ -4321,7 +4297,7 @@
                         <m:dPr>
                           <m:ctrlPr>
                             <a:rPr lang="en-US" sz="1400" i="1">
-                              <a:latin typeface="Cambria Math"/>
+                              <a:latin typeface="Cambria Math" panose="02040503050406030204" pitchFamily="18" charset="0"/>
                             </a:rPr>
                           </m:ctrlPr>
                         </m:dPr>
@@ -4330,7 +4306,7 @@
                             <m:sSubPr>
                               <m:ctrlPr>
                                 <a:rPr lang="en-US" sz="1400" i="1">
-                                  <a:latin typeface="Cambria Math"/>
+                                  <a:latin typeface="Cambria Math" panose="02040503050406030204" pitchFamily="18" charset="0"/>
                                 </a:rPr>
                               </m:ctrlPr>
                             </m:sSubPr>
@@ -4361,7 +4337,7 @@
                             <m:sSubPr>
                               <m:ctrlPr>
                                 <a:rPr lang="en-US" sz="1400" i="1">
-                                  <a:latin typeface="Cambria Math"/>
+                                  <a:latin typeface="Cambria Math" panose="02040503050406030204" pitchFamily="18" charset="0"/>
                                 </a:rPr>
                               </m:ctrlPr>
                             </m:sSubPr>
@@ -4400,7 +4376,7 @@
                         <m:sSubPr>
                           <m:ctrlPr>
                             <a:rPr lang="en-US" sz="1400" i="1">
-                              <a:latin typeface="Cambria Math"/>
+                              <a:latin typeface="Cambria Math" panose="02040503050406030204" pitchFamily="18" charset="0"/>
                             </a:rPr>
                           </m:ctrlPr>
                         </m:sSubPr>
@@ -4425,7 +4401,7 @@
                         <m:dPr>
                           <m:ctrlPr>
                             <a:rPr lang="en-US" sz="1400" i="1">
-                              <a:latin typeface="Cambria Math"/>
+                              <a:latin typeface="Cambria Math" panose="02040503050406030204" pitchFamily="18" charset="0"/>
                             </a:rPr>
                           </m:ctrlPr>
                         </m:dPr>
@@ -4434,7 +4410,7 @@
                             <m:sSubPr>
                               <m:ctrlPr>
                                 <a:rPr lang="en-US" sz="1400" i="1" smtClean="0">
-                                  <a:latin typeface="Cambria Math"/>
+                                  <a:latin typeface="Cambria Math" panose="02040503050406030204" pitchFamily="18" charset="0"/>
                                 </a:rPr>
                               </m:ctrlPr>
                             </m:sSubPr>
@@ -4444,7 +4420,7 @@
                                   <m:chr m:val="̇"/>
                                   <m:ctrlPr>
                                     <a:rPr lang="en-US" sz="1400" i="1">
-                                      <a:latin typeface="Cambria Math"/>
+                                      <a:latin typeface="Cambria Math" panose="02040503050406030204" pitchFamily="18" charset="0"/>
                                     </a:rPr>
                                   </m:ctrlPr>
                                 </m:accPr>
@@ -4477,7 +4453,7 @@
                             <m:sSubPr>
                               <m:ctrlPr>
                                 <a:rPr lang="en-US" sz="1400" i="1">
-                                  <a:latin typeface="Cambria Math"/>
+                                  <a:latin typeface="Cambria Math" panose="02040503050406030204" pitchFamily="18" charset="0"/>
                                 </a:rPr>
                               </m:ctrlPr>
                             </m:sSubPr>
@@ -4487,7 +4463,7 @@
                                   <m:chr m:val="̇"/>
                                   <m:ctrlPr>
                                     <a:rPr lang="en-US" sz="1400" i="1">
-                                      <a:latin typeface="Cambria Math"/>
+                                      <a:latin typeface="Cambria Math" panose="02040503050406030204" pitchFamily="18" charset="0"/>
                                     </a:rPr>
                                   </m:ctrlPr>
                                 </m:accPr>
@@ -4521,7 +4497,7 @@
                               <m:chr m:val="̇"/>
                               <m:ctrlPr>
                                 <a:rPr lang="en-US" sz="1400" i="1">
-                                  <a:latin typeface="Cambria Math"/>
+                                  <a:latin typeface="Cambria Math" panose="02040503050406030204" pitchFamily="18" charset="0"/>
                                 </a:rPr>
                               </m:ctrlPr>
                             </m:accPr>
@@ -4545,7 +4521,7 @@
                     </m:oMath>
                   </m:oMathPara>
                 </a14:m>
-                <a:endParaRPr lang="en-US" sz="1400" dirty="0" smtClean="0"/>
+                <a:endParaRPr lang="en-US" sz="1400" dirty="0"/>
               </a:p>
               <a:p>
                 <a:pPr/>
@@ -4559,7 +4535,7 @@
                         <m:sSubPr>
                           <m:ctrlPr>
                             <a:rPr lang="en-US" sz="1400" i="1">
-                              <a:latin typeface="Cambria Math"/>
+                              <a:latin typeface="Cambria Math" panose="02040503050406030204" pitchFamily="18" charset="0"/>
                             </a:rPr>
                           </m:ctrlPr>
                         </m:sSubPr>
@@ -4584,7 +4560,7 @@
                         <m:sSubPr>
                           <m:ctrlPr>
                             <a:rPr lang="en-US" sz="1400" i="1">
-                              <a:latin typeface="Cambria Math"/>
+                              <a:latin typeface="Cambria Math" panose="02040503050406030204" pitchFamily="18" charset="0"/>
                             </a:rPr>
                           </m:ctrlPr>
                         </m:sSubPr>
@@ -4594,7 +4570,7 @@
                               <m:chr m:val="̈"/>
                               <m:ctrlPr>
                                 <a:rPr lang="en-US" sz="1400" i="1">
-                                  <a:latin typeface="Cambria Math"/>
+                                  <a:latin typeface="Cambria Math" panose="02040503050406030204" pitchFamily="18" charset="0"/>
                                 </a:rPr>
                               </m:ctrlPr>
                             </m:accPr>
@@ -4627,7 +4603,7 @@
                         <m:sSubPr>
                           <m:ctrlPr>
                             <a:rPr lang="en-US" sz="1400" i="1">
-                              <a:latin typeface="Cambria Math"/>
+                              <a:latin typeface="Cambria Math" panose="02040503050406030204" pitchFamily="18" charset="0"/>
                             </a:rPr>
                           </m:ctrlPr>
                         </m:sSubPr>
@@ -4652,7 +4628,7 @@
                         <m:dPr>
                           <m:ctrlPr>
                             <a:rPr lang="en-US" sz="1400" i="1">
-                              <a:latin typeface="Cambria Math"/>
+                              <a:latin typeface="Cambria Math" panose="02040503050406030204" pitchFamily="18" charset="0"/>
                             </a:rPr>
                           </m:ctrlPr>
                         </m:dPr>
@@ -4661,7 +4637,7 @@
                             <m:sSubPr>
                               <m:ctrlPr>
                                 <a:rPr lang="en-US" sz="1400" i="1">
-                                  <a:latin typeface="Cambria Math"/>
+                                  <a:latin typeface="Cambria Math" panose="02040503050406030204" pitchFamily="18" charset="0"/>
                                 </a:rPr>
                               </m:ctrlPr>
                             </m:sSubPr>
@@ -4692,7 +4668,7 @@
                             <m:sSubPr>
                               <m:ctrlPr>
                                 <a:rPr lang="en-US" sz="1400" i="1">
-                                  <a:latin typeface="Cambria Math"/>
+                                  <a:latin typeface="Cambria Math" panose="02040503050406030204" pitchFamily="18" charset="0"/>
                                 </a:rPr>
                               </m:ctrlPr>
                             </m:sSubPr>
@@ -4725,7 +4701,7 @@
                         <m:sSubPr>
                           <m:ctrlPr>
                             <a:rPr lang="en-US" sz="1400" i="1">
-                              <a:latin typeface="Cambria Math"/>
+                              <a:latin typeface="Cambria Math" panose="02040503050406030204" pitchFamily="18" charset="0"/>
                             </a:rPr>
                           </m:ctrlPr>
                         </m:sSubPr>
@@ -4750,7 +4726,7 @@
                         <m:dPr>
                           <m:ctrlPr>
                             <a:rPr lang="en-US" sz="1400" i="1">
-                              <a:latin typeface="Cambria Math"/>
+                              <a:latin typeface="Cambria Math" panose="02040503050406030204" pitchFamily="18" charset="0"/>
                             </a:rPr>
                           </m:ctrlPr>
                         </m:dPr>
@@ -4759,7 +4735,7 @@
                             <m:sSubPr>
                               <m:ctrlPr>
                                 <a:rPr lang="en-US" sz="1400" i="1">
-                                  <a:latin typeface="Cambria Math"/>
+                                  <a:latin typeface="Cambria Math" panose="02040503050406030204" pitchFamily="18" charset="0"/>
                                 </a:rPr>
                               </m:ctrlPr>
                             </m:sSubPr>
@@ -4769,7 +4745,7 @@
                                   <m:chr m:val="̇"/>
                                   <m:ctrlPr>
                                     <a:rPr lang="en-US" sz="1400" i="1">
-                                      <a:latin typeface="Cambria Math"/>
+                                      <a:latin typeface="Cambria Math" panose="02040503050406030204" pitchFamily="18" charset="0"/>
                                     </a:rPr>
                                   </m:ctrlPr>
                                 </m:accPr>
@@ -4803,7 +4779,7 @@
                               <m:chr m:val="̇"/>
                               <m:ctrlPr>
                                 <a:rPr lang="en-US" sz="1400" i="1">
-                                  <a:latin typeface="Cambria Math"/>
+                                  <a:latin typeface="Cambria Math" panose="02040503050406030204" pitchFamily="18" charset="0"/>
                                 </a:rPr>
                               </m:ctrlPr>
                             </m:accPr>
@@ -4826,7 +4802,7 @@
                             <m:sSubPr>
                               <m:ctrlPr>
                                 <a:rPr lang="en-US" sz="1400" i="1">
-                                  <a:latin typeface="Cambria Math"/>
+                                  <a:latin typeface="Cambria Math" panose="02040503050406030204" pitchFamily="18" charset="0"/>
                                 </a:rPr>
                               </m:ctrlPr>
                             </m:sSubPr>
@@ -4836,7 +4812,7 @@
                                   <m:chr m:val="̇"/>
                                   <m:ctrlPr>
                                     <a:rPr lang="en-US" sz="1400" i="1">
-                                      <a:latin typeface="Cambria Math"/>
+                                      <a:latin typeface="Cambria Math" panose="02040503050406030204" pitchFamily="18" charset="0"/>
                                     </a:rPr>
                                   </m:ctrlPr>
                                 </m:accPr>
@@ -4871,7 +4847,7 @@
                         <m:sSubPr>
                           <m:ctrlPr>
                             <a:rPr lang="en-US" sz="1400" i="1">
-                              <a:latin typeface="Cambria Math"/>
+                              <a:latin typeface="Cambria Math" panose="02040503050406030204" pitchFamily="18" charset="0"/>
                             </a:rPr>
                           </m:ctrlPr>
                         </m:sSubPr>
@@ -4896,7 +4872,7 @@
                         <m:dPr>
                           <m:ctrlPr>
                             <a:rPr lang="en-US" sz="1400" i="1">
-                              <a:latin typeface="Cambria Math"/>
+                              <a:latin typeface="Cambria Math" panose="02040503050406030204" pitchFamily="18" charset="0"/>
                             </a:rPr>
                           </m:ctrlPr>
                         </m:dPr>
@@ -4905,7 +4881,7 @@
                             <m:sSubPr>
                               <m:ctrlPr>
                                 <a:rPr lang="en-US" sz="1400" i="1">
-                                  <a:latin typeface="Cambria Math"/>
+                                  <a:latin typeface="Cambria Math" panose="02040503050406030204" pitchFamily="18" charset="0"/>
                                 </a:rPr>
                               </m:ctrlPr>
                             </m:sSubPr>
@@ -4938,7 +4914,7 @@
                         <m:sSubPr>
                           <m:ctrlPr>
                             <a:rPr lang="en-US" sz="1400" i="1">
-                              <a:latin typeface="Cambria Math"/>
+                              <a:latin typeface="Cambria Math" panose="02040503050406030204" pitchFamily="18" charset="0"/>
                             </a:rPr>
                           </m:ctrlPr>
                         </m:sSubPr>
@@ -4963,7 +4939,7 @@
                         <m:dPr>
                           <m:ctrlPr>
                             <a:rPr lang="en-US" sz="1400" i="1">
-                              <a:latin typeface="Cambria Math"/>
+                              <a:latin typeface="Cambria Math" panose="02040503050406030204" pitchFamily="18" charset="0"/>
                             </a:rPr>
                           </m:ctrlPr>
                         </m:dPr>
@@ -4972,7 +4948,7 @@
                             <m:sSubPr>
                               <m:ctrlPr>
                                 <a:rPr lang="en-US" sz="1400" i="1">
-                                  <a:latin typeface="Cambria Math"/>
+                                  <a:latin typeface="Cambria Math" panose="02040503050406030204" pitchFamily="18" charset="0"/>
                                 </a:rPr>
                               </m:ctrlPr>
                             </m:sSubPr>
@@ -4982,7 +4958,7 @@
                                   <m:chr m:val="̇"/>
                                   <m:ctrlPr>
                                     <a:rPr lang="en-US" sz="1400" i="1">
-                                      <a:latin typeface="Cambria Math"/>
+                                      <a:latin typeface="Cambria Math" panose="02040503050406030204" pitchFamily="18" charset="0"/>
                                     </a:rPr>
                                   </m:ctrlPr>
                                 </m:accPr>
@@ -5016,7 +4992,7 @@
                     </m:oMath>
                   </m:oMathPara>
                 </a14:m>
-                <a:endParaRPr lang="en-US" sz="1400" dirty="0" smtClean="0"/>
+                <a:endParaRPr lang="en-US" sz="1400" dirty="0"/>
               </a:p>
               <a:p>
                 <a:pPr/>
@@ -5030,7 +5006,7 @@
                         <m:sSubPr>
                           <m:ctrlPr>
                             <a:rPr lang="en-US" sz="1400" i="1" smtClean="0">
-                              <a:latin typeface="Cambria Math"/>
+                              <a:latin typeface="Cambria Math" panose="02040503050406030204" pitchFamily="18" charset="0"/>
                             </a:rPr>
                           </m:ctrlPr>
                         </m:sSubPr>
@@ -5061,7 +5037,7 @@
                         <m:sSubPr>
                           <m:ctrlPr>
                             <a:rPr lang="en-US" sz="1400" b="0" i="1" smtClean="0">
-                              <a:latin typeface="Cambria Math"/>
+                              <a:latin typeface="Cambria Math" panose="02040503050406030204" pitchFamily="18" charset="0"/>
                             </a:rPr>
                           </m:ctrlPr>
                         </m:sSubPr>
@@ -5071,7 +5047,7 @@
                               <m:chr m:val="̇"/>
                               <m:ctrlPr>
                                 <a:rPr lang="en-US" sz="1400" b="0" i="1" smtClean="0">
-                                  <a:latin typeface="Cambria Math"/>
+                                  <a:latin typeface="Cambria Math" panose="02040503050406030204" pitchFamily="18" charset="0"/>
                                 </a:rPr>
                               </m:ctrlPr>
                             </m:accPr>
@@ -5104,7 +5080,7 @@
                         <m:sSubPr>
                           <m:ctrlPr>
                             <a:rPr lang="en-US" sz="1400" b="0" i="1" smtClean="0">
-                              <a:latin typeface="Cambria Math"/>
+                              <a:latin typeface="Cambria Math" panose="02040503050406030204" pitchFamily="18" charset="0"/>
                             </a:rPr>
                           </m:ctrlPr>
                         </m:sSubPr>
@@ -5135,7 +5111,7 @@
                         <m:sSubPr>
                           <m:ctrlPr>
                             <a:rPr lang="en-US" sz="1400" b="0" i="1" smtClean="0">
-                              <a:latin typeface="Cambria Math"/>
+                              <a:latin typeface="Cambria Math" panose="02040503050406030204" pitchFamily="18" charset="0"/>
                             </a:rPr>
                           </m:ctrlPr>
                         </m:sSubPr>
@@ -5166,7 +5142,7 @@
                         <m:sSubPr>
                           <m:ctrlPr>
                             <a:rPr lang="en-US" sz="1400" b="0" i="1" smtClean="0">
-                              <a:latin typeface="Cambria Math"/>
+                              <a:latin typeface="Cambria Math" panose="02040503050406030204" pitchFamily="18" charset="0"/>
                             </a:rPr>
                           </m:ctrlPr>
                         </m:sSubPr>
@@ -5197,7 +5173,7 @@
                         <m:sSubPr>
                           <m:ctrlPr>
                             <a:rPr lang="en-US" sz="1400" b="0" i="1" smtClean="0">
-                              <a:latin typeface="Cambria Math"/>
+                              <a:latin typeface="Cambria Math" panose="02040503050406030204" pitchFamily="18" charset="0"/>
                             </a:rPr>
                           </m:ctrlPr>
                         </m:sSubPr>
@@ -5207,7 +5183,7 @@
                               <m:chr m:val="̇"/>
                               <m:ctrlPr>
                                 <a:rPr lang="en-US" sz="1400" b="0" i="1" smtClean="0">
-                                  <a:latin typeface="Cambria Math"/>
+                                  <a:latin typeface="Cambria Math" panose="02040503050406030204" pitchFamily="18" charset="0"/>
                                 </a:rPr>
                               </m:ctrlPr>
                             </m:accPr>
@@ -5240,7 +5216,7 @@
                         <m:sSubPr>
                           <m:ctrlPr>
                             <a:rPr lang="en-US" sz="1400" b="0" i="1" smtClean="0">
-                              <a:latin typeface="Cambria Math"/>
+                              <a:latin typeface="Cambria Math" panose="02040503050406030204" pitchFamily="18" charset="0"/>
                             </a:rPr>
                           </m:ctrlPr>
                         </m:sSubPr>
@@ -5271,7 +5247,7 @@
                         <m:sSubPr>
                           <m:ctrlPr>
                             <a:rPr lang="en-US" sz="1400" b="0" i="1" smtClean="0">
-                              <a:latin typeface="Cambria Math"/>
+                              <a:latin typeface="Cambria Math" panose="02040503050406030204" pitchFamily="18" charset="0"/>
                             </a:rPr>
                           </m:ctrlPr>
                         </m:sSubPr>
@@ -5295,7 +5271,7 @@
                     </m:oMath>
                   </m:oMathPara>
                 </a14:m>
-                <a:endParaRPr lang="en-US" sz="1400" b="0" dirty="0" smtClean="0"/>
+                <a:endParaRPr lang="en-US" sz="1400" b="0" dirty="0"/>
               </a:p>
               <a:p>
                 <a:pPr/>
@@ -5309,7 +5285,7 @@
                         <m:sSubPr>
                           <m:ctrlPr>
                             <a:rPr lang="en-US" sz="1400" i="1" smtClean="0">
-                              <a:latin typeface="Cambria Math"/>
+                              <a:latin typeface="Cambria Math" panose="02040503050406030204" pitchFamily="18" charset="0"/>
                             </a:rPr>
                           </m:ctrlPr>
                         </m:sSubPr>
@@ -5341,7 +5317,7 @@
                           <m:chr m:val="̇"/>
                           <m:ctrlPr>
                             <a:rPr lang="en-US" sz="1400" b="0" i="1" smtClean="0">
-                              <a:latin typeface="Cambria Math"/>
+                              <a:latin typeface="Cambria Math" panose="02040503050406030204" pitchFamily="18" charset="0"/>
                             </a:rPr>
                           </m:ctrlPr>
                         </m:accPr>
@@ -5365,7 +5341,7 @@
                         <m:sSubPr>
                           <m:ctrlPr>
                             <a:rPr lang="en-US" sz="1400" b="0" i="1" smtClean="0">
-                              <a:latin typeface="Cambria Math"/>
+                              <a:latin typeface="Cambria Math" panose="02040503050406030204" pitchFamily="18" charset="0"/>
                             </a:rPr>
                           </m:ctrlPr>
                         </m:sSubPr>
@@ -5402,7 +5378,7 @@
                     </m:oMath>
                   </m:oMathPara>
                 </a14:m>
-                <a:endParaRPr lang="en-US" sz="1400" b="0" dirty="0" smtClean="0">
+                <a:endParaRPr lang="en-US" sz="1400" b="0" dirty="0">
                   <a:ea typeface="Cambria Math"/>
                 </a:endParaRPr>
               </a:p>
@@ -5418,7 +5394,7 @@
                         <m:sSubPr>
                           <m:ctrlPr>
                             <a:rPr lang="en-US" sz="1400" b="0" i="1" smtClean="0">
-                              <a:latin typeface="Cambria Math"/>
+                              <a:latin typeface="Cambria Math" panose="02040503050406030204" pitchFamily="18" charset="0"/>
                               <a:ea typeface="Cambria Math"/>
                             </a:rPr>
                           </m:ctrlPr>
@@ -5429,7 +5405,7 @@
                               <m:chr m:val="̇"/>
                               <m:ctrlPr>
                                 <a:rPr lang="en-US" sz="1400" b="0" i="1" smtClean="0">
-                                  <a:latin typeface="Cambria Math"/>
+                                  <a:latin typeface="Cambria Math" panose="02040503050406030204" pitchFamily="18" charset="0"/>
                                   <a:ea typeface="Cambria Math"/>
                                 </a:rPr>
                               </m:ctrlPr>
@@ -5466,7 +5442,7 @@
                         <m:sSubPr>
                           <m:ctrlPr>
                             <a:rPr lang="en-US" sz="1400" b="0" i="1" smtClean="0">
-                              <a:latin typeface="Cambria Math"/>
+                              <a:latin typeface="Cambria Math" panose="02040503050406030204" pitchFamily="18" charset="0"/>
                               <a:ea typeface="Cambria Math"/>
                             </a:rPr>
                           </m:ctrlPr>
@@ -5477,7 +5453,7 @@
                               <m:chr m:val="̈"/>
                               <m:ctrlPr>
                                 <a:rPr lang="en-US" sz="1400" b="0" i="1" smtClean="0">
-                                  <a:latin typeface="Cambria Math"/>
+                                  <a:latin typeface="Cambria Math" panose="02040503050406030204" pitchFamily="18" charset="0"/>
                                   <a:ea typeface="Cambria Math"/>
                                 </a:rPr>
                               </m:ctrlPr>
@@ -5514,7 +5490,7 @@
                         <m:fPr>
                           <m:ctrlPr>
                             <a:rPr lang="en-US" sz="1400" b="0" i="1" smtClean="0">
-                              <a:latin typeface="Cambria Math"/>
+                              <a:latin typeface="Cambria Math" panose="02040503050406030204" pitchFamily="18" charset="0"/>
                               <a:ea typeface="Cambria Math"/>
                             </a:rPr>
                           </m:ctrlPr>
@@ -5524,7 +5500,7 @@
                             <m:sSubPr>
                               <m:ctrlPr>
                                 <a:rPr lang="en-US" sz="1400" b="0" i="1" smtClean="0">
-                                  <a:latin typeface="Cambria Math"/>
+                                  <a:latin typeface="Cambria Math" panose="02040503050406030204" pitchFamily="18" charset="0"/>
                                   <a:ea typeface="Cambria Math"/>
                                 </a:rPr>
                               </m:ctrlPr>
@@ -5554,7 +5530,7 @@
                             <m:sSubPr>
                               <m:ctrlPr>
                                 <a:rPr lang="en-US" sz="1400" b="0" i="1" smtClean="0">
-                                  <a:latin typeface="Cambria Math"/>
+                                  <a:latin typeface="Cambria Math" panose="02040503050406030204" pitchFamily="18" charset="0"/>
                                   <a:ea typeface="Cambria Math"/>
                                 </a:rPr>
                               </m:ctrlPr>
@@ -5591,7 +5567,7 @@
                         <m:sSubPr>
                           <m:ctrlPr>
                             <a:rPr lang="en-US" sz="1400" b="0" i="1" smtClean="0">
-                              <a:latin typeface="Cambria Math"/>
+                              <a:latin typeface="Cambria Math" panose="02040503050406030204" pitchFamily="18" charset="0"/>
                               <a:ea typeface="Cambria Math"/>
                             </a:rPr>
                           </m:ctrlPr>
@@ -5626,7 +5602,7 @@
                         <m:fPr>
                           <m:ctrlPr>
                             <a:rPr lang="en-US" sz="1400" b="0" i="1" smtClean="0">
-                              <a:latin typeface="Cambria Math"/>
+                              <a:latin typeface="Cambria Math" panose="02040503050406030204" pitchFamily="18" charset="0"/>
                               <a:ea typeface="Cambria Math"/>
                             </a:rPr>
                           </m:ctrlPr>
@@ -5636,7 +5612,7 @@
                             <m:sSubPr>
                               <m:ctrlPr>
                                 <a:rPr lang="en-US" sz="1400" b="0" i="1" smtClean="0">
-                                  <a:latin typeface="Cambria Math"/>
+                                  <a:latin typeface="Cambria Math" panose="02040503050406030204" pitchFamily="18" charset="0"/>
                                   <a:ea typeface="Cambria Math"/>
                                 </a:rPr>
                               </m:ctrlPr>
@@ -5666,7 +5642,7 @@
                             <m:sSubPr>
                               <m:ctrlPr>
                                 <a:rPr lang="en-US" sz="1400" b="0" i="1" smtClean="0">
-                                  <a:latin typeface="Cambria Math"/>
+                                  <a:latin typeface="Cambria Math" panose="02040503050406030204" pitchFamily="18" charset="0"/>
                                   <a:ea typeface="Cambria Math"/>
                                 </a:rPr>
                               </m:ctrlPr>
@@ -5703,7 +5679,7 @@
                         <m:sSubPr>
                           <m:ctrlPr>
                             <a:rPr lang="en-US" sz="1400" b="0" i="1" smtClean="0">
-                              <a:latin typeface="Cambria Math"/>
+                              <a:latin typeface="Cambria Math" panose="02040503050406030204" pitchFamily="18" charset="0"/>
                               <a:ea typeface="Cambria Math"/>
                             </a:rPr>
                           </m:ctrlPr>
@@ -5738,7 +5714,7 @@
                         <m:fPr>
                           <m:ctrlPr>
                             <a:rPr lang="en-US" sz="1400" b="0" i="1" smtClean="0">
-                              <a:latin typeface="Cambria Math"/>
+                              <a:latin typeface="Cambria Math" panose="02040503050406030204" pitchFamily="18" charset="0"/>
                               <a:ea typeface="Cambria Math"/>
                             </a:rPr>
                           </m:ctrlPr>
@@ -5748,7 +5724,7 @@
                             <m:sSubPr>
                               <m:ctrlPr>
                                 <a:rPr lang="en-US" sz="1400" b="0" i="1" smtClean="0">
-                                  <a:latin typeface="Cambria Math"/>
+                                  <a:latin typeface="Cambria Math" panose="02040503050406030204" pitchFamily="18" charset="0"/>
                                   <a:ea typeface="Cambria Math"/>
                                 </a:rPr>
                               </m:ctrlPr>
@@ -5778,7 +5754,7 @@
                             <m:sSubPr>
                               <m:ctrlPr>
                                 <a:rPr lang="en-US" sz="1400" b="0" i="1" smtClean="0">
-                                  <a:latin typeface="Cambria Math"/>
+                                  <a:latin typeface="Cambria Math" panose="02040503050406030204" pitchFamily="18" charset="0"/>
                                   <a:ea typeface="Cambria Math"/>
                                 </a:rPr>
                               </m:ctrlPr>
@@ -5815,7 +5791,7 @@
                         <m:sSubPr>
                           <m:ctrlPr>
                             <a:rPr lang="en-US" sz="1400" b="0" i="1" smtClean="0">
-                              <a:latin typeface="Cambria Math"/>
+                              <a:latin typeface="Cambria Math" panose="02040503050406030204" pitchFamily="18" charset="0"/>
                               <a:ea typeface="Cambria Math"/>
                             </a:rPr>
                           </m:ctrlPr>
@@ -5850,7 +5826,7 @@
                         <m:fPr>
                           <m:ctrlPr>
                             <a:rPr lang="en-US" sz="1400" b="0" i="1" smtClean="0">
-                              <a:latin typeface="Cambria Math"/>
+                              <a:latin typeface="Cambria Math" panose="02040503050406030204" pitchFamily="18" charset="0"/>
                               <a:ea typeface="Cambria Math"/>
                             </a:rPr>
                           </m:ctrlPr>
@@ -5860,7 +5836,7 @@
                             <m:sSubPr>
                               <m:ctrlPr>
                                 <a:rPr lang="en-US" sz="1400" b="0" i="1" smtClean="0">
-                                  <a:latin typeface="Cambria Math"/>
+                                  <a:latin typeface="Cambria Math" panose="02040503050406030204" pitchFamily="18" charset="0"/>
                                   <a:ea typeface="Cambria Math"/>
                                 </a:rPr>
                               </m:ctrlPr>
@@ -5890,7 +5866,7 @@
                             <m:sSubPr>
                               <m:ctrlPr>
                                 <a:rPr lang="en-US" sz="1400" b="0" i="1" smtClean="0">
-                                  <a:latin typeface="Cambria Math"/>
+                                  <a:latin typeface="Cambria Math" panose="02040503050406030204" pitchFamily="18" charset="0"/>
                                   <a:ea typeface="Cambria Math"/>
                                 </a:rPr>
                               </m:ctrlPr>
@@ -5927,7 +5903,7 @@
                         <m:sSubPr>
                           <m:ctrlPr>
                             <a:rPr lang="en-US" sz="1400" b="0" i="1" smtClean="0">
-                              <a:latin typeface="Cambria Math"/>
+                              <a:latin typeface="Cambria Math" panose="02040503050406030204" pitchFamily="18" charset="0"/>
                               <a:ea typeface="Cambria Math"/>
                             </a:rPr>
                           </m:ctrlPr>
@@ -5962,7 +5938,7 @@
                         <m:fPr>
                           <m:ctrlPr>
                             <a:rPr lang="en-US" sz="1400" b="0" i="1" smtClean="0">
-                              <a:latin typeface="Cambria Math"/>
+                              <a:latin typeface="Cambria Math" panose="02040503050406030204" pitchFamily="18" charset="0"/>
                               <a:ea typeface="Cambria Math"/>
                             </a:rPr>
                           </m:ctrlPr>
@@ -5972,7 +5948,7 @@
                             <m:sSubPr>
                               <m:ctrlPr>
                                 <a:rPr lang="en-US" sz="1400" b="0" i="1" smtClean="0">
-                                  <a:latin typeface="Cambria Math"/>
+                                  <a:latin typeface="Cambria Math" panose="02040503050406030204" pitchFamily="18" charset="0"/>
                                   <a:ea typeface="Cambria Math"/>
                                 </a:rPr>
                               </m:ctrlPr>
@@ -6002,7 +5978,7 @@
                             <m:sSubPr>
                               <m:ctrlPr>
                                 <a:rPr lang="en-US" sz="1400" b="0" i="1" smtClean="0">
-                                  <a:latin typeface="Cambria Math"/>
+                                  <a:latin typeface="Cambria Math" panose="02040503050406030204" pitchFamily="18" charset="0"/>
                                   <a:ea typeface="Cambria Math"/>
                                 </a:rPr>
                               </m:ctrlPr>
@@ -6039,7 +6015,7 @@
                         <m:sSubPr>
                           <m:ctrlPr>
                             <a:rPr lang="en-US" sz="1400" b="0" i="1" smtClean="0">
-                              <a:latin typeface="Cambria Math"/>
+                              <a:latin typeface="Cambria Math" panose="02040503050406030204" pitchFamily="18" charset="0"/>
                               <a:ea typeface="Cambria Math"/>
                             </a:rPr>
                           </m:ctrlPr>
@@ -6074,7 +6050,7 @@
                         <m:fPr>
                           <m:ctrlPr>
                             <a:rPr lang="en-US" sz="1400" b="0" i="1" smtClean="0">
-                              <a:latin typeface="Cambria Math"/>
+                              <a:latin typeface="Cambria Math" panose="02040503050406030204" pitchFamily="18" charset="0"/>
                               <a:ea typeface="Cambria Math"/>
                             </a:rPr>
                           </m:ctrlPr>
@@ -6084,7 +6060,7 @@
                             <m:sSubPr>
                               <m:ctrlPr>
                                 <a:rPr lang="en-US" sz="1400" b="0" i="1" smtClean="0">
-                                  <a:latin typeface="Cambria Math"/>
+                                  <a:latin typeface="Cambria Math" panose="02040503050406030204" pitchFamily="18" charset="0"/>
                                   <a:ea typeface="Cambria Math"/>
                                 </a:rPr>
                               </m:ctrlPr>
@@ -6114,7 +6090,7 @@
                             <m:sSubPr>
                               <m:ctrlPr>
                                 <a:rPr lang="en-US" sz="1400" b="0" i="1" smtClean="0">
-                                  <a:latin typeface="Cambria Math"/>
+                                  <a:latin typeface="Cambria Math" panose="02040503050406030204" pitchFamily="18" charset="0"/>
                                   <a:ea typeface="Cambria Math"/>
                                 </a:rPr>
                               </m:ctrlPr>
@@ -6151,7 +6127,7 @@
                         <m:sSubPr>
                           <m:ctrlPr>
                             <a:rPr lang="en-US" sz="1400" b="0" i="1" smtClean="0">
-                              <a:latin typeface="Cambria Math"/>
+                              <a:latin typeface="Cambria Math" panose="02040503050406030204" pitchFamily="18" charset="0"/>
                               <a:ea typeface="Cambria Math"/>
                             </a:rPr>
                           </m:ctrlPr>
@@ -6178,7 +6154,7 @@
                     </m:oMath>
                   </m:oMathPara>
                 </a14:m>
-                <a:endParaRPr lang="en-US" sz="1400" b="0" dirty="0" smtClean="0">
+                <a:endParaRPr lang="en-US" sz="1400" b="0" dirty="0">
                   <a:ea typeface="Cambria Math"/>
                 </a:endParaRPr>
               </a:p>
@@ -6194,7 +6170,7 @@
                         <m:sSubPr>
                           <m:ctrlPr>
                             <a:rPr lang="en-US" sz="1400" b="0" i="1" smtClean="0">
-                              <a:latin typeface="Cambria Math"/>
+                              <a:latin typeface="Cambria Math" panose="02040503050406030204" pitchFamily="18" charset="0"/>
                               <a:ea typeface="Cambria Math"/>
                             </a:rPr>
                           </m:ctrlPr>
@@ -6205,7 +6181,7 @@
                               <m:chr m:val="̇"/>
                               <m:ctrlPr>
                                 <a:rPr lang="en-US" sz="1400" b="0" i="1" smtClean="0">
-                                  <a:latin typeface="Cambria Math"/>
+                                  <a:latin typeface="Cambria Math" panose="02040503050406030204" pitchFamily="18" charset="0"/>
                                   <a:ea typeface="Cambria Math"/>
                                 </a:rPr>
                               </m:ctrlPr>
@@ -6242,7 +6218,7 @@
                         <m:sSubPr>
                           <m:ctrlPr>
                             <a:rPr lang="en-US" sz="1400" b="0" i="1" smtClean="0">
-                              <a:latin typeface="Cambria Math"/>
+                              <a:latin typeface="Cambria Math" panose="02040503050406030204" pitchFamily="18" charset="0"/>
                               <a:ea typeface="Cambria Math"/>
                             </a:rPr>
                           </m:ctrlPr>
@@ -6253,7 +6229,7 @@
                               <m:chr m:val="̇"/>
                               <m:ctrlPr>
                                 <a:rPr lang="en-US" sz="1400" b="0" i="1" smtClean="0">
-                                  <a:latin typeface="Cambria Math"/>
+                                  <a:latin typeface="Cambria Math" panose="02040503050406030204" pitchFamily="18" charset="0"/>
                                   <a:ea typeface="Cambria Math"/>
                                 </a:rPr>
                               </m:ctrlPr>
@@ -6290,7 +6266,7 @@
                         <m:sSubPr>
                           <m:ctrlPr>
                             <a:rPr lang="en-US" sz="1400" b="0" i="1" smtClean="0">
-                              <a:latin typeface="Cambria Math"/>
+                              <a:latin typeface="Cambria Math" panose="02040503050406030204" pitchFamily="18" charset="0"/>
                               <a:ea typeface="Cambria Math"/>
                             </a:rPr>
                           </m:ctrlPr>
@@ -6317,7 +6293,7 @@
                     </m:oMath>
                   </m:oMathPara>
                 </a14:m>
-                <a:endParaRPr lang="en-US" sz="1400" b="0" dirty="0" smtClean="0">
+                <a:endParaRPr lang="en-US" sz="1400" b="0" dirty="0">
                   <a:ea typeface="Cambria Math"/>
                 </a:endParaRPr>
               </a:p>
@@ -6333,7 +6309,7 @@
                         <m:sSubPr>
                           <m:ctrlPr>
                             <a:rPr lang="en-US" sz="1400" b="0" i="1" smtClean="0">
-                              <a:latin typeface="Cambria Math"/>
+                              <a:latin typeface="Cambria Math" panose="02040503050406030204" pitchFamily="18" charset="0"/>
                               <a:ea typeface="Cambria Math"/>
                             </a:rPr>
                           </m:ctrlPr>
@@ -6344,7 +6320,7 @@
                               <m:chr m:val="̇"/>
                               <m:ctrlPr>
                                 <a:rPr lang="en-US" sz="1400" b="0" i="1" smtClean="0">
-                                  <a:latin typeface="Cambria Math"/>
+                                  <a:latin typeface="Cambria Math" panose="02040503050406030204" pitchFamily="18" charset="0"/>
                                   <a:ea typeface="Cambria Math"/>
                                 </a:rPr>
                               </m:ctrlPr>
@@ -6381,7 +6357,7 @@
                         <m:sSubPr>
                           <m:ctrlPr>
                             <a:rPr lang="en-US" sz="1400" b="0" i="1" smtClean="0">
-                              <a:latin typeface="Cambria Math"/>
+                              <a:latin typeface="Cambria Math" panose="02040503050406030204" pitchFamily="18" charset="0"/>
                               <a:ea typeface="Cambria Math"/>
                             </a:rPr>
                           </m:ctrlPr>
@@ -6392,7 +6368,7 @@
                               <m:chr m:val="̈"/>
                               <m:ctrlPr>
                                 <a:rPr lang="en-US" sz="1400" b="0" i="1" smtClean="0">
-                                  <a:latin typeface="Cambria Math"/>
+                                  <a:latin typeface="Cambria Math" panose="02040503050406030204" pitchFamily="18" charset="0"/>
                                   <a:ea typeface="Cambria Math"/>
                                 </a:rPr>
                               </m:ctrlPr>
@@ -6429,7 +6405,7 @@
                         <m:fPr>
                           <m:ctrlPr>
                             <a:rPr lang="en-US" sz="1400" b="0" i="1" smtClean="0">
-                              <a:latin typeface="Cambria Math"/>
+                              <a:latin typeface="Cambria Math" panose="02040503050406030204" pitchFamily="18" charset="0"/>
                               <a:ea typeface="Cambria Math"/>
                             </a:rPr>
                           </m:ctrlPr>
@@ -6439,7 +6415,7 @@
                             <m:sSubPr>
                               <m:ctrlPr>
                                 <a:rPr lang="en-US" sz="1400" b="0" i="1" smtClean="0">
-                                  <a:latin typeface="Cambria Math"/>
+                                  <a:latin typeface="Cambria Math" panose="02040503050406030204" pitchFamily="18" charset="0"/>
                                   <a:ea typeface="Cambria Math"/>
                                 </a:rPr>
                               </m:ctrlPr>
@@ -6469,7 +6445,7 @@
                             <m:sSubPr>
                               <m:ctrlPr>
                                 <a:rPr lang="en-US" sz="1400" b="0" i="1" smtClean="0">
-                                  <a:latin typeface="Cambria Math"/>
+                                  <a:latin typeface="Cambria Math" panose="02040503050406030204" pitchFamily="18" charset="0"/>
                                   <a:ea typeface="Cambria Math"/>
                                 </a:rPr>
                               </m:ctrlPr>
@@ -6506,7 +6482,7 @@
                         <m:sSubPr>
                           <m:ctrlPr>
                             <a:rPr lang="en-US" sz="1400" b="0" i="1" smtClean="0">
-                              <a:latin typeface="Cambria Math"/>
+                              <a:latin typeface="Cambria Math" panose="02040503050406030204" pitchFamily="18" charset="0"/>
                               <a:ea typeface="Cambria Math"/>
                             </a:rPr>
                           </m:ctrlPr>
@@ -6541,7 +6517,7 @@
                         <m:fPr>
                           <m:ctrlPr>
                             <a:rPr lang="en-US" sz="1400" b="0" i="1" smtClean="0">
-                              <a:latin typeface="Cambria Math"/>
+                              <a:latin typeface="Cambria Math" panose="02040503050406030204" pitchFamily="18" charset="0"/>
                               <a:ea typeface="Cambria Math"/>
                             </a:rPr>
                           </m:ctrlPr>
@@ -6551,7 +6527,7 @@
                             <m:sSubPr>
                               <m:ctrlPr>
                                 <a:rPr lang="en-US" sz="1400" b="0" i="1" smtClean="0">
-                                  <a:latin typeface="Cambria Math"/>
+                                  <a:latin typeface="Cambria Math" panose="02040503050406030204" pitchFamily="18" charset="0"/>
                                   <a:ea typeface="Cambria Math"/>
                                 </a:rPr>
                               </m:ctrlPr>
@@ -6581,7 +6557,7 @@
                             <m:sSubPr>
                               <m:ctrlPr>
                                 <a:rPr lang="en-US" sz="1400" b="0" i="1" smtClean="0">
-                                  <a:latin typeface="Cambria Math"/>
+                                  <a:latin typeface="Cambria Math" panose="02040503050406030204" pitchFamily="18" charset="0"/>
                                   <a:ea typeface="Cambria Math"/>
                                 </a:rPr>
                               </m:ctrlPr>
@@ -6618,7 +6594,7 @@
                         <m:sSubPr>
                           <m:ctrlPr>
                             <a:rPr lang="en-US" sz="1400" b="0" i="1" smtClean="0">
-                              <a:latin typeface="Cambria Math"/>
+                              <a:latin typeface="Cambria Math" panose="02040503050406030204" pitchFamily="18" charset="0"/>
                               <a:ea typeface="Cambria Math"/>
                             </a:rPr>
                           </m:ctrlPr>
@@ -6653,7 +6629,7 @@
                         <m:fPr>
                           <m:ctrlPr>
                             <a:rPr lang="en-US" sz="1400" b="0" i="1" smtClean="0">
-                              <a:latin typeface="Cambria Math"/>
+                              <a:latin typeface="Cambria Math" panose="02040503050406030204" pitchFamily="18" charset="0"/>
                               <a:ea typeface="Cambria Math"/>
                             </a:rPr>
                           </m:ctrlPr>
@@ -6663,7 +6639,7 @@
                             <m:sSubPr>
                               <m:ctrlPr>
                                 <a:rPr lang="en-US" sz="1400" b="0" i="1" smtClean="0">
-                                  <a:latin typeface="Cambria Math"/>
+                                  <a:latin typeface="Cambria Math" panose="02040503050406030204" pitchFamily="18" charset="0"/>
                                   <a:ea typeface="Cambria Math"/>
                                 </a:rPr>
                               </m:ctrlPr>
@@ -6698,7 +6674,7 @@
                             <m:sSubPr>
                               <m:ctrlPr>
                                 <a:rPr lang="en-US" sz="1400" b="0" i="1" smtClean="0">
-                                  <a:latin typeface="Cambria Math"/>
+                                  <a:latin typeface="Cambria Math" panose="02040503050406030204" pitchFamily="18" charset="0"/>
                                   <a:ea typeface="Cambria Math"/>
                                 </a:rPr>
                               </m:ctrlPr>
@@ -6728,7 +6704,7 @@
                             <m:sSubPr>
                               <m:ctrlPr>
                                 <a:rPr lang="en-US" sz="1400" b="0" i="1" smtClean="0">
-                                  <a:latin typeface="Cambria Math"/>
+                                  <a:latin typeface="Cambria Math" panose="02040503050406030204" pitchFamily="18" charset="0"/>
                                   <a:ea typeface="Cambria Math"/>
                                 </a:rPr>
                               </m:ctrlPr>
@@ -6765,7 +6741,7 @@
                         <m:sSubPr>
                           <m:ctrlPr>
                             <a:rPr lang="en-US" sz="1400" b="0" i="1" smtClean="0">
-                              <a:latin typeface="Cambria Math"/>
+                              <a:latin typeface="Cambria Math" panose="02040503050406030204" pitchFamily="18" charset="0"/>
                               <a:ea typeface="Cambria Math"/>
                             </a:rPr>
                           </m:ctrlPr>
@@ -6800,7 +6776,7 @@
                         <m:fPr>
                           <m:ctrlPr>
                             <a:rPr lang="en-US" sz="1400" b="0" i="1" smtClean="0">
-                              <a:latin typeface="Cambria Math"/>
+                              <a:latin typeface="Cambria Math" panose="02040503050406030204" pitchFamily="18" charset="0"/>
                               <a:ea typeface="Cambria Math"/>
                             </a:rPr>
                           </m:ctrlPr>
@@ -6810,7 +6786,7 @@
                             <m:sSubPr>
                               <m:ctrlPr>
                                 <a:rPr lang="en-US" sz="1400" b="0" i="1" smtClean="0">
-                                  <a:latin typeface="Cambria Math"/>
+                                  <a:latin typeface="Cambria Math" panose="02040503050406030204" pitchFamily="18" charset="0"/>
                                   <a:ea typeface="Cambria Math"/>
                                 </a:rPr>
                               </m:ctrlPr>
@@ -6845,7 +6821,7 @@
                             <m:sSubPr>
                               <m:ctrlPr>
                                 <a:rPr lang="en-US" sz="1400" b="0" i="1" smtClean="0">
-                                  <a:latin typeface="Cambria Math"/>
+                                  <a:latin typeface="Cambria Math" panose="02040503050406030204" pitchFamily="18" charset="0"/>
                                   <a:ea typeface="Cambria Math"/>
                                 </a:rPr>
                               </m:ctrlPr>
@@ -6875,7 +6851,7 @@
                             <m:sSubPr>
                               <m:ctrlPr>
                                 <a:rPr lang="en-US" sz="1400" b="0" i="1" smtClean="0">
-                                  <a:latin typeface="Cambria Math"/>
+                                  <a:latin typeface="Cambria Math" panose="02040503050406030204" pitchFamily="18" charset="0"/>
                                   <a:ea typeface="Cambria Math"/>
                                 </a:rPr>
                               </m:ctrlPr>
@@ -6912,7 +6888,7 @@
                         <m:sSubPr>
                           <m:ctrlPr>
                             <a:rPr lang="en-US" sz="1400" b="0" i="1" smtClean="0">
-                              <a:latin typeface="Cambria Math"/>
+                              <a:latin typeface="Cambria Math" panose="02040503050406030204" pitchFamily="18" charset="0"/>
                               <a:ea typeface="Cambria Math"/>
                             </a:rPr>
                           </m:ctrlPr>
@@ -6947,7 +6923,7 @@
                         <m:fPr>
                           <m:ctrlPr>
                             <a:rPr lang="en-US" sz="1400" b="0" i="1" smtClean="0">
-                              <a:latin typeface="Cambria Math"/>
+                              <a:latin typeface="Cambria Math" panose="02040503050406030204" pitchFamily="18" charset="0"/>
                               <a:ea typeface="Cambria Math"/>
                             </a:rPr>
                           </m:ctrlPr>
@@ -6957,7 +6933,7 @@
                             <m:sSubPr>
                               <m:ctrlPr>
                                 <a:rPr lang="en-US" sz="1400" b="0" i="1" smtClean="0">
-                                  <a:latin typeface="Cambria Math"/>
+                                  <a:latin typeface="Cambria Math" panose="02040503050406030204" pitchFamily="18" charset="0"/>
                                   <a:ea typeface="Cambria Math"/>
                                 </a:rPr>
                               </m:ctrlPr>
@@ -6987,7 +6963,7 @@
                             <m:sSubPr>
                               <m:ctrlPr>
                                 <a:rPr lang="en-US" sz="1400" b="0" i="1" smtClean="0">
-                                  <a:latin typeface="Cambria Math"/>
+                                  <a:latin typeface="Cambria Math" panose="02040503050406030204" pitchFamily="18" charset="0"/>
                                   <a:ea typeface="Cambria Math"/>
                                 </a:rPr>
                               </m:ctrlPr>
@@ -7024,7 +7000,7 @@
                         <m:sSubPr>
                           <m:ctrlPr>
                             <a:rPr lang="en-US" sz="1400" b="0" i="1" smtClean="0">
-                              <a:latin typeface="Cambria Math"/>
+                              <a:latin typeface="Cambria Math" panose="02040503050406030204" pitchFamily="18" charset="0"/>
                               <a:ea typeface="Cambria Math"/>
                             </a:rPr>
                           </m:ctrlPr>
@@ -7059,7 +7035,7 @@
                         <m:fPr>
                           <m:ctrlPr>
                             <a:rPr lang="en-US" sz="1400" b="0" i="1" smtClean="0">
-                              <a:latin typeface="Cambria Math"/>
+                              <a:latin typeface="Cambria Math" panose="02040503050406030204" pitchFamily="18" charset="0"/>
                               <a:ea typeface="Cambria Math"/>
                             </a:rPr>
                           </m:ctrlPr>
@@ -7069,7 +7045,7 @@
                             <m:sSubPr>
                               <m:ctrlPr>
                                 <a:rPr lang="en-US" sz="1400" b="0" i="1" smtClean="0">
-                                  <a:latin typeface="Cambria Math"/>
+                                  <a:latin typeface="Cambria Math" panose="02040503050406030204" pitchFamily="18" charset="0"/>
                                   <a:ea typeface="Cambria Math"/>
                                 </a:rPr>
                               </m:ctrlPr>
@@ -7099,7 +7075,7 @@
                             <m:sSubPr>
                               <m:ctrlPr>
                                 <a:rPr lang="en-US" sz="1400" b="0" i="1" smtClean="0">
-                                  <a:latin typeface="Cambria Math"/>
+                                  <a:latin typeface="Cambria Math" panose="02040503050406030204" pitchFamily="18" charset="0"/>
                                   <a:ea typeface="Cambria Math"/>
                                 </a:rPr>
                               </m:ctrlPr>
@@ -7136,7 +7112,7 @@
                         <m:sSubPr>
                           <m:ctrlPr>
                             <a:rPr lang="en-US" sz="1400" b="0" i="1" smtClean="0">
-                              <a:latin typeface="Cambria Math"/>
+                              <a:latin typeface="Cambria Math" panose="02040503050406030204" pitchFamily="18" charset="0"/>
                               <a:ea typeface="Cambria Math"/>
                             </a:rPr>
                           </m:ctrlPr>
@@ -7163,7 +7139,7 @@
                     </m:oMath>
                   </m:oMathPara>
                 </a14:m>
-                <a:endParaRPr lang="en-US" sz="1400" b="0" dirty="0" smtClean="0">
+                <a:endParaRPr lang="en-US" sz="1400" b="0" dirty="0">
                   <a:ea typeface="Cambria Math"/>
                 </a:endParaRPr>
               </a:p>
@@ -7179,7 +7155,7 @@
                         <m:sSubPr>
                           <m:ctrlPr>
                             <a:rPr lang="en-US" sz="1400" b="0" i="1" smtClean="0">
-                              <a:latin typeface="Cambria Math"/>
+                              <a:latin typeface="Cambria Math" panose="02040503050406030204" pitchFamily="18" charset="0"/>
                               <a:ea typeface="Cambria Math"/>
                             </a:rPr>
                           </m:ctrlPr>
@@ -7190,7 +7166,7 @@
                               <m:chr m:val="̇"/>
                               <m:ctrlPr>
                                 <a:rPr lang="en-US" sz="1400" b="0" i="1" smtClean="0">
-                                  <a:latin typeface="Cambria Math"/>
+                                  <a:latin typeface="Cambria Math" panose="02040503050406030204" pitchFamily="18" charset="0"/>
                                   <a:ea typeface="Cambria Math"/>
                                 </a:rPr>
                               </m:ctrlPr>
@@ -7227,7 +7203,7 @@
                         <m:sSubPr>
                           <m:ctrlPr>
                             <a:rPr lang="en-US" sz="1400" b="0" i="1" smtClean="0">
-                              <a:latin typeface="Cambria Math"/>
+                              <a:latin typeface="Cambria Math" panose="02040503050406030204" pitchFamily="18" charset="0"/>
                               <a:ea typeface="Cambria Math"/>
                             </a:rPr>
                           </m:ctrlPr>
@@ -7238,7 +7214,7 @@
                               <m:chr m:val="̇"/>
                               <m:ctrlPr>
                                 <a:rPr lang="en-US" sz="1400" b="0" i="1" smtClean="0">
-                                  <a:latin typeface="Cambria Math"/>
+                                  <a:latin typeface="Cambria Math" panose="02040503050406030204" pitchFamily="18" charset="0"/>
                                   <a:ea typeface="Cambria Math"/>
                                 </a:rPr>
                               </m:ctrlPr>
@@ -7275,7 +7251,7 @@
                         <m:sSubPr>
                           <m:ctrlPr>
                             <a:rPr lang="en-US" sz="1400" b="0" i="1" smtClean="0">
-                              <a:latin typeface="Cambria Math"/>
+                              <a:latin typeface="Cambria Math" panose="02040503050406030204" pitchFamily="18" charset="0"/>
                               <a:ea typeface="Cambria Math"/>
                             </a:rPr>
                           </m:ctrlPr>
@@ -7302,7 +7278,7 @@
                     </m:oMath>
                   </m:oMathPara>
                 </a14:m>
-                <a:endParaRPr lang="en-US" sz="1400" b="0" dirty="0" smtClean="0">
+                <a:endParaRPr lang="en-US" sz="1400" b="0" dirty="0">
                   <a:ea typeface="Cambria Math"/>
                 </a:endParaRPr>
               </a:p>
@@ -7324,7 +7300,7 @@
                           <m:chr m:val="̇"/>
                           <m:ctrlPr>
                             <a:rPr lang="en-US" sz="1400" b="0" i="1" smtClean="0">
-                              <a:latin typeface="Cambria Math"/>
+                              <a:latin typeface="Cambria Math" panose="02040503050406030204" pitchFamily="18" charset="0"/>
                               <a:ea typeface="Cambria Math"/>
                             </a:rPr>
                           </m:ctrlPr>
@@ -7370,7 +7346,7 @@
                     </m:oMath>
                   </m:oMathPara>
                 </a14:m>
-                <a:endParaRPr lang="en-US" sz="1400" b="0" dirty="0" smtClean="0">
+                <a:endParaRPr lang="en-US" sz="1400" b="0" dirty="0">
                   <a:ea typeface="Cambria Math"/>
                 </a:endParaRPr>
               </a:p>
@@ -7402,7 +7378,7 @@
                           <m:endChr m:val="]"/>
                           <m:ctrlPr>
                             <a:rPr lang="en-US" sz="1400" b="0" i="1" smtClean="0">
-                              <a:latin typeface="Cambria Math"/>
+                              <a:latin typeface="Cambria Math" panose="02040503050406030204" pitchFamily="18" charset="0"/>
                               <a:ea typeface="Cambria Math"/>
                             </a:rPr>
                           </m:ctrlPr>
@@ -7420,7 +7396,7 @@
                               </m:mcs>
                               <m:ctrlPr>
                                 <a:rPr lang="en-US" sz="1400" b="0" i="1" smtClean="0">
-                                  <a:latin typeface="Cambria Math"/>
+                                  <a:latin typeface="Cambria Math" panose="02040503050406030204" pitchFamily="18" charset="0"/>
                                   <a:ea typeface="Cambria Math"/>
                                 </a:rPr>
                               </m:ctrlPr>
@@ -7439,7 +7415,7 @@
                                     </m:mcs>
                                     <m:ctrlPr>
                                       <a:rPr lang="en-US" sz="1400" b="0" i="1" smtClean="0">
-                                        <a:latin typeface="Cambria Math"/>
+                                        <a:latin typeface="Cambria Math" panose="02040503050406030204" pitchFamily="18" charset="0"/>
                                         <a:ea typeface="Cambria Math"/>
                                       </a:rPr>
                                     </m:ctrlPr>
@@ -7457,7 +7433,7 @@
                                         <m:fPr>
                                           <m:ctrlPr>
                                             <a:rPr lang="en-US" sz="1400" b="0" i="1" smtClean="0">
-                                              <a:latin typeface="Cambria Math"/>
+                                              <a:latin typeface="Cambria Math" panose="02040503050406030204" pitchFamily="18" charset="0"/>
                                               <a:ea typeface="Cambria Math"/>
                                             </a:rPr>
                                           </m:ctrlPr>
@@ -7467,7 +7443,7 @@
                                             <m:sSubPr>
                                               <m:ctrlPr>
                                                 <a:rPr lang="en-US" sz="1400" b="0" i="1" smtClean="0">
-                                                  <a:latin typeface="Cambria Math"/>
+                                                  <a:latin typeface="Cambria Math" panose="02040503050406030204" pitchFamily="18" charset="0"/>
                                                   <a:ea typeface="Cambria Math"/>
                                                 </a:rPr>
                                               </m:ctrlPr>
@@ -7497,7 +7473,7 @@
                                             <m:sSubPr>
                                               <m:ctrlPr>
                                                 <a:rPr lang="en-US" sz="1400" b="0" i="1" smtClean="0">
-                                                  <a:latin typeface="Cambria Math"/>
+                                                  <a:latin typeface="Cambria Math" panose="02040503050406030204" pitchFamily="18" charset="0"/>
                                                   <a:ea typeface="Cambria Math"/>
                                                 </a:rPr>
                                               </m:ctrlPr>
@@ -7536,7 +7512,7 @@
                                         <m:fPr>
                                           <m:ctrlPr>
                                             <a:rPr lang="en-US" sz="1400" b="0" i="1" smtClean="0">
-                                              <a:latin typeface="Cambria Math"/>
+                                              <a:latin typeface="Cambria Math" panose="02040503050406030204" pitchFamily="18" charset="0"/>
                                               <a:ea typeface="Cambria Math"/>
                                             </a:rPr>
                                           </m:ctrlPr>
@@ -7546,7 +7522,7 @@
                                             <m:sSubPr>
                                               <m:ctrlPr>
                                                 <a:rPr lang="en-US" sz="1400" b="0" i="1" smtClean="0">
-                                                  <a:latin typeface="Cambria Math"/>
+                                                  <a:latin typeface="Cambria Math" panose="02040503050406030204" pitchFamily="18" charset="0"/>
                                                   <a:ea typeface="Cambria Math"/>
                                                 </a:rPr>
                                               </m:ctrlPr>
@@ -7576,7 +7552,7 @@
                                             <m:sSubPr>
                                               <m:ctrlPr>
                                                 <a:rPr lang="en-US" sz="1400" b="0" i="1" smtClean="0">
-                                                  <a:latin typeface="Cambria Math"/>
+                                                  <a:latin typeface="Cambria Math" panose="02040503050406030204" pitchFamily="18" charset="0"/>
                                                   <a:ea typeface="Cambria Math"/>
                                                 </a:rPr>
                                               </m:ctrlPr>
@@ -7639,7 +7615,7 @@
                                     </m:mcs>
                                     <m:ctrlPr>
                                       <a:rPr lang="en-US" sz="1400" b="0" i="1" smtClean="0">
-                                        <a:latin typeface="Cambria Math"/>
+                                        <a:latin typeface="Cambria Math" panose="02040503050406030204" pitchFamily="18" charset="0"/>
                                         <a:ea typeface="Cambria Math"/>
                                       </a:rPr>
                                     </m:ctrlPr>
@@ -7650,7 +7626,7 @@
                                         <m:fPr>
                                           <m:ctrlPr>
                                             <a:rPr lang="en-US" sz="1400" b="0" i="1" smtClean="0">
-                                              <a:latin typeface="Cambria Math"/>
+                                              <a:latin typeface="Cambria Math" panose="02040503050406030204" pitchFamily="18" charset="0"/>
                                               <a:ea typeface="Cambria Math"/>
                                             </a:rPr>
                                           </m:ctrlPr>
@@ -7660,7 +7636,7 @@
                                             <m:sSubPr>
                                               <m:ctrlPr>
                                                 <a:rPr lang="en-US" sz="1400" b="0" i="1" smtClean="0">
-                                                  <a:latin typeface="Cambria Math"/>
+                                                  <a:latin typeface="Cambria Math" panose="02040503050406030204" pitchFamily="18" charset="0"/>
                                                   <a:ea typeface="Cambria Math"/>
                                                 </a:rPr>
                                               </m:ctrlPr>
@@ -7690,7 +7666,7 @@
                                             <m:sSubPr>
                                               <m:ctrlPr>
                                                 <a:rPr lang="en-US" sz="1400" b="0" i="1" smtClean="0">
-                                                  <a:latin typeface="Cambria Math"/>
+                                                  <a:latin typeface="Cambria Math" panose="02040503050406030204" pitchFamily="18" charset="0"/>
                                                   <a:ea typeface="Cambria Math"/>
                                                 </a:rPr>
                                               </m:ctrlPr>
@@ -7722,7 +7698,7 @@
                                         <m:fPr>
                                           <m:ctrlPr>
                                             <a:rPr lang="en-US" sz="1400" b="0" i="1" smtClean="0">
-                                              <a:latin typeface="Cambria Math"/>
+                                              <a:latin typeface="Cambria Math" panose="02040503050406030204" pitchFamily="18" charset="0"/>
                                               <a:ea typeface="Cambria Math"/>
                                             </a:rPr>
                                           </m:ctrlPr>
@@ -7732,7 +7708,7 @@
                                             <m:sSubPr>
                                               <m:ctrlPr>
                                                 <a:rPr lang="en-US" sz="1400" b="0" i="1" smtClean="0">
-                                                  <a:latin typeface="Cambria Math"/>
+                                                  <a:latin typeface="Cambria Math" panose="02040503050406030204" pitchFamily="18" charset="0"/>
                                                   <a:ea typeface="Cambria Math"/>
                                                 </a:rPr>
                                               </m:ctrlPr>
@@ -7762,7 +7738,7 @@
                                             <m:sSubPr>
                                               <m:ctrlPr>
                                                 <a:rPr lang="en-US" sz="1400" b="0" i="1" smtClean="0">
-                                                  <a:latin typeface="Cambria Math"/>
+                                                  <a:latin typeface="Cambria Math" panose="02040503050406030204" pitchFamily="18" charset="0"/>
                                                   <a:ea typeface="Cambria Math"/>
                                                 </a:rPr>
                                               </m:ctrlPr>
@@ -7827,7 +7803,7 @@
                                     </m:mcs>
                                     <m:ctrlPr>
                                       <a:rPr lang="en-US" sz="1400" b="0" i="1" smtClean="0">
-                                        <a:latin typeface="Cambria Math"/>
+                                        <a:latin typeface="Cambria Math" panose="02040503050406030204" pitchFamily="18" charset="0"/>
                                         <a:ea typeface="Cambria Math"/>
                                       </a:rPr>
                                     </m:ctrlPr>
@@ -7838,7 +7814,7 @@
                                         <m:fPr>
                                           <m:ctrlPr>
                                             <a:rPr lang="en-US" sz="1400" b="0" i="1" smtClean="0">
-                                              <a:latin typeface="Cambria Math"/>
+                                              <a:latin typeface="Cambria Math" panose="02040503050406030204" pitchFamily="18" charset="0"/>
                                               <a:ea typeface="Cambria Math"/>
                                             </a:rPr>
                                           </m:ctrlPr>
@@ -7848,7 +7824,7 @@
                                             <m:sSubPr>
                                               <m:ctrlPr>
                                                 <a:rPr lang="en-US" sz="1400" b="0" i="1" smtClean="0">
-                                                  <a:latin typeface="Cambria Math"/>
+                                                  <a:latin typeface="Cambria Math" panose="02040503050406030204" pitchFamily="18" charset="0"/>
                                                   <a:ea typeface="Cambria Math"/>
                                                 </a:rPr>
                                               </m:ctrlPr>
@@ -7878,7 +7854,7 @@
                                             <m:sSubPr>
                                               <m:ctrlPr>
                                                 <a:rPr lang="en-US" sz="1400" b="0" i="1" smtClean="0">
-                                                  <a:latin typeface="Cambria Math"/>
+                                                  <a:latin typeface="Cambria Math" panose="02040503050406030204" pitchFamily="18" charset="0"/>
                                                   <a:ea typeface="Cambria Math"/>
                                                 </a:rPr>
                                               </m:ctrlPr>
@@ -7910,7 +7886,7 @@
                                         <m:fPr>
                                           <m:ctrlPr>
                                             <a:rPr lang="en-US" sz="1400" b="0" i="1" smtClean="0">
-                                              <a:latin typeface="Cambria Math"/>
+                                              <a:latin typeface="Cambria Math" panose="02040503050406030204" pitchFamily="18" charset="0"/>
                                               <a:ea typeface="Cambria Math"/>
                                             </a:rPr>
                                           </m:ctrlPr>
@@ -7920,7 +7896,7 @@
                                             <m:sSubPr>
                                               <m:ctrlPr>
                                                 <a:rPr lang="en-US" sz="1400" b="0" i="1" smtClean="0">
-                                                  <a:latin typeface="Cambria Math"/>
+                                                  <a:latin typeface="Cambria Math" panose="02040503050406030204" pitchFamily="18" charset="0"/>
                                                   <a:ea typeface="Cambria Math"/>
                                                 </a:rPr>
                                               </m:ctrlPr>
@@ -7950,7 +7926,7 @@
                                             <m:sSubPr>
                                               <m:ctrlPr>
                                                 <a:rPr lang="en-US" sz="1400" b="0" i="1" smtClean="0">
-                                                  <a:latin typeface="Cambria Math"/>
+                                                  <a:latin typeface="Cambria Math" panose="02040503050406030204" pitchFamily="18" charset="0"/>
                                                   <a:ea typeface="Cambria Math"/>
                                                 </a:rPr>
                                               </m:ctrlPr>
@@ -8013,7 +7989,7 @@
                                     </m:mcs>
                                     <m:ctrlPr>
                                       <a:rPr lang="en-US" sz="1400" b="0" i="1" smtClean="0">
-                                        <a:latin typeface="Cambria Math"/>
+                                        <a:latin typeface="Cambria Math" panose="02040503050406030204" pitchFamily="18" charset="0"/>
                                         <a:ea typeface="Cambria Math"/>
                                       </a:rPr>
                                     </m:ctrlPr>
@@ -8031,7 +8007,7 @@
                                         <m:fPr>
                                           <m:ctrlPr>
                                             <a:rPr lang="en-US" sz="1400" b="0" i="1" smtClean="0">
-                                              <a:latin typeface="Cambria Math"/>
+                                              <a:latin typeface="Cambria Math" panose="02040503050406030204" pitchFamily="18" charset="0"/>
                                               <a:ea typeface="Cambria Math"/>
                                             </a:rPr>
                                           </m:ctrlPr>
@@ -8041,7 +8017,7 @@
                                             <m:sSubPr>
                                               <m:ctrlPr>
                                                 <a:rPr lang="en-US" sz="1400" b="0" i="1" smtClean="0">
-                                                  <a:latin typeface="Cambria Math"/>
+                                                  <a:latin typeface="Cambria Math" panose="02040503050406030204" pitchFamily="18" charset="0"/>
                                                   <a:ea typeface="Cambria Math"/>
                                                 </a:rPr>
                                               </m:ctrlPr>
@@ -8076,7 +8052,7 @@
                                             <m:sSubPr>
                                               <m:ctrlPr>
                                                 <a:rPr lang="en-US" sz="1400" b="0" i="1" smtClean="0">
-                                                  <a:latin typeface="Cambria Math"/>
+                                                  <a:latin typeface="Cambria Math" panose="02040503050406030204" pitchFamily="18" charset="0"/>
                                                   <a:ea typeface="Cambria Math"/>
                                                 </a:rPr>
                                               </m:ctrlPr>
@@ -8106,7 +8082,7 @@
                                             <m:sSubPr>
                                               <m:ctrlPr>
                                                 <a:rPr lang="en-US" sz="1400" b="0" i="1" smtClean="0">
-                                                  <a:latin typeface="Cambria Math"/>
+                                                  <a:latin typeface="Cambria Math" panose="02040503050406030204" pitchFamily="18" charset="0"/>
                                                   <a:ea typeface="Cambria Math"/>
                                                 </a:rPr>
                                               </m:ctrlPr>
@@ -8145,7 +8121,7 @@
                                         <m:fPr>
                                           <m:ctrlPr>
                                             <a:rPr lang="en-US" sz="1400" b="0" i="1" smtClean="0">
-                                              <a:latin typeface="Cambria Math"/>
+                                              <a:latin typeface="Cambria Math" panose="02040503050406030204" pitchFamily="18" charset="0"/>
                                               <a:ea typeface="Cambria Math"/>
                                             </a:rPr>
                                           </m:ctrlPr>
@@ -8155,7 +8131,7 @@
                                             <m:sSubPr>
                                               <m:ctrlPr>
                                                 <a:rPr lang="en-US" sz="1400" b="0" i="1" smtClean="0">
-                                                  <a:latin typeface="Cambria Math"/>
+                                                  <a:latin typeface="Cambria Math" panose="02040503050406030204" pitchFamily="18" charset="0"/>
                                                   <a:ea typeface="Cambria Math"/>
                                                 </a:rPr>
                                               </m:ctrlPr>
@@ -8190,7 +8166,7 @@
                                             <m:sSubPr>
                                               <m:ctrlPr>
                                                 <a:rPr lang="en-US" sz="1400" b="0" i="1" smtClean="0">
-                                                  <a:latin typeface="Cambria Math"/>
+                                                  <a:latin typeface="Cambria Math" panose="02040503050406030204" pitchFamily="18" charset="0"/>
                                                   <a:ea typeface="Cambria Math"/>
                                                 </a:rPr>
                                               </m:ctrlPr>
@@ -8220,7 +8196,7 @@
                                             <m:sSubPr>
                                               <m:ctrlPr>
                                                 <a:rPr lang="en-US" sz="1400" b="0" i="1" smtClean="0">
-                                                  <a:latin typeface="Cambria Math"/>
+                                                  <a:latin typeface="Cambria Math" panose="02040503050406030204" pitchFamily="18" charset="0"/>
                                                   <a:ea typeface="Cambria Math"/>
                                                 </a:rPr>
                                               </m:ctrlPr>
@@ -8277,7 +8253,7 @@
                     </m:oMath>
                   </m:oMathPara>
                 </a14:m>
-                <a:endParaRPr lang="en-US" sz="1400" b="0" dirty="0" smtClean="0">
+                <a:endParaRPr lang="en-US" sz="1400" b="0" dirty="0">
                   <a:ea typeface="Cambria Math"/>
                 </a:endParaRPr>
               </a:p>
@@ -8309,7 +8285,7 @@
                           <m:endChr m:val="]"/>
                           <m:ctrlPr>
                             <a:rPr lang="en-US" sz="1400" b="0" i="1" smtClean="0">
-                              <a:latin typeface="Cambria Math"/>
+                              <a:latin typeface="Cambria Math" panose="02040503050406030204" pitchFamily="18" charset="0"/>
                               <a:ea typeface="Cambria Math"/>
                             </a:rPr>
                           </m:ctrlPr>
@@ -8327,7 +8303,7 @@
                               </m:mcs>
                               <m:ctrlPr>
                                 <a:rPr lang="en-US" sz="1400" b="0" i="1" smtClean="0">
-                                  <a:latin typeface="Cambria Math"/>
+                                  <a:latin typeface="Cambria Math" panose="02040503050406030204" pitchFamily="18" charset="0"/>
                                   <a:ea typeface="Cambria Math"/>
                                 </a:rPr>
                               </m:ctrlPr>
@@ -8346,7 +8322,7 @@
                                     </m:mcs>
                                     <m:ctrlPr>
                                       <a:rPr lang="en-US" sz="1400" b="0" i="1" smtClean="0">
-                                        <a:latin typeface="Cambria Math"/>
+                                        <a:latin typeface="Cambria Math" panose="02040503050406030204" pitchFamily="18" charset="0"/>
                                         <a:ea typeface="Cambria Math"/>
                                       </a:rPr>
                                     </m:ctrlPr>
@@ -8357,7 +8333,7 @@
                                         <m:fPr>
                                           <m:ctrlPr>
                                             <a:rPr lang="en-US" sz="1400" b="0" i="1" smtClean="0">
-                                              <a:latin typeface="Cambria Math"/>
+                                              <a:latin typeface="Cambria Math" panose="02040503050406030204" pitchFamily="18" charset="0"/>
                                               <a:ea typeface="Cambria Math"/>
                                             </a:rPr>
                                           </m:ctrlPr>
@@ -8367,7 +8343,7 @@
                                             <m:sSubPr>
                                               <m:ctrlPr>
                                                 <a:rPr lang="en-US" sz="1400" b="0" i="1" smtClean="0">
-                                                  <a:latin typeface="Cambria Math"/>
+                                                  <a:latin typeface="Cambria Math" panose="02040503050406030204" pitchFamily="18" charset="0"/>
                                                   <a:ea typeface="Cambria Math"/>
                                                 </a:rPr>
                                               </m:ctrlPr>
@@ -8397,7 +8373,7 @@
                                             <m:sSubPr>
                                               <m:ctrlPr>
                                                 <a:rPr lang="en-US" sz="1400" b="0" i="1" smtClean="0">
-                                                  <a:latin typeface="Cambria Math"/>
+                                                  <a:latin typeface="Cambria Math" panose="02040503050406030204" pitchFamily="18" charset="0"/>
                                                   <a:ea typeface="Cambria Math"/>
                                                 </a:rPr>
                                               </m:ctrlPr>
@@ -8451,7 +8427,7 @@
                                     </m:mcs>
                                     <m:ctrlPr>
                                       <a:rPr lang="en-US" sz="1400" b="0" i="1" smtClean="0">
-                                        <a:latin typeface="Cambria Math"/>
+                                        <a:latin typeface="Cambria Math" panose="02040503050406030204" pitchFamily="18" charset="0"/>
                                         <a:ea typeface="Cambria Math"/>
                                       </a:rPr>
                                     </m:ctrlPr>
@@ -8462,7 +8438,7 @@
                                         <m:fPr>
                                           <m:ctrlPr>
                                             <a:rPr lang="en-US" sz="1400" b="0" i="1" smtClean="0">
-                                              <a:latin typeface="Cambria Math"/>
+                                              <a:latin typeface="Cambria Math" panose="02040503050406030204" pitchFamily="18" charset="0"/>
                                               <a:ea typeface="Cambria Math"/>
                                             </a:rPr>
                                           </m:ctrlPr>
@@ -8472,7 +8448,7 @@
                                             <m:sSubPr>
                                               <m:ctrlPr>
                                                 <a:rPr lang="en-US" sz="1400" b="0" i="1" smtClean="0">
-                                                  <a:latin typeface="Cambria Math"/>
+                                                  <a:latin typeface="Cambria Math" panose="02040503050406030204" pitchFamily="18" charset="0"/>
                                                   <a:ea typeface="Cambria Math"/>
                                                 </a:rPr>
                                               </m:ctrlPr>
@@ -8502,7 +8478,7 @@
                                             <m:sSubPr>
                                               <m:ctrlPr>
                                                 <a:rPr lang="en-US" sz="1400" b="0" i="1" smtClean="0">
-                                                  <a:latin typeface="Cambria Math"/>
+                                                  <a:latin typeface="Cambria Math" panose="02040503050406030204" pitchFamily="18" charset="0"/>
                                                   <a:ea typeface="Cambria Math"/>
                                                 </a:rPr>
                                               </m:ctrlPr>
@@ -8558,7 +8534,7 @@
                                     </m:mcs>
                                     <m:ctrlPr>
                                       <a:rPr lang="en-US" sz="1400" b="0" i="1" smtClean="0">
-                                        <a:latin typeface="Cambria Math"/>
+                                        <a:latin typeface="Cambria Math" panose="02040503050406030204" pitchFamily="18" charset="0"/>
                                         <a:ea typeface="Cambria Math"/>
                                       </a:rPr>
                                     </m:ctrlPr>
@@ -8576,7 +8552,7 @@
                                         <m:fPr>
                                           <m:ctrlPr>
                                             <a:rPr lang="en-US" sz="1400" b="0" i="1" smtClean="0">
-                                              <a:latin typeface="Cambria Math"/>
+                                              <a:latin typeface="Cambria Math" panose="02040503050406030204" pitchFamily="18" charset="0"/>
                                               <a:ea typeface="Cambria Math"/>
                                             </a:rPr>
                                           </m:ctrlPr>
@@ -8586,7 +8562,7 @@
                                             <m:sSubPr>
                                               <m:ctrlPr>
                                                 <a:rPr lang="en-US" sz="1400" b="0" i="1" smtClean="0">
-                                                  <a:latin typeface="Cambria Math"/>
+                                                  <a:latin typeface="Cambria Math" panose="02040503050406030204" pitchFamily="18" charset="0"/>
                                                   <a:ea typeface="Cambria Math"/>
                                                 </a:rPr>
                                               </m:ctrlPr>
@@ -8616,7 +8592,7 @@
                                             <m:sSubPr>
                                               <m:ctrlPr>
                                                 <a:rPr lang="en-US" sz="1400" b="0" i="1" smtClean="0">
-                                                  <a:latin typeface="Cambria Math"/>
+                                                  <a:latin typeface="Cambria Math" panose="02040503050406030204" pitchFamily="18" charset="0"/>
                                                   <a:ea typeface="Cambria Math"/>
                                                 </a:rPr>
                                               </m:ctrlPr>
@@ -8670,7 +8646,7 @@
                                     </m:mcs>
                                     <m:ctrlPr>
                                       <a:rPr lang="en-US" sz="1400" b="0" i="1" smtClean="0">
-                                        <a:latin typeface="Cambria Math"/>
+                                        <a:latin typeface="Cambria Math" panose="02040503050406030204" pitchFamily="18" charset="0"/>
                                         <a:ea typeface="Cambria Math"/>
                                       </a:rPr>
                                     </m:ctrlPr>
@@ -8688,7 +8664,7 @@
                                         <m:fPr>
                                           <m:ctrlPr>
                                             <a:rPr lang="en-US" sz="1400" b="0" i="1" smtClean="0">
-                                              <a:latin typeface="Cambria Math"/>
+                                              <a:latin typeface="Cambria Math" panose="02040503050406030204" pitchFamily="18" charset="0"/>
                                               <a:ea typeface="Cambria Math"/>
                                             </a:rPr>
                                           </m:ctrlPr>
@@ -8698,7 +8674,7 @@
                                             <m:sSubPr>
                                               <m:ctrlPr>
                                                 <a:rPr lang="en-US" sz="1400" b="0" i="1" smtClean="0">
-                                                  <a:latin typeface="Cambria Math"/>
+                                                  <a:latin typeface="Cambria Math" panose="02040503050406030204" pitchFamily="18" charset="0"/>
                                                   <a:ea typeface="Cambria Math"/>
                                                 </a:rPr>
                                               </m:ctrlPr>
@@ -8728,7 +8704,7 @@
                                             <m:sSubPr>
                                               <m:ctrlPr>
                                                 <a:rPr lang="en-US" sz="1400" b="0" i="1" smtClean="0">
-                                                  <a:latin typeface="Cambria Math"/>
+                                                  <a:latin typeface="Cambria Math" panose="02040503050406030204" pitchFamily="18" charset="0"/>
                                                   <a:ea typeface="Cambria Math"/>
                                                 </a:rPr>
                                               </m:ctrlPr>
@@ -8776,12 +8752,12 @@
                     </m:oMath>
                   </m:oMathPara>
                 </a14:m>
-                <a:endParaRPr lang="en-US" sz="1400" b="0" dirty="0" smtClean="0">
+                <a:endParaRPr lang="en-US" sz="1400" b="0" dirty="0">
                   <a:ea typeface="Cambria Math"/>
                 </a:endParaRPr>
               </a:p>
               <a:p>
-                <a:endParaRPr lang="en-US" sz="1400" b="0" dirty="0" smtClean="0">
+                <a:endParaRPr lang="en-US" sz="1400" b="0" dirty="0">
                   <a:ea typeface="Cambria Math"/>
                 </a:endParaRPr>
               </a:p>
@@ -8844,13 +8820,6 @@
   <p:clrMapOvr>
     <a:masterClrMapping/>
   </p:clrMapOvr>
-  <p:timing>
-    <p:tnLst>
-      <p:par>
-        <p:cTn id="1" dur="indefinite" restart="never" nodeType="tmRoot"/>
-      </p:par>
-    </p:tnLst>
-  </p:timing>
 </p:sld>
 </file>
 
@@ -8970,7 +8939,7 @@
           <a:p>
             <a:pPr algn="ctr"/>
             <a:r>
-              <a:rPr lang="en-US" sz="2400" b="1" dirty="0" smtClean="0">
+              <a:rPr lang="en-US" sz="2400" b="1" dirty="0">
                 <a:ln w="19050">
                   <a:solidFill>
                     <a:schemeClr val="tx1"/>
@@ -8982,16 +8951,6 @@
               </a:rPr>
               <a:t>Vehicle</a:t>
             </a:r>
-            <a:endParaRPr lang="en-US" sz="2400" b="1" dirty="0">
-              <a:ln w="19050">
-                <a:solidFill>
-                  <a:schemeClr val="tx1"/>
-                </a:solidFill>
-              </a:ln>
-              <a:solidFill>
-                <a:schemeClr val="bg1"/>
-              </a:solidFill>
-            </a:endParaRPr>
           </a:p>
         </p:txBody>
       </p:sp>
@@ -9152,7 +9111,7 @@
           <a:lstStyle/>
           <a:p>
             <a:r>
-              <a:rPr lang="en-US" sz="1400" dirty="0" smtClean="0">
+              <a:rPr lang="en-US" sz="1400" dirty="0">
                 <a:sym typeface="Symbol"/>
               </a:rPr>
               <a:t>(t)</a:t>
@@ -9482,7 +9441,7 @@
               <a:t>z</a:t>
             </a:r>
             <a:r>
-              <a:rPr lang="en-US" baseline="-25000" dirty="0" err="1" smtClean="0"/>
+              <a:rPr lang="en-US" baseline="-25000" dirty="0" err="1"/>
               <a:t>b</a:t>
             </a:r>
             <a:endParaRPr lang="en-US" baseline="-25000" dirty="0"/>
@@ -9512,7 +9471,7 @@
           <a:lstStyle/>
           <a:p>
             <a:r>
-              <a:rPr lang="en-US" dirty="0" err="1" smtClean="0"/>
+              <a:rPr lang="en-US" dirty="0" err="1"/>
               <a:t>u</a:t>
             </a:r>
             <a:r>
@@ -9547,7 +9506,7 @@
           <a:p>
             <a:pPr algn="r"/>
             <a:r>
-              <a:rPr lang="en-US" dirty="0" err="1" smtClean="0"/>
+              <a:rPr lang="en-US" dirty="0" err="1"/>
               <a:t>k</a:t>
             </a:r>
             <a:r>
@@ -9581,7 +9540,7 @@
           <a:lstStyle/>
           <a:p>
             <a:r>
-              <a:rPr lang="en-US" dirty="0" err="1" smtClean="0"/>
+              <a:rPr lang="en-US" dirty="0" err="1"/>
               <a:t>c</a:t>
             </a:r>
             <a:r>
@@ -9925,7 +9884,7 @@
           <a:p>
             <a:pPr algn="ctr"/>
             <a:r>
-              <a:rPr lang="en-US" sz="2400" b="1" dirty="0" smtClean="0">
+              <a:rPr lang="en-US" sz="2400" b="1" dirty="0">
                 <a:ln w="19050">
                   <a:solidFill>
                     <a:schemeClr val="tx1"/>
@@ -9937,16 +9896,6 @@
               </a:rPr>
               <a:t>Vehicle</a:t>
             </a:r>
-            <a:endParaRPr lang="en-US" sz="2400" b="1" dirty="0">
-              <a:ln w="19050">
-                <a:solidFill>
-                  <a:schemeClr val="tx1"/>
-                </a:solidFill>
-              </a:ln>
-              <a:solidFill>
-                <a:schemeClr val="bg1"/>
-              </a:solidFill>
-            </a:endParaRPr>
           </a:p>
         </p:txBody>
       </p:sp>
@@ -10107,7 +10056,7 @@
           <a:lstStyle/>
           <a:p>
             <a:r>
-              <a:rPr lang="en-US" sz="1400" dirty="0" smtClean="0">
+              <a:rPr lang="en-US" sz="1400" dirty="0">
                 <a:sym typeface="Symbol"/>
               </a:rPr>
               <a:t>(t)</a:t>
@@ -10437,7 +10386,7 @@
               <a:t>z</a:t>
             </a:r>
             <a:r>
-              <a:rPr lang="en-US" baseline="-25000" dirty="0" err="1" smtClean="0"/>
+              <a:rPr lang="en-US" baseline="-25000" dirty="0" err="1"/>
               <a:t>b</a:t>
             </a:r>
             <a:endParaRPr lang="en-US" baseline="-25000" dirty="0"/>
@@ -10467,7 +10416,7 @@
           <a:lstStyle/>
           <a:p>
             <a:r>
-              <a:rPr lang="en-US" dirty="0" err="1" smtClean="0"/>
+              <a:rPr lang="en-US" dirty="0" err="1"/>
               <a:t>u</a:t>
             </a:r>
             <a:r>
@@ -10502,7 +10451,7 @@
           <a:p>
             <a:pPr algn="r"/>
             <a:r>
-              <a:rPr lang="en-US" dirty="0" err="1" smtClean="0"/>
+              <a:rPr lang="en-US" dirty="0" err="1"/>
               <a:t>k</a:t>
             </a:r>
             <a:r>
@@ -10536,7 +10485,7 @@
           <a:lstStyle/>
           <a:p>
             <a:r>
-              <a:rPr lang="en-US" dirty="0" err="1" smtClean="0"/>
+              <a:rPr lang="en-US" dirty="0" err="1"/>
               <a:t>c</a:t>
             </a:r>
             <a:r>
@@ -10932,8 +10881,8 @@
           </a:p>
         </p:txBody>
       </p:sp>
-      <mc:AlternateContent xmlns:mc="http://schemas.openxmlformats.org/markup-compatibility/2006">
-        <mc:Choice xmlns:a14="http://schemas.microsoft.com/office/drawing/2010/main" Requires="a14">
+      <mc:AlternateContent xmlns:mc="http://schemas.openxmlformats.org/markup-compatibility/2006" xmlns:a14="http://schemas.microsoft.com/office/drawing/2010/main">
+        <mc:Choice Requires="a14">
           <p:sp>
             <p:nvSpPr>
               <p:cNvPr id="16" name="TextBox 15"/>
@@ -10956,6 +10905,7 @@
               </a:bodyPr>
               <a:lstStyle/>
               <a:p>
+                <a:pPr/>
                 <a14:m>
                   <m:oMathPara xmlns:m="http://schemas.openxmlformats.org/officeDocument/2006/math">
                     <m:oMathParaPr>
@@ -10966,7 +10916,7 @@
                         <m:sSubPr>
                           <m:ctrlPr>
                             <a:rPr lang="en-US" i="1" smtClean="0">
-                              <a:latin typeface="Cambria Math"/>
+                              <a:latin typeface="Cambria Math" panose="02040503050406030204" pitchFamily="18" charset="0"/>
                             </a:rPr>
                           </m:ctrlPr>
                         </m:sSubPr>
@@ -10991,7 +10941,7 @@
                         <m:dPr>
                           <m:ctrlPr>
                             <a:rPr lang="en-US" b="0" i="1" smtClean="0">
-                              <a:latin typeface="Cambria Math"/>
+                              <a:latin typeface="Cambria Math" panose="02040503050406030204" pitchFamily="18" charset="0"/>
                             </a:rPr>
                           </m:ctrlPr>
                         </m:dPr>
@@ -11014,7 +10964,7 @@
                         <m:sSubPr>
                           <m:ctrlPr>
                             <a:rPr lang="en-US" b="0" i="1" smtClean="0">
-                              <a:latin typeface="Cambria Math"/>
+                              <a:latin typeface="Cambria Math" panose="02040503050406030204" pitchFamily="18" charset="0"/>
                             </a:rPr>
                           </m:ctrlPr>
                         </m:sSubPr>
@@ -11076,7 +11026,7 @@
             </p:txBody>
           </p:sp>
         </mc:Choice>
-        <mc:Fallback>
+        <mc:Fallback xmlns="">
           <p:sp>
             <p:nvSpPr>
               <p:cNvPr id="16" name="TextBox 15"/>
@@ -11163,13 +11113,1512 @@
   <p:clrMapOvr>
     <a:masterClrMapping/>
   </p:clrMapOvr>
-  <p:timing>
-    <p:tnLst>
-      <p:par>
-        <p:cTn id="1" dur="indefinite" restart="never" nodeType="tmRoot"/>
-      </p:par>
-    </p:tnLst>
-  </p:timing>
+</p:sld>
+</file>
+
+<file path=ppt/slides/slide3.xml><?xml version="1.0" encoding="utf-8"?>
+<p:sld xmlns:a="http://schemas.openxmlformats.org/drawingml/2006/main" xmlns:r="http://schemas.openxmlformats.org/officeDocument/2006/relationships" xmlns:p="http://schemas.openxmlformats.org/presentationml/2006/main">
+  <p:cSld>
+    <p:spTree>
+      <p:nvGrpSpPr>
+        <p:cNvPr id="1" name=""/>
+        <p:cNvGrpSpPr/>
+        <p:nvPr/>
+      </p:nvGrpSpPr>
+      <p:grpSpPr>
+        <a:xfrm>
+          <a:off x="0" y="0"/>
+          <a:ext cx="0" cy="0"/>
+          <a:chOff x="0" y="0"/>
+          <a:chExt cx="0" cy="0"/>
+        </a:xfrm>
+      </p:grpSpPr>
+      <p:sp>
+        <p:nvSpPr>
+          <p:cNvPr id="2" name="Right Arrow 1"/>
+          <p:cNvSpPr/>
+          <p:nvPr/>
+        </p:nvSpPr>
+        <p:spPr>
+          <a:xfrm>
+            <a:off x="3048000" y="1194014"/>
+            <a:ext cx="3048000" cy="267304"/>
+          </a:xfrm>
+          <a:prstGeom prst="rightArrow">
+            <a:avLst>
+              <a:gd name="adj1" fmla="val 29930"/>
+              <a:gd name="adj2" fmla="val 62557"/>
+            </a:avLst>
+          </a:prstGeom>
+          <a:noFill/>
+          <a:ln>
+            <a:solidFill>
+              <a:schemeClr val="tx1"/>
+            </a:solidFill>
+          </a:ln>
+        </p:spPr>
+        <p:style>
+          <a:lnRef idx="2">
+            <a:schemeClr val="accent1">
+              <a:shade val="50000"/>
+            </a:schemeClr>
+          </a:lnRef>
+          <a:fillRef idx="1">
+            <a:schemeClr val="accent1"/>
+          </a:fillRef>
+          <a:effectRef idx="0">
+            <a:schemeClr val="accent1"/>
+          </a:effectRef>
+          <a:fontRef idx="minor">
+            <a:schemeClr val="lt1"/>
+          </a:fontRef>
+        </p:style>
+        <p:txBody>
+          <a:bodyPr rtlCol="0" anchor="ctr"/>
+          <a:lstStyle/>
+          <a:p>
+            <a:pPr algn="ctr"/>
+            <a:endParaRPr lang="en-US"/>
+          </a:p>
+        </p:txBody>
+      </p:sp>
+      <p:sp>
+        <p:nvSpPr>
+          <p:cNvPr id="5" name="Rectangle 4"/>
+          <p:cNvSpPr/>
+          <p:nvPr/>
+        </p:nvSpPr>
+        <p:spPr>
+          <a:xfrm>
+            <a:off x="3973475" y="1196720"/>
+            <a:ext cx="1197050" cy="685800"/>
+          </a:xfrm>
+          <a:prstGeom prst="rect">
+            <a:avLst/>
+          </a:prstGeom>
+          <a:pattFill prst="wdUpDiag">
+            <a:fgClr>
+              <a:schemeClr val="bg1">
+                <a:lumMod val="50000"/>
+              </a:schemeClr>
+            </a:fgClr>
+            <a:bgClr>
+              <a:schemeClr val="bg1"/>
+            </a:bgClr>
+          </a:pattFill>
+          <a:ln>
+            <a:solidFill>
+              <a:schemeClr val="tx1"/>
+            </a:solidFill>
+          </a:ln>
+        </p:spPr>
+        <p:style>
+          <a:lnRef idx="2">
+            <a:schemeClr val="accent1">
+              <a:shade val="50000"/>
+            </a:schemeClr>
+          </a:lnRef>
+          <a:fillRef idx="1">
+            <a:schemeClr val="accent1"/>
+          </a:fillRef>
+          <a:effectRef idx="0">
+            <a:schemeClr val="accent1"/>
+          </a:effectRef>
+          <a:fontRef idx="minor">
+            <a:schemeClr val="lt1"/>
+          </a:fontRef>
+        </p:style>
+        <p:txBody>
+          <a:bodyPr rtlCol="0" anchor="ctr"/>
+          <a:lstStyle/>
+          <a:p>
+            <a:pPr algn="ctr"/>
+            <a:r>
+              <a:rPr lang="en-US" sz="2400" b="1" dirty="0">
+                <a:ln w="19050">
+                  <a:solidFill>
+                    <a:schemeClr val="tx1"/>
+                  </a:solidFill>
+                </a:ln>
+                <a:solidFill>
+                  <a:schemeClr val="bg1"/>
+                </a:solidFill>
+              </a:rPr>
+              <a:t>Vehicle</a:t>
+            </a:r>
+          </a:p>
+        </p:txBody>
+      </p:sp>
+      <p:sp>
+        <p:nvSpPr>
+          <p:cNvPr id="6" name="Rectangle 5"/>
+          <p:cNvSpPr/>
+          <p:nvPr/>
+        </p:nvSpPr>
+        <p:spPr>
+          <a:xfrm>
+            <a:off x="1828800" y="2796920"/>
+            <a:ext cx="5486400" cy="251080"/>
+          </a:xfrm>
+          <a:prstGeom prst="rect">
+            <a:avLst/>
+          </a:prstGeom>
+          <a:pattFill prst="wdUpDiag">
+            <a:fgClr>
+              <a:schemeClr val="bg1">
+                <a:lumMod val="50000"/>
+              </a:schemeClr>
+            </a:fgClr>
+            <a:bgClr>
+              <a:schemeClr val="bg1"/>
+            </a:bgClr>
+          </a:pattFill>
+          <a:ln>
+            <a:solidFill>
+              <a:schemeClr val="tx1"/>
+            </a:solidFill>
+          </a:ln>
+        </p:spPr>
+        <p:style>
+          <a:lnRef idx="2">
+            <a:schemeClr val="accent1">
+              <a:shade val="50000"/>
+            </a:schemeClr>
+          </a:lnRef>
+          <a:fillRef idx="1">
+            <a:schemeClr val="accent1"/>
+          </a:fillRef>
+          <a:effectRef idx="0">
+            <a:schemeClr val="accent1"/>
+          </a:effectRef>
+          <a:fontRef idx="minor">
+            <a:schemeClr val="lt1"/>
+          </a:fontRef>
+        </p:style>
+        <p:txBody>
+          <a:bodyPr rtlCol="0" anchor="ctr"/>
+          <a:lstStyle/>
+          <a:p>
+            <a:pPr algn="ctr"/>
+            <a:endParaRPr lang="en-US" sz="2800" b="1" dirty="0">
+              <a:ln w="19050">
+                <a:solidFill>
+                  <a:schemeClr val="tx1"/>
+                </a:solidFill>
+              </a:ln>
+              <a:solidFill>
+                <a:schemeClr val="bg1"/>
+              </a:solidFill>
+            </a:endParaRPr>
+          </a:p>
+        </p:txBody>
+      </p:sp>
+      <p:cxnSp>
+        <p:nvCxnSpPr>
+          <p:cNvPr id="7" name="Straight Connector 6"/>
+          <p:cNvCxnSpPr/>
+          <p:nvPr/>
+        </p:nvCxnSpPr>
+        <p:spPr>
+          <a:xfrm>
+            <a:off x="3890440" y="2487040"/>
+            <a:ext cx="1371600" cy="0"/>
+          </a:xfrm>
+          <a:prstGeom prst="line">
+            <a:avLst/>
+          </a:prstGeom>
+          <a:ln w="28575">
+            <a:solidFill>
+              <a:schemeClr val="tx1"/>
+            </a:solidFill>
+          </a:ln>
+        </p:spPr>
+        <p:style>
+          <a:lnRef idx="1">
+            <a:schemeClr val="accent1"/>
+          </a:lnRef>
+          <a:fillRef idx="0">
+            <a:schemeClr val="accent1"/>
+          </a:fillRef>
+          <a:effectRef idx="0">
+            <a:schemeClr val="accent1"/>
+          </a:effectRef>
+          <a:fontRef idx="minor">
+            <a:schemeClr val="tx1"/>
+          </a:fontRef>
+        </p:style>
+      </p:cxnSp>
+      <p:cxnSp>
+        <p:nvCxnSpPr>
+          <p:cNvPr id="8" name="Straight Connector 7"/>
+          <p:cNvCxnSpPr/>
+          <p:nvPr/>
+        </p:nvCxnSpPr>
+        <p:spPr>
+          <a:xfrm>
+            <a:off x="4504280" y="2482595"/>
+            <a:ext cx="0" cy="310896"/>
+          </a:xfrm>
+          <a:prstGeom prst="line">
+            <a:avLst/>
+          </a:prstGeom>
+          <a:ln w="15875">
+            <a:solidFill>
+              <a:schemeClr val="tx1"/>
+            </a:solidFill>
+            <a:headEnd type="stealth" w="med" len="lg"/>
+            <a:tailEnd type="stealth" w="med" len="lg"/>
+          </a:ln>
+        </p:spPr>
+        <p:style>
+          <a:lnRef idx="1">
+            <a:schemeClr val="accent1"/>
+          </a:lnRef>
+          <a:fillRef idx="0">
+            <a:schemeClr val="accent1"/>
+          </a:fillRef>
+          <a:effectRef idx="0">
+            <a:schemeClr val="accent1"/>
+          </a:effectRef>
+          <a:fontRef idx="minor">
+            <a:schemeClr val="tx1"/>
+          </a:fontRef>
+        </p:style>
+      </p:cxnSp>
+      <p:sp>
+        <p:nvSpPr>
+          <p:cNvPr id="9" name="TextBox 8"/>
+          <p:cNvSpPr txBox="1"/>
+          <p:nvPr/>
+        </p:nvSpPr>
+        <p:spPr>
+          <a:xfrm>
+            <a:off x="4466180" y="2485714"/>
+            <a:ext cx="495300" cy="307777"/>
+          </a:xfrm>
+          <a:prstGeom prst="rect">
+            <a:avLst/>
+          </a:prstGeom>
+          <a:noFill/>
+        </p:spPr>
+        <p:txBody>
+          <a:bodyPr wrap="square" rtlCol="0">
+            <a:spAutoFit/>
+          </a:bodyPr>
+          <a:lstStyle/>
+          <a:p>
+            <a:r>
+              <a:rPr lang="en-US" sz="1400" dirty="0">
+                <a:sym typeface="Symbol"/>
+              </a:rPr>
+              <a:t>(t)</a:t>
+            </a:r>
+            <a:endParaRPr lang="en-US" sz="1400" dirty="0"/>
+          </a:p>
+        </p:txBody>
+      </p:sp>
+      <p:grpSp>
+        <p:nvGrpSpPr>
+          <p:cNvPr id="10" name="Group 9"/>
+          <p:cNvGrpSpPr/>
+          <p:nvPr/>
+        </p:nvGrpSpPr>
+        <p:grpSpPr>
+          <a:xfrm>
+            <a:off x="4164149" y="1882519"/>
+            <a:ext cx="824182" cy="610111"/>
+            <a:chOff x="7146973" y="1142999"/>
+            <a:chExt cx="824182" cy="610111"/>
+          </a:xfrm>
+        </p:grpSpPr>
+        <p:grpSp>
+          <p:nvGrpSpPr>
+            <p:cNvPr id="28" name="Group 27"/>
+            <p:cNvGrpSpPr/>
+            <p:nvPr/>
+          </p:nvGrpSpPr>
+          <p:grpSpPr>
+            <a:xfrm>
+              <a:off x="7649845" y="1143000"/>
+              <a:ext cx="321310" cy="596900"/>
+              <a:chOff x="7031990" y="914400"/>
+              <a:chExt cx="533400" cy="876300"/>
+            </a:xfrm>
+          </p:grpSpPr>
+          <p:cxnSp>
+            <p:nvCxnSpPr>
+              <p:cNvPr id="30" name="Straight Connector 29"/>
+              <p:cNvCxnSpPr/>
+              <p:nvPr/>
+            </p:nvCxnSpPr>
+            <p:spPr>
+              <a:xfrm>
+                <a:off x="7298690" y="914400"/>
+                <a:ext cx="0" cy="381000"/>
+              </a:xfrm>
+              <a:prstGeom prst="line">
+                <a:avLst/>
+              </a:prstGeom>
+              <a:ln w="12700">
+                <a:solidFill>
+                  <a:schemeClr val="tx1"/>
+                </a:solidFill>
+              </a:ln>
+            </p:spPr>
+            <p:style>
+              <a:lnRef idx="1">
+                <a:schemeClr val="accent1"/>
+              </a:lnRef>
+              <a:fillRef idx="0">
+                <a:schemeClr val="accent1"/>
+              </a:fillRef>
+              <a:effectRef idx="0">
+                <a:schemeClr val="accent1"/>
+              </a:effectRef>
+              <a:fontRef idx="minor">
+                <a:schemeClr val="tx1"/>
+              </a:fontRef>
+            </p:style>
+          </p:cxnSp>
+          <p:grpSp>
+            <p:nvGrpSpPr>
+              <p:cNvPr id="31" name="Group 30"/>
+              <p:cNvGrpSpPr/>
+              <p:nvPr/>
+            </p:nvGrpSpPr>
+            <p:grpSpPr>
+              <a:xfrm>
+                <a:off x="7031990" y="1295400"/>
+                <a:ext cx="533400" cy="228600"/>
+                <a:chOff x="2819400" y="762000"/>
+                <a:chExt cx="533400" cy="228600"/>
+              </a:xfrm>
+            </p:grpSpPr>
+            <p:cxnSp>
+              <p:nvCxnSpPr>
+                <p:cNvPr id="34" name="Straight Connector 33"/>
+                <p:cNvCxnSpPr/>
+                <p:nvPr/>
+              </p:nvCxnSpPr>
+              <p:spPr>
+                <a:xfrm>
+                  <a:off x="2819400" y="762000"/>
+                  <a:ext cx="533400" cy="0"/>
+                </a:xfrm>
+                <a:prstGeom prst="line">
+                  <a:avLst/>
+                </a:prstGeom>
+                <a:ln w="12700">
+                  <a:solidFill>
+                    <a:schemeClr val="tx1"/>
+                  </a:solidFill>
+                </a:ln>
+              </p:spPr>
+              <p:style>
+                <a:lnRef idx="1">
+                  <a:schemeClr val="accent1"/>
+                </a:lnRef>
+                <a:fillRef idx="0">
+                  <a:schemeClr val="accent1"/>
+                </a:fillRef>
+                <a:effectRef idx="0">
+                  <a:schemeClr val="accent1"/>
+                </a:effectRef>
+                <a:fontRef idx="minor">
+                  <a:schemeClr val="tx1"/>
+                </a:fontRef>
+              </p:style>
+            </p:cxnSp>
+            <p:cxnSp>
+              <p:nvCxnSpPr>
+                <p:cNvPr id="35" name="Straight Connector 34"/>
+                <p:cNvCxnSpPr/>
+                <p:nvPr/>
+              </p:nvCxnSpPr>
+              <p:spPr>
+                <a:xfrm>
+                  <a:off x="2819400" y="762000"/>
+                  <a:ext cx="0" cy="228600"/>
+                </a:xfrm>
+                <a:prstGeom prst="line">
+                  <a:avLst/>
+                </a:prstGeom>
+                <a:ln w="12700">
+                  <a:solidFill>
+                    <a:schemeClr val="tx1"/>
+                  </a:solidFill>
+                </a:ln>
+              </p:spPr>
+              <p:style>
+                <a:lnRef idx="1">
+                  <a:schemeClr val="accent1"/>
+                </a:lnRef>
+                <a:fillRef idx="0">
+                  <a:schemeClr val="accent1"/>
+                </a:fillRef>
+                <a:effectRef idx="0">
+                  <a:schemeClr val="accent1"/>
+                </a:effectRef>
+                <a:fontRef idx="minor">
+                  <a:schemeClr val="tx1"/>
+                </a:fontRef>
+              </p:style>
+            </p:cxnSp>
+            <p:cxnSp>
+              <p:nvCxnSpPr>
+                <p:cNvPr id="36" name="Straight Connector 35"/>
+                <p:cNvCxnSpPr/>
+                <p:nvPr/>
+              </p:nvCxnSpPr>
+              <p:spPr>
+                <a:xfrm>
+                  <a:off x="3352800" y="762000"/>
+                  <a:ext cx="0" cy="228600"/>
+                </a:xfrm>
+                <a:prstGeom prst="line">
+                  <a:avLst/>
+                </a:prstGeom>
+                <a:ln w="12700">
+                  <a:solidFill>
+                    <a:schemeClr val="tx1"/>
+                  </a:solidFill>
+                </a:ln>
+              </p:spPr>
+              <p:style>
+                <a:lnRef idx="1">
+                  <a:schemeClr val="accent1"/>
+                </a:lnRef>
+                <a:fillRef idx="0">
+                  <a:schemeClr val="accent1"/>
+                </a:fillRef>
+                <a:effectRef idx="0">
+                  <a:schemeClr val="accent1"/>
+                </a:effectRef>
+                <a:fontRef idx="minor">
+                  <a:schemeClr val="tx1"/>
+                </a:fontRef>
+              </p:style>
+            </p:cxnSp>
+          </p:grpSp>
+          <p:cxnSp>
+            <p:nvCxnSpPr>
+              <p:cNvPr id="32" name="Straight Connector 31"/>
+              <p:cNvCxnSpPr/>
+              <p:nvPr/>
+            </p:nvCxnSpPr>
+            <p:spPr>
+              <a:xfrm>
+                <a:off x="7146290" y="1409700"/>
+                <a:ext cx="304800" cy="0"/>
+              </a:xfrm>
+              <a:prstGeom prst="line">
+                <a:avLst/>
+              </a:prstGeom>
+              <a:ln w="12700">
+                <a:solidFill>
+                  <a:schemeClr val="tx1"/>
+                </a:solidFill>
+              </a:ln>
+            </p:spPr>
+            <p:style>
+              <a:lnRef idx="1">
+                <a:schemeClr val="accent1"/>
+              </a:lnRef>
+              <a:fillRef idx="0">
+                <a:schemeClr val="accent1"/>
+              </a:fillRef>
+              <a:effectRef idx="0">
+                <a:schemeClr val="accent1"/>
+              </a:effectRef>
+              <a:fontRef idx="minor">
+                <a:schemeClr val="tx1"/>
+              </a:fontRef>
+            </p:style>
+          </p:cxnSp>
+          <p:cxnSp>
+            <p:nvCxnSpPr>
+              <p:cNvPr id="33" name="Straight Connector 32"/>
+              <p:cNvCxnSpPr/>
+              <p:nvPr/>
+            </p:nvCxnSpPr>
+            <p:spPr>
+              <a:xfrm>
+                <a:off x="7298690" y="1409700"/>
+                <a:ext cx="0" cy="381000"/>
+              </a:xfrm>
+              <a:prstGeom prst="line">
+                <a:avLst/>
+              </a:prstGeom>
+              <a:ln w="12700">
+                <a:solidFill>
+                  <a:schemeClr val="tx1"/>
+                </a:solidFill>
+              </a:ln>
+            </p:spPr>
+            <p:style>
+              <a:lnRef idx="1">
+                <a:schemeClr val="accent1"/>
+              </a:lnRef>
+              <a:fillRef idx="0">
+                <a:schemeClr val="accent1"/>
+              </a:fillRef>
+              <a:effectRef idx="0">
+                <a:schemeClr val="accent1"/>
+              </a:effectRef>
+              <a:fontRef idx="minor">
+                <a:schemeClr val="tx1"/>
+              </a:fontRef>
+            </p:style>
+          </p:cxnSp>
+        </p:grpSp>
+        <p:pic>
+          <p:nvPicPr>
+            <p:cNvPr id="29" name="Picture 2" descr="Image result for spring diagram"/>
+            <p:cNvPicPr>
+              <a:picLocks noChangeAspect="1" noChangeArrowheads="1"/>
+            </p:cNvPicPr>
+            <p:nvPr/>
+          </p:nvPicPr>
+          <p:blipFill rotWithShape="1">
+            <a:blip r:embed="rId2" cstate="print">
+              <a:extLst>
+                <a:ext uri="{28A0092B-C50C-407E-A947-70E740481C1C}">
+                  <a14:useLocalDpi xmlns:a14="http://schemas.microsoft.com/office/drawing/2010/main" val="0"/>
+                </a:ext>
+              </a:extLst>
+            </a:blip>
+            <a:srcRect l="22285" r="25487" b="64250"/>
+            <a:stretch/>
+          </p:blipFill>
+          <p:spPr bwMode="auto">
+            <a:xfrm rot="16200000">
+              <a:off x="7024797" y="1265175"/>
+              <a:ext cx="610111" cy="365760"/>
+            </a:xfrm>
+            <a:prstGeom prst="rect">
+              <a:avLst/>
+            </a:prstGeom>
+            <a:noFill/>
+            <a:extLst>
+              <a:ext uri="{909E8E84-426E-40DD-AFC4-6F175D3DCCD1}">
+                <a14:hiddenFill xmlns:a14="http://schemas.microsoft.com/office/drawing/2010/main">
+                  <a:solidFill>
+                    <a:srgbClr val="FFFFFF"/>
+                  </a:solidFill>
+                </a14:hiddenFill>
+              </a:ext>
+            </a:extLst>
+          </p:spPr>
+        </p:pic>
+      </p:grpSp>
+      <p:sp>
+        <p:nvSpPr>
+          <p:cNvPr id="37" name="Isosceles Triangle 36"/>
+          <p:cNvSpPr/>
+          <p:nvPr/>
+        </p:nvSpPr>
+        <p:spPr>
+          <a:xfrm>
+            <a:off x="1781175" y="3048000"/>
+            <a:ext cx="228600" cy="228600"/>
+          </a:xfrm>
+          <a:prstGeom prst="triangle">
+            <a:avLst/>
+          </a:prstGeom>
+          <a:solidFill>
+            <a:schemeClr val="tx1">
+              <a:lumMod val="50000"/>
+              <a:lumOff val="50000"/>
+            </a:schemeClr>
+          </a:solidFill>
+          <a:ln>
+            <a:solidFill>
+              <a:schemeClr val="tx1"/>
+            </a:solidFill>
+          </a:ln>
+        </p:spPr>
+        <p:style>
+          <a:lnRef idx="2">
+            <a:schemeClr val="accent1">
+              <a:shade val="50000"/>
+            </a:schemeClr>
+          </a:lnRef>
+          <a:fillRef idx="1">
+            <a:schemeClr val="accent1"/>
+          </a:fillRef>
+          <a:effectRef idx="0">
+            <a:schemeClr val="accent1"/>
+          </a:effectRef>
+          <a:fontRef idx="minor">
+            <a:schemeClr val="lt1"/>
+          </a:fontRef>
+        </p:style>
+        <p:txBody>
+          <a:bodyPr rtlCol="0" anchor="ctr"/>
+          <a:lstStyle/>
+          <a:p>
+            <a:pPr algn="ctr"/>
+            <a:endParaRPr lang="en-US" sz="3200" b="1">
+              <a:ln w="19050">
+                <a:solidFill>
+                  <a:schemeClr val="tx1"/>
+                </a:solidFill>
+              </a:ln>
+              <a:solidFill>
+                <a:schemeClr val="bg1"/>
+              </a:solidFill>
+            </a:endParaRPr>
+          </a:p>
+        </p:txBody>
+      </p:sp>
+      <p:sp>
+        <p:nvSpPr>
+          <p:cNvPr id="38" name="Oval 37"/>
+          <p:cNvSpPr/>
+          <p:nvPr/>
+        </p:nvSpPr>
+        <p:spPr>
+          <a:xfrm>
+            <a:off x="7086600" y="3048000"/>
+            <a:ext cx="228600" cy="228600"/>
+          </a:xfrm>
+          <a:prstGeom prst="ellipse">
+            <a:avLst/>
+          </a:prstGeom>
+          <a:solidFill>
+            <a:schemeClr val="tx1">
+              <a:lumMod val="50000"/>
+              <a:lumOff val="50000"/>
+            </a:schemeClr>
+          </a:solidFill>
+          <a:ln>
+            <a:solidFill>
+              <a:schemeClr val="tx1"/>
+            </a:solidFill>
+          </a:ln>
+        </p:spPr>
+        <p:style>
+          <a:lnRef idx="2">
+            <a:schemeClr val="accent1">
+              <a:shade val="50000"/>
+            </a:schemeClr>
+          </a:lnRef>
+          <a:fillRef idx="1">
+            <a:schemeClr val="accent1"/>
+          </a:fillRef>
+          <a:effectRef idx="0">
+            <a:schemeClr val="accent1"/>
+          </a:effectRef>
+          <a:fontRef idx="minor">
+            <a:schemeClr val="lt1"/>
+          </a:fontRef>
+        </p:style>
+        <p:txBody>
+          <a:bodyPr rtlCol="0" anchor="ctr"/>
+          <a:lstStyle/>
+          <a:p>
+            <a:pPr algn="ctr"/>
+            <a:endParaRPr lang="en-US" sz="3200" b="1">
+              <a:ln w="19050">
+                <a:solidFill>
+                  <a:schemeClr val="tx1"/>
+                </a:solidFill>
+              </a:ln>
+              <a:solidFill>
+                <a:schemeClr val="bg1"/>
+              </a:solidFill>
+            </a:endParaRPr>
+          </a:p>
+        </p:txBody>
+      </p:sp>
+      <p:sp>
+        <p:nvSpPr>
+          <p:cNvPr id="12" name="Freeform 11"/>
+          <p:cNvSpPr/>
+          <p:nvPr/>
+        </p:nvSpPr>
+        <p:spPr>
+          <a:xfrm>
+            <a:off x="1866901" y="2886074"/>
+            <a:ext cx="5448300" cy="657291"/>
+          </a:xfrm>
+          <a:custGeom>
+            <a:avLst/>
+            <a:gdLst>
+              <a:gd name="connsiteX0" fmla="*/ 0 w 5381625"/>
+              <a:gd name="connsiteY0" fmla="*/ 0 h 657908"/>
+              <a:gd name="connsiteX1" fmla="*/ 2667000 w 5381625"/>
+              <a:gd name="connsiteY1" fmla="*/ 657225 h 657908"/>
+              <a:gd name="connsiteX2" fmla="*/ 5381625 w 5381625"/>
+              <a:gd name="connsiteY2" fmla="*/ 114300 h 657908"/>
+              <a:gd name="connsiteX0" fmla="*/ 0 w 5448300"/>
+              <a:gd name="connsiteY0" fmla="*/ 0 h 657291"/>
+              <a:gd name="connsiteX1" fmla="*/ 2667000 w 5448300"/>
+              <a:gd name="connsiteY1" fmla="*/ 657225 h 657291"/>
+              <a:gd name="connsiteX2" fmla="*/ 5448300 w 5448300"/>
+              <a:gd name="connsiteY2" fmla="*/ 38100 h 657291"/>
+            </a:gdLst>
+            <a:ahLst/>
+            <a:cxnLst>
+              <a:cxn ang="0">
+                <a:pos x="connsiteX0" y="connsiteY0"/>
+              </a:cxn>
+              <a:cxn ang="0">
+                <a:pos x="connsiteX1" y="connsiteY1"/>
+              </a:cxn>
+              <a:cxn ang="0">
+                <a:pos x="connsiteX2" y="connsiteY2"/>
+              </a:cxn>
+            </a:cxnLst>
+            <a:rect l="l" t="t" r="r" b="b"/>
+            <a:pathLst>
+              <a:path w="5448300" h="657291">
+                <a:moveTo>
+                  <a:pt x="0" y="0"/>
+                </a:moveTo>
+                <a:cubicBezTo>
+                  <a:pt x="885031" y="319087"/>
+                  <a:pt x="1758950" y="650875"/>
+                  <a:pt x="2667000" y="657225"/>
+                </a:cubicBezTo>
+                <a:cubicBezTo>
+                  <a:pt x="3575050" y="663575"/>
+                  <a:pt x="4852988" y="215900"/>
+                  <a:pt x="5448300" y="38100"/>
+                </a:cubicBezTo>
+              </a:path>
+            </a:pathLst>
+          </a:custGeom>
+          <a:noFill/>
+          <a:ln>
+            <a:solidFill>
+              <a:schemeClr val="tx1"/>
+            </a:solidFill>
+            <a:prstDash val="dash"/>
+          </a:ln>
+        </p:spPr>
+        <p:style>
+          <a:lnRef idx="2">
+            <a:schemeClr val="accent1">
+              <a:shade val="50000"/>
+            </a:schemeClr>
+          </a:lnRef>
+          <a:fillRef idx="1">
+            <a:schemeClr val="accent1"/>
+          </a:fillRef>
+          <a:effectRef idx="0">
+            <a:schemeClr val="accent1"/>
+          </a:effectRef>
+          <a:fontRef idx="minor">
+            <a:schemeClr val="lt1"/>
+          </a:fontRef>
+        </p:style>
+        <p:txBody>
+          <a:bodyPr rtlCol="0" anchor="ctr"/>
+          <a:lstStyle/>
+          <a:p>
+            <a:pPr algn="ctr"/>
+            <a:endParaRPr lang="en-US"/>
+          </a:p>
+        </p:txBody>
+      </p:sp>
+      <p:sp>
+        <p:nvSpPr>
+          <p:cNvPr id="62" name="Rectangle 61">
+            <a:extLst>
+              <a:ext uri="{FF2B5EF4-FFF2-40B4-BE49-F238E27FC236}">
+                <a16:creationId xmlns:a16="http://schemas.microsoft.com/office/drawing/2014/main" id="{FF9E9A98-F3C5-4606-959B-8989419CAAAA}"/>
+              </a:ext>
+            </a:extLst>
+          </p:cNvPr>
+          <p:cNvSpPr/>
+          <p:nvPr/>
+        </p:nvSpPr>
+        <p:spPr>
+          <a:xfrm>
+            <a:off x="1981200" y="5882955"/>
+            <a:ext cx="5486400" cy="251080"/>
+          </a:xfrm>
+          <a:prstGeom prst="rect">
+            <a:avLst/>
+          </a:prstGeom>
+          <a:pattFill prst="wdUpDiag">
+            <a:fgClr>
+              <a:schemeClr val="tx1"/>
+            </a:fgClr>
+            <a:bgClr>
+              <a:schemeClr val="bg1"/>
+            </a:bgClr>
+          </a:pattFill>
+          <a:ln>
+            <a:solidFill>
+              <a:schemeClr val="tx1"/>
+            </a:solidFill>
+          </a:ln>
+        </p:spPr>
+        <p:style>
+          <a:lnRef idx="2">
+            <a:schemeClr val="accent1">
+              <a:shade val="50000"/>
+            </a:schemeClr>
+          </a:lnRef>
+          <a:fillRef idx="1">
+            <a:schemeClr val="accent1"/>
+          </a:fillRef>
+          <a:effectRef idx="0">
+            <a:schemeClr val="accent1"/>
+          </a:effectRef>
+          <a:fontRef idx="minor">
+            <a:schemeClr val="lt1"/>
+          </a:fontRef>
+        </p:style>
+        <p:txBody>
+          <a:bodyPr rtlCol="0" anchor="ctr"/>
+          <a:lstStyle/>
+          <a:p>
+            <a:pPr algn="ctr"/>
+            <a:endParaRPr lang="en-US" sz="2800" b="1" dirty="0">
+              <a:ln w="19050">
+                <a:solidFill>
+                  <a:schemeClr val="tx1"/>
+                </a:solidFill>
+              </a:ln>
+              <a:solidFill>
+                <a:schemeClr val="bg1"/>
+              </a:solidFill>
+            </a:endParaRPr>
+          </a:p>
+        </p:txBody>
+      </p:sp>
+      <p:cxnSp>
+        <p:nvCxnSpPr>
+          <p:cNvPr id="64" name="Straight Connector 63">
+            <a:extLst>
+              <a:ext uri="{FF2B5EF4-FFF2-40B4-BE49-F238E27FC236}">
+                <a16:creationId xmlns:a16="http://schemas.microsoft.com/office/drawing/2014/main" id="{1358B0DE-326F-41CC-BDA7-A0F0AB75B9E1}"/>
+              </a:ext>
+            </a:extLst>
+          </p:cNvPr>
+          <p:cNvCxnSpPr>
+            <a:cxnSpLocks/>
+          </p:cNvCxnSpPr>
+          <p:nvPr/>
+        </p:nvCxnSpPr>
+        <p:spPr>
+          <a:xfrm>
+            <a:off x="4656680" y="5105400"/>
+            <a:ext cx="0" cy="774126"/>
+          </a:xfrm>
+          <a:prstGeom prst="line">
+            <a:avLst/>
+          </a:prstGeom>
+          <a:ln w="38100">
+            <a:solidFill>
+              <a:schemeClr val="tx1"/>
+            </a:solidFill>
+            <a:headEnd type="none" w="med" len="lg"/>
+            <a:tailEnd type="stealth" w="lg" len="lg"/>
+          </a:ln>
+        </p:spPr>
+        <p:style>
+          <a:lnRef idx="1">
+            <a:schemeClr val="accent1"/>
+          </a:lnRef>
+          <a:fillRef idx="0">
+            <a:schemeClr val="accent1"/>
+          </a:fillRef>
+          <a:effectRef idx="0">
+            <a:schemeClr val="accent1"/>
+          </a:effectRef>
+          <a:fontRef idx="minor">
+            <a:schemeClr val="tx1"/>
+          </a:fontRef>
+        </p:style>
+      </p:cxnSp>
+      <p:sp>
+        <p:nvSpPr>
+          <p:cNvPr id="65" name="TextBox 64">
+            <a:extLst>
+              <a:ext uri="{FF2B5EF4-FFF2-40B4-BE49-F238E27FC236}">
+                <a16:creationId xmlns:a16="http://schemas.microsoft.com/office/drawing/2014/main" id="{809C3255-C8ED-40EF-8C1D-A6DD4B339B8A}"/>
+              </a:ext>
+            </a:extLst>
+          </p:cNvPr>
+          <p:cNvSpPr txBox="1"/>
+          <p:nvPr/>
+        </p:nvSpPr>
+        <p:spPr>
+          <a:xfrm>
+            <a:off x="4648200" y="5345668"/>
+            <a:ext cx="609599" cy="369332"/>
+          </a:xfrm>
+          <a:prstGeom prst="rect">
+            <a:avLst/>
+          </a:prstGeom>
+          <a:noFill/>
+        </p:spPr>
+        <p:txBody>
+          <a:bodyPr wrap="square" rtlCol="0">
+            <a:spAutoFit/>
+          </a:bodyPr>
+          <a:lstStyle/>
+          <a:p>
+            <a:r>
+              <a:rPr lang="en-US" dirty="0">
+                <a:sym typeface="Symbol"/>
+              </a:rPr>
+              <a:t>P(t)</a:t>
+            </a:r>
+            <a:endParaRPr lang="en-US" dirty="0"/>
+          </a:p>
+        </p:txBody>
+      </p:sp>
+      <p:sp>
+        <p:nvSpPr>
+          <p:cNvPr id="76" name="Isosceles Triangle 75">
+            <a:extLst>
+              <a:ext uri="{FF2B5EF4-FFF2-40B4-BE49-F238E27FC236}">
+                <a16:creationId xmlns:a16="http://schemas.microsoft.com/office/drawing/2014/main" id="{0C76E365-415E-44BF-8590-EEAA6A0EFE53}"/>
+              </a:ext>
+            </a:extLst>
+          </p:cNvPr>
+          <p:cNvSpPr/>
+          <p:nvPr/>
+        </p:nvSpPr>
+        <p:spPr>
+          <a:xfrm>
+            <a:off x="1933575" y="6134035"/>
+            <a:ext cx="228600" cy="228600"/>
+          </a:xfrm>
+          <a:prstGeom prst="triangle">
+            <a:avLst/>
+          </a:prstGeom>
+          <a:solidFill>
+            <a:schemeClr val="tx1">
+              <a:lumMod val="50000"/>
+              <a:lumOff val="50000"/>
+            </a:schemeClr>
+          </a:solidFill>
+          <a:ln>
+            <a:solidFill>
+              <a:schemeClr val="tx1"/>
+            </a:solidFill>
+          </a:ln>
+        </p:spPr>
+        <p:style>
+          <a:lnRef idx="2">
+            <a:schemeClr val="accent1">
+              <a:shade val="50000"/>
+            </a:schemeClr>
+          </a:lnRef>
+          <a:fillRef idx="1">
+            <a:schemeClr val="accent1"/>
+          </a:fillRef>
+          <a:effectRef idx="0">
+            <a:schemeClr val="accent1"/>
+          </a:effectRef>
+          <a:fontRef idx="minor">
+            <a:schemeClr val="lt1"/>
+          </a:fontRef>
+        </p:style>
+        <p:txBody>
+          <a:bodyPr rtlCol="0" anchor="ctr"/>
+          <a:lstStyle/>
+          <a:p>
+            <a:pPr algn="ctr"/>
+            <a:endParaRPr lang="en-US" sz="3200" b="1">
+              <a:ln w="19050">
+                <a:solidFill>
+                  <a:schemeClr val="tx1"/>
+                </a:solidFill>
+              </a:ln>
+              <a:solidFill>
+                <a:schemeClr val="bg1"/>
+              </a:solidFill>
+            </a:endParaRPr>
+          </a:p>
+        </p:txBody>
+      </p:sp>
+      <p:sp>
+        <p:nvSpPr>
+          <p:cNvPr id="77" name="Oval 76">
+            <a:extLst>
+              <a:ext uri="{FF2B5EF4-FFF2-40B4-BE49-F238E27FC236}">
+                <a16:creationId xmlns:a16="http://schemas.microsoft.com/office/drawing/2014/main" id="{BDD8574D-1FB7-42ED-AF7D-6F421F5731E6}"/>
+              </a:ext>
+            </a:extLst>
+          </p:cNvPr>
+          <p:cNvSpPr/>
+          <p:nvPr/>
+        </p:nvSpPr>
+        <p:spPr>
+          <a:xfrm>
+            <a:off x="7239000" y="6134035"/>
+            <a:ext cx="228600" cy="228600"/>
+          </a:xfrm>
+          <a:prstGeom prst="ellipse">
+            <a:avLst/>
+          </a:prstGeom>
+          <a:solidFill>
+            <a:schemeClr val="tx1">
+              <a:lumMod val="50000"/>
+              <a:lumOff val="50000"/>
+            </a:schemeClr>
+          </a:solidFill>
+          <a:ln>
+            <a:solidFill>
+              <a:schemeClr val="tx1"/>
+            </a:solidFill>
+          </a:ln>
+        </p:spPr>
+        <p:style>
+          <a:lnRef idx="2">
+            <a:schemeClr val="accent1">
+              <a:shade val="50000"/>
+            </a:schemeClr>
+          </a:lnRef>
+          <a:fillRef idx="1">
+            <a:schemeClr val="accent1"/>
+          </a:fillRef>
+          <a:effectRef idx="0">
+            <a:schemeClr val="accent1"/>
+          </a:effectRef>
+          <a:fontRef idx="minor">
+            <a:schemeClr val="lt1"/>
+          </a:fontRef>
+        </p:style>
+        <p:txBody>
+          <a:bodyPr rtlCol="0" anchor="ctr"/>
+          <a:lstStyle/>
+          <a:p>
+            <a:pPr algn="ctr"/>
+            <a:endParaRPr lang="en-US" sz="3200" b="1">
+              <a:ln w="19050">
+                <a:solidFill>
+                  <a:schemeClr val="tx1"/>
+                </a:solidFill>
+              </a:ln>
+              <a:solidFill>
+                <a:schemeClr val="bg1"/>
+              </a:solidFill>
+            </a:endParaRPr>
+          </a:p>
+        </p:txBody>
+      </p:sp>
+      <p:sp>
+        <p:nvSpPr>
+          <p:cNvPr id="78" name="Freeform 11">
+            <a:extLst>
+              <a:ext uri="{FF2B5EF4-FFF2-40B4-BE49-F238E27FC236}">
+                <a16:creationId xmlns:a16="http://schemas.microsoft.com/office/drawing/2014/main" id="{6D12BDB0-47B6-4598-9B36-B3BDC0276386}"/>
+              </a:ext>
+            </a:extLst>
+          </p:cNvPr>
+          <p:cNvSpPr/>
+          <p:nvPr/>
+        </p:nvSpPr>
+        <p:spPr>
+          <a:xfrm>
+            <a:off x="2019301" y="5972109"/>
+            <a:ext cx="5448300" cy="657291"/>
+          </a:xfrm>
+          <a:custGeom>
+            <a:avLst/>
+            <a:gdLst>
+              <a:gd name="connsiteX0" fmla="*/ 0 w 5381625"/>
+              <a:gd name="connsiteY0" fmla="*/ 0 h 657908"/>
+              <a:gd name="connsiteX1" fmla="*/ 2667000 w 5381625"/>
+              <a:gd name="connsiteY1" fmla="*/ 657225 h 657908"/>
+              <a:gd name="connsiteX2" fmla="*/ 5381625 w 5381625"/>
+              <a:gd name="connsiteY2" fmla="*/ 114300 h 657908"/>
+              <a:gd name="connsiteX0" fmla="*/ 0 w 5448300"/>
+              <a:gd name="connsiteY0" fmla="*/ 0 h 657291"/>
+              <a:gd name="connsiteX1" fmla="*/ 2667000 w 5448300"/>
+              <a:gd name="connsiteY1" fmla="*/ 657225 h 657291"/>
+              <a:gd name="connsiteX2" fmla="*/ 5448300 w 5448300"/>
+              <a:gd name="connsiteY2" fmla="*/ 38100 h 657291"/>
+            </a:gdLst>
+            <a:ahLst/>
+            <a:cxnLst>
+              <a:cxn ang="0">
+                <a:pos x="connsiteX0" y="connsiteY0"/>
+              </a:cxn>
+              <a:cxn ang="0">
+                <a:pos x="connsiteX1" y="connsiteY1"/>
+              </a:cxn>
+              <a:cxn ang="0">
+                <a:pos x="connsiteX2" y="connsiteY2"/>
+              </a:cxn>
+            </a:cxnLst>
+            <a:rect l="l" t="t" r="r" b="b"/>
+            <a:pathLst>
+              <a:path w="5448300" h="657291">
+                <a:moveTo>
+                  <a:pt x="0" y="0"/>
+                </a:moveTo>
+                <a:cubicBezTo>
+                  <a:pt x="885031" y="319087"/>
+                  <a:pt x="1758950" y="650875"/>
+                  <a:pt x="2667000" y="657225"/>
+                </a:cubicBezTo>
+                <a:cubicBezTo>
+                  <a:pt x="3575050" y="663575"/>
+                  <a:pt x="4852988" y="215900"/>
+                  <a:pt x="5448300" y="38100"/>
+                </a:cubicBezTo>
+              </a:path>
+            </a:pathLst>
+          </a:custGeom>
+          <a:noFill/>
+          <a:ln>
+            <a:solidFill>
+              <a:schemeClr val="tx1"/>
+            </a:solidFill>
+            <a:prstDash val="dash"/>
+          </a:ln>
+        </p:spPr>
+        <p:style>
+          <a:lnRef idx="2">
+            <a:schemeClr val="accent1">
+              <a:shade val="50000"/>
+            </a:schemeClr>
+          </a:lnRef>
+          <a:fillRef idx="1">
+            <a:schemeClr val="accent1"/>
+          </a:fillRef>
+          <a:effectRef idx="0">
+            <a:schemeClr val="accent1"/>
+          </a:effectRef>
+          <a:fontRef idx="minor">
+            <a:schemeClr val="lt1"/>
+          </a:fontRef>
+        </p:style>
+        <p:txBody>
+          <a:bodyPr rtlCol="0" anchor="ctr"/>
+          <a:lstStyle/>
+          <a:p>
+            <a:pPr algn="ctr"/>
+            <a:endParaRPr lang="en-US"/>
+          </a:p>
+        </p:txBody>
+      </p:sp>
+      <p:sp>
+        <p:nvSpPr>
+          <p:cNvPr id="79" name="Right Arrow 1">
+            <a:extLst>
+              <a:ext uri="{FF2B5EF4-FFF2-40B4-BE49-F238E27FC236}">
+                <a16:creationId xmlns:a16="http://schemas.microsoft.com/office/drawing/2014/main" id="{EB03B03B-CB12-4AE1-9DBB-872A9EF79AEC}"/>
+              </a:ext>
+            </a:extLst>
+          </p:cNvPr>
+          <p:cNvSpPr/>
+          <p:nvPr/>
+        </p:nvSpPr>
+        <p:spPr>
+          <a:xfrm>
+            <a:off x="4055269" y="5142896"/>
+            <a:ext cx="1183869" cy="244694"/>
+          </a:xfrm>
+          <a:prstGeom prst="rightArrow">
+            <a:avLst>
+              <a:gd name="adj1" fmla="val 29930"/>
+              <a:gd name="adj2" fmla="val 62557"/>
+            </a:avLst>
+          </a:prstGeom>
+          <a:noFill/>
+          <a:ln>
+            <a:solidFill>
+              <a:schemeClr val="tx1"/>
+            </a:solidFill>
+          </a:ln>
+        </p:spPr>
+        <p:style>
+          <a:lnRef idx="2">
+            <a:schemeClr val="accent1">
+              <a:shade val="50000"/>
+            </a:schemeClr>
+          </a:lnRef>
+          <a:fillRef idx="1">
+            <a:schemeClr val="accent1"/>
+          </a:fillRef>
+          <a:effectRef idx="0">
+            <a:schemeClr val="accent1"/>
+          </a:effectRef>
+          <a:fontRef idx="minor">
+            <a:schemeClr val="lt1"/>
+          </a:fontRef>
+        </p:style>
+        <p:txBody>
+          <a:bodyPr rtlCol="0" anchor="ctr"/>
+          <a:lstStyle/>
+          <a:p>
+            <a:pPr algn="ctr"/>
+            <a:endParaRPr lang="en-US"/>
+          </a:p>
+        </p:txBody>
+      </p:sp>
+      <mc:AlternateContent xmlns:mc="http://schemas.openxmlformats.org/markup-compatibility/2006">
+        <mc:Choice xmlns:a14="http://schemas.microsoft.com/office/drawing/2010/main" Requires="a14">
+          <p:sp>
+            <p:nvSpPr>
+              <p:cNvPr id="80" name="TextBox 79">
+                <a:extLst>
+                  <a:ext uri="{FF2B5EF4-FFF2-40B4-BE49-F238E27FC236}">
+                    <a16:creationId xmlns:a16="http://schemas.microsoft.com/office/drawing/2014/main" id="{3B63AC0D-8616-415F-BAEF-EC0EA02793B1}"/>
+                  </a:ext>
+                </a:extLst>
+              </p:cNvPr>
+              <p:cNvSpPr txBox="1"/>
+              <p:nvPr/>
+            </p:nvSpPr>
+            <p:spPr>
+              <a:xfrm>
+                <a:off x="3073657" y="5068514"/>
+                <a:ext cx="1090491" cy="369332"/>
+              </a:xfrm>
+              <a:prstGeom prst="rect">
+                <a:avLst/>
+              </a:prstGeom>
+              <a:noFill/>
+            </p:spPr>
+            <p:txBody>
+              <a:bodyPr wrap="none" rtlCol="0">
+                <a:spAutoFit/>
+              </a:bodyPr>
+              <a:lstStyle/>
+              <a:p>
+                <a:pPr/>
+                <a14:m>
+                  <m:oMathPara xmlns:m="http://schemas.openxmlformats.org/officeDocument/2006/math">
+                    <m:oMathParaPr>
+                      <m:jc m:val="centerGroup"/>
+                    </m:oMathParaPr>
+                    <m:oMath xmlns:m="http://schemas.openxmlformats.org/officeDocument/2006/math">
+                      <m:r>
+                        <a:rPr lang="en-US" b="0" i="1" smtClean="0">
+                          <a:latin typeface="Cambria Math"/>
+                        </a:rPr>
+                        <m:t>𝑥</m:t>
+                      </m:r>
+                      <m:r>
+                        <a:rPr lang="en-US" b="0" i="1" smtClean="0">
+                          <a:latin typeface="Cambria Math"/>
+                        </a:rPr>
+                        <m:t>=</m:t>
+                      </m:r>
+                      <m:r>
+                        <a:rPr lang="en-US" b="0" i="1" smtClean="0">
+                          <a:latin typeface="Cambria Math"/>
+                        </a:rPr>
+                        <m:t>𝑣</m:t>
+                      </m:r>
+                      <m:r>
+                        <a:rPr lang="en-US" b="0" i="1" smtClean="0">
+                          <a:latin typeface="Cambria Math"/>
+                        </a:rPr>
+                        <m:t>(</m:t>
+                      </m:r>
+                      <m:r>
+                        <a:rPr lang="en-US" b="0" i="1" smtClean="0">
+                          <a:latin typeface="Cambria Math"/>
+                        </a:rPr>
+                        <m:t>𝑡</m:t>
+                      </m:r>
+                      <m:r>
+                        <a:rPr lang="en-US" b="0" i="1" smtClean="0">
+                          <a:latin typeface="Cambria Math"/>
+                        </a:rPr>
+                        <m:t>)</m:t>
+                      </m:r>
+                    </m:oMath>
+                  </m:oMathPara>
+                </a14:m>
+                <a:endParaRPr lang="en-US" dirty="0"/>
+              </a:p>
+            </p:txBody>
+          </p:sp>
+        </mc:Choice>
+        <mc:Fallback>
+          <p:sp>
+            <p:nvSpPr>
+              <p:cNvPr id="80" name="TextBox 79">
+                <a:extLst>
+                  <a:ext uri="{FF2B5EF4-FFF2-40B4-BE49-F238E27FC236}">
+                    <a16:creationId xmlns:a16="http://schemas.microsoft.com/office/drawing/2014/main" id="{3B63AC0D-8616-415F-BAEF-EC0EA02793B1}"/>
+                  </a:ext>
+                </a:extLst>
+              </p:cNvPr>
+              <p:cNvSpPr txBox="1">
+                <a:spLocks noRot="1" noChangeAspect="1" noMove="1" noResize="1" noEditPoints="1" noAdjustHandles="1" noChangeArrowheads="1" noChangeShapeType="1" noTextEdit="1"/>
+              </p:cNvSpPr>
+              <p:nvPr/>
+            </p:nvSpPr>
+            <p:spPr>
+              <a:xfrm>
+                <a:off x="3073657" y="5068514"/>
+                <a:ext cx="1090491" cy="369332"/>
+              </a:xfrm>
+              <a:prstGeom prst="rect">
+                <a:avLst/>
+              </a:prstGeom>
+              <a:blipFill>
+                <a:blip r:embed="rId3"/>
+                <a:stretch>
+                  <a:fillRect b="-13115"/>
+                </a:stretch>
+              </a:blipFill>
+            </p:spPr>
+            <p:txBody>
+              <a:bodyPr/>
+              <a:lstStyle/>
+              <a:p>
+                <a:r>
+                  <a:rPr lang="en-US">
+                    <a:noFill/>
+                  </a:rPr>
+                  <a:t> </a:t>
+                </a:r>
+              </a:p>
+            </p:txBody>
+          </p:sp>
+        </mc:Fallback>
+      </mc:AlternateContent>
+      <mc:AlternateContent xmlns:mc="http://schemas.openxmlformats.org/markup-compatibility/2006">
+        <mc:Choice xmlns:a14="http://schemas.microsoft.com/office/drawing/2010/main" Requires="a14">
+          <p:sp>
+            <p:nvSpPr>
+              <p:cNvPr id="81" name="TextBox 80">
+                <a:extLst>
+                  <a:ext uri="{FF2B5EF4-FFF2-40B4-BE49-F238E27FC236}">
+                    <a16:creationId xmlns:a16="http://schemas.microsoft.com/office/drawing/2014/main" id="{539E2771-E6A6-45A6-A546-E6AE80CD33C7}"/>
+                  </a:ext>
+                </a:extLst>
+              </p:cNvPr>
+              <p:cNvSpPr txBox="1"/>
+              <p:nvPr/>
+            </p:nvSpPr>
+            <p:spPr>
+              <a:xfrm>
+                <a:off x="2047875" y="1139373"/>
+                <a:ext cx="1090491" cy="369332"/>
+              </a:xfrm>
+              <a:prstGeom prst="rect">
+                <a:avLst/>
+              </a:prstGeom>
+              <a:noFill/>
+            </p:spPr>
+            <p:txBody>
+              <a:bodyPr wrap="none" rtlCol="0">
+                <a:spAutoFit/>
+              </a:bodyPr>
+              <a:lstStyle/>
+              <a:p>
+                <a:pPr/>
+                <a14:m>
+                  <m:oMathPara xmlns:m="http://schemas.openxmlformats.org/officeDocument/2006/math">
+                    <m:oMathParaPr>
+                      <m:jc m:val="centerGroup"/>
+                    </m:oMathParaPr>
+                    <m:oMath xmlns:m="http://schemas.openxmlformats.org/officeDocument/2006/math">
+                      <m:r>
+                        <a:rPr lang="en-US" b="0" i="1" smtClean="0">
+                          <a:latin typeface="Cambria Math"/>
+                        </a:rPr>
+                        <m:t>𝑥</m:t>
+                      </m:r>
+                      <m:r>
+                        <a:rPr lang="en-US" b="0" i="1" smtClean="0">
+                          <a:latin typeface="Cambria Math"/>
+                        </a:rPr>
+                        <m:t>=</m:t>
+                      </m:r>
+                      <m:r>
+                        <a:rPr lang="en-US" b="0" i="1" smtClean="0">
+                          <a:latin typeface="Cambria Math"/>
+                        </a:rPr>
+                        <m:t>𝑣</m:t>
+                      </m:r>
+                      <m:r>
+                        <a:rPr lang="en-US" b="0" i="1" smtClean="0">
+                          <a:latin typeface="Cambria Math"/>
+                        </a:rPr>
+                        <m:t>(</m:t>
+                      </m:r>
+                      <m:r>
+                        <a:rPr lang="en-US" b="0" i="1" smtClean="0">
+                          <a:latin typeface="Cambria Math"/>
+                        </a:rPr>
+                        <m:t>𝑡</m:t>
+                      </m:r>
+                      <m:r>
+                        <a:rPr lang="en-US" b="0" i="1" smtClean="0">
+                          <a:latin typeface="Cambria Math"/>
+                        </a:rPr>
+                        <m:t>)</m:t>
+                      </m:r>
+                    </m:oMath>
+                  </m:oMathPara>
+                </a14:m>
+                <a:endParaRPr lang="en-US" dirty="0"/>
+              </a:p>
+            </p:txBody>
+          </p:sp>
+        </mc:Choice>
+        <mc:Fallback>
+          <p:sp>
+            <p:nvSpPr>
+              <p:cNvPr id="81" name="TextBox 80">
+                <a:extLst>
+                  <a:ext uri="{FF2B5EF4-FFF2-40B4-BE49-F238E27FC236}">
+                    <a16:creationId xmlns:a16="http://schemas.microsoft.com/office/drawing/2014/main" id="{539E2771-E6A6-45A6-A546-E6AE80CD33C7}"/>
+                  </a:ext>
+                </a:extLst>
+              </p:cNvPr>
+              <p:cNvSpPr txBox="1">
+                <a:spLocks noRot="1" noChangeAspect="1" noMove="1" noResize="1" noEditPoints="1" noAdjustHandles="1" noChangeArrowheads="1" noChangeShapeType="1" noTextEdit="1"/>
+              </p:cNvSpPr>
+              <p:nvPr/>
+            </p:nvSpPr>
+            <p:spPr>
+              <a:xfrm>
+                <a:off x="2047875" y="1139373"/>
+                <a:ext cx="1090491" cy="369332"/>
+              </a:xfrm>
+              <a:prstGeom prst="rect">
+                <a:avLst/>
+              </a:prstGeom>
+              <a:blipFill>
+                <a:blip r:embed="rId4"/>
+                <a:stretch>
+                  <a:fillRect b="-13333"/>
+                </a:stretch>
+              </a:blipFill>
+            </p:spPr>
+            <p:txBody>
+              <a:bodyPr/>
+              <a:lstStyle/>
+              <a:p>
+                <a:r>
+                  <a:rPr lang="en-US">
+                    <a:noFill/>
+                  </a:rPr>
+                  <a:t> </a:t>
+                </a:r>
+              </a:p>
+            </p:txBody>
+          </p:sp>
+        </mc:Fallback>
+      </mc:AlternateContent>
+    </p:spTree>
+    <p:extLst>
+      <p:ext uri="{BB962C8B-B14F-4D97-AF65-F5344CB8AC3E}">
+        <p14:creationId xmlns:p14="http://schemas.microsoft.com/office/powerpoint/2010/main" val="2914275456"/>
+      </p:ext>
+    </p:extLst>
+  </p:cSld>
+  <p:clrMapOvr>
+    <a:masterClrMapping/>
+  </p:clrMapOvr>
 </p:sld>
 </file>
 

</xml_diff>